<commit_message>
REACFL - inital slides
</commit_message>
<xml_diff>
--- a/ALevel/RegularAndContextFreeLanguages/RegularExpressionsAndContextFreeLanguages.pptx
+++ b/ALevel/RegularAndContextFreeLanguages/RegularExpressionsAndContextFreeLanguages.pptx
@@ -4980,8 +4980,29 @@
           <a:p>
             <a:r>
               <a:rPr b="1" dirty="0"/>
-              <a:t>13B - Wednesday 25th January 2023</a:t>
+              <a:t>13B </a:t>
             </a:r>
+            <a:r>
+              <a:rPr lang="en-GB" b="1" dirty="0"/>
+              <a:t>– </a:t>
+            </a:r>
+            <a:r>
+              <a:rPr b="1" dirty="0"/>
+              <a:t>Wednesday </a:t>
+            </a:r>
+            <a:r>
+              <a:rPr lang="en-GB" b="1" dirty="0"/>
+              <a:t>1st March</a:t>
+            </a:r>
+            <a:r>
+              <a:rPr b="1" dirty="0"/>
+              <a:t> 2023</a:t>
+            </a:r>
+            <a:r>
+              <a:rPr lang="en-GB" b="1" dirty="0"/>
+              <a:t> – Mr Woodley</a:t>
+            </a:r>
+            <a:endParaRPr b="1" dirty="0"/>
           </a:p>
         </p:txBody>
       </p:sp>
@@ -5002,13 +5023,13 @@
         </p:spPr>
         <p:txBody>
           <a:bodyPr>
-            <a:normAutofit fontScale="90000"/>
+            <a:noAutofit/>
           </a:bodyPr>
           <a:lstStyle/>
           <a:p>
             <a:r>
-              <a:rPr b="1" dirty="0"/>
-              <a:t>Assembly Language</a:t>
+              <a:rPr lang="en-GB" sz="16500" b="1" dirty="0"/>
+              <a:t>Regular and Context Free Languages</a:t>
             </a:r>
           </a:p>
         </p:txBody>

</xml_diff>

<commit_message>
added regular expression answers
</commit_message>
<xml_diff>
--- a/ALevel/RegularAndContextFreeLanguages/RegularExpressionsAndContextFreeLanguages.pptx
+++ b/ALevel/RegularAndContextFreeLanguages/RegularExpressionsAndContextFreeLanguages.pptx
@@ -5,21 +5,22 @@
     <p:sldMasterId id="2147483648" r:id="rId1"/>
   </p:sldMasterIdLst>
   <p:notesMasterIdLst>
-    <p:notesMasterId r:id="rId14"/>
+    <p:notesMasterId r:id="rId15"/>
   </p:notesMasterIdLst>
   <p:sldIdLst>
     <p:sldId id="256" r:id="rId2"/>
     <p:sldId id="266" r:id="rId3"/>
     <p:sldId id="257" r:id="rId4"/>
     <p:sldId id="267" r:id="rId5"/>
-    <p:sldId id="258" r:id="rId6"/>
-    <p:sldId id="259" r:id="rId7"/>
-    <p:sldId id="260" r:id="rId8"/>
-    <p:sldId id="261" r:id="rId9"/>
-    <p:sldId id="262" r:id="rId10"/>
-    <p:sldId id="263" r:id="rId11"/>
-    <p:sldId id="264" r:id="rId12"/>
-    <p:sldId id="265" r:id="rId13"/>
+    <p:sldId id="268" r:id="rId6"/>
+    <p:sldId id="258" r:id="rId7"/>
+    <p:sldId id="259" r:id="rId8"/>
+    <p:sldId id="260" r:id="rId9"/>
+    <p:sldId id="261" r:id="rId10"/>
+    <p:sldId id="262" r:id="rId11"/>
+    <p:sldId id="263" r:id="rId12"/>
+    <p:sldId id="264" r:id="rId13"/>
+    <p:sldId id="265" r:id="rId14"/>
   </p:sldIdLst>
   <p:sldSz cx="24384000" cy="13716000"/>
   <p:notesSz cx="6858000" cy="9144000"/>
@@ -600,6 +601,105 @@
       </p:grpSpPr>
       <p:sp>
         <p:nvSpPr>
+          <p:cNvPr id="201" name="Shape 201"/>
+          <p:cNvSpPr>
+            <a:spLocks noGrp="1" noRot="1" noChangeAspect="1"/>
+          </p:cNvSpPr>
+          <p:nvPr>
+            <p:ph type="sldImg"/>
+          </p:nvPr>
+        </p:nvSpPr>
+        <p:spPr>
+          <a:xfrm>
+            <a:off x="381000" y="685800"/>
+            <a:ext cx="6096000" cy="3429000"/>
+          </a:xfrm>
+          <a:prstGeom prst="rect">
+            <a:avLst/>
+          </a:prstGeom>
+        </p:spPr>
+        <p:txBody>
+          <a:bodyPr/>
+          <a:lstStyle/>
+          <a:p>
+            <a:endParaRPr/>
+          </a:p>
+        </p:txBody>
+      </p:sp>
+      <p:sp>
+        <p:nvSpPr>
+          <p:cNvPr id="202" name="Shape 202"/>
+          <p:cNvSpPr>
+            <a:spLocks noGrp="1"/>
+          </p:cNvSpPr>
+          <p:nvPr>
+            <p:ph type="body" sz="quarter" idx="1"/>
+          </p:nvPr>
+        </p:nvSpPr>
+        <p:spPr>
+          <a:prstGeom prst="rect">
+            <a:avLst/>
+          </a:prstGeom>
+        </p:spPr>
+        <p:txBody>
+          <a:bodyPr/>
+          <a:lstStyle/>
+          <a:p>
+            <a:pPr marL="342900" indent="-342900">
+              <a:buFontTx/>
+              <a:buChar char="-"/>
+            </a:pPr>
+            <a:r>
+              <a:rPr lang="en-GB" dirty="0"/>
+              <a:t>2 Types of While</a:t>
+            </a:r>
+          </a:p>
+          <a:p>
+            <a:pPr marL="342900" indent="-342900">
+              <a:buFontTx/>
+              <a:buChar char="-"/>
+            </a:pPr>
+            <a:r>
+              <a:rPr lang="en-GB" dirty="0"/>
+              <a:t>End – 11:15</a:t>
+            </a:r>
+          </a:p>
+          <a:p>
+            <a:pPr marL="342900" indent="-342900">
+              <a:buFontTx/>
+              <a:buChar char="-"/>
+            </a:pPr>
+            <a:endParaRPr dirty="0"/>
+          </a:p>
+        </p:txBody>
+      </p:sp>
+    </p:spTree>
+  </p:cSld>
+  <p:clrMapOvr>
+    <a:masterClrMapping/>
+  </p:clrMapOvr>
+</p:notes>
+</file>
+
+<file path=ppt/notesSlides/notesSlide11.xml><?xml version="1.0" encoding="utf-8"?>
+<p:notes xmlns:a="http://schemas.openxmlformats.org/drawingml/2006/main" xmlns:r="http://schemas.openxmlformats.org/officeDocument/2006/relationships" xmlns:p="http://schemas.openxmlformats.org/presentationml/2006/main">
+  <p:cSld>
+    <p:spTree>
+      <p:nvGrpSpPr>
+        <p:cNvPr id="1" name=""/>
+        <p:cNvGrpSpPr/>
+        <p:nvPr/>
+      </p:nvGrpSpPr>
+      <p:grpSpPr>
+        <a:xfrm>
+          <a:off x="0" y="0"/>
+          <a:ext cx="0" cy="0"/>
+          <a:chOff x="0" y="0"/>
+          <a:chExt cx="0" cy="0"/>
+        </a:xfrm>
+      </p:grpSpPr>
+      <p:sp>
+        <p:nvSpPr>
           <p:cNvPr id="210" name="Shape 210"/>
           <p:cNvSpPr>
             <a:spLocks noGrp="1" noRot="1" noChangeAspect="1"/>
@@ -660,7 +760,7 @@
 </p:notes>
 </file>
 
-<file path=ppt/notesSlides/notesSlide11.xml><?xml version="1.0" encoding="utf-8"?>
+<file path=ppt/notesSlides/notesSlide12.xml><?xml version="1.0" encoding="utf-8"?>
 <p:notes xmlns:a="http://schemas.openxmlformats.org/drawingml/2006/main" xmlns:r="http://schemas.openxmlformats.org/officeDocument/2006/relationships" xmlns:p="http://schemas.openxmlformats.org/presentationml/2006/main">
   <p:cSld>
     <p:spTree>
@@ -729,7 +829,7 @@
 </p:notes>
 </file>
 
-<file path=ppt/notesSlides/notesSlide12.xml><?xml version="1.0" encoding="utf-8"?>
+<file path=ppt/notesSlides/notesSlide13.xml><?xml version="1.0" encoding="utf-8"?>
 <p:notes xmlns:a="http://schemas.openxmlformats.org/drawingml/2006/main" xmlns:r="http://schemas.openxmlformats.org/officeDocument/2006/relationships" xmlns:p="http://schemas.openxmlformats.org/presentationml/2006/main">
   <p:cSld>
     <p:spTree>
@@ -1039,76 +1139,7 @@
       </p:grpSpPr>
       <p:sp>
         <p:nvSpPr>
-          <p:cNvPr id="2" name="Slide Image Placeholder 1"/>
-          <p:cNvSpPr>
-            <a:spLocks noGrp="1" noRot="1" noChangeAspect="1"/>
-          </p:cNvSpPr>
-          <p:nvPr>
-            <p:ph type="sldImg"/>
-          </p:nvPr>
-        </p:nvSpPr>
-        <p:spPr>
-          <a:xfrm>
-            <a:off x="381000" y="685800"/>
-            <a:ext cx="6096000" cy="3429000"/>
-          </a:xfrm>
-        </p:spPr>
-      </p:sp>
-      <p:sp>
-        <p:nvSpPr>
-          <p:cNvPr id="3" name="Notes Placeholder 2"/>
-          <p:cNvSpPr>
-            <a:spLocks noGrp="1"/>
-          </p:cNvSpPr>
-          <p:nvPr>
-            <p:ph type="body" idx="1"/>
-          </p:nvPr>
-        </p:nvSpPr>
-        <p:spPr/>
-        <p:txBody>
-          <a:bodyPr/>
-          <a:lstStyle/>
-          <a:p>
-            <a:r>
-              <a:rPr lang="en-US" dirty="0"/>
-              <a:t>End – 11:00</a:t>
-            </a:r>
-          </a:p>
-        </p:txBody>
-      </p:sp>
-    </p:spTree>
-    <p:extLst>
-      <p:ext uri="{BB962C8B-B14F-4D97-AF65-F5344CB8AC3E}">
-        <p14:creationId xmlns:p14="http://schemas.microsoft.com/office/powerpoint/2010/main" val="2842074938"/>
-      </p:ext>
-    </p:extLst>
-  </p:cSld>
-  <p:clrMapOvr>
-    <a:masterClrMapping/>
-  </p:clrMapOvr>
-</p:notes>
-</file>
-
-<file path=ppt/notesSlides/notesSlide6.xml><?xml version="1.0" encoding="utf-8"?>
-<p:notes xmlns:a="http://schemas.openxmlformats.org/drawingml/2006/main" xmlns:r="http://schemas.openxmlformats.org/officeDocument/2006/relationships" xmlns:p="http://schemas.openxmlformats.org/presentationml/2006/main">
-  <p:cSld>
-    <p:spTree>
-      <p:nvGrpSpPr>
-        <p:cNvPr id="1" name=""/>
-        <p:cNvGrpSpPr/>
-        <p:nvPr/>
-      </p:nvGrpSpPr>
-      <p:grpSpPr>
-        <a:xfrm>
-          <a:off x="0" y="0"/>
-          <a:ext cx="0" cy="0"/>
-          <a:chOff x="0" y="0"/>
-          <a:chExt cx="0" cy="0"/>
-        </a:xfrm>
-      </p:grpSpPr>
-      <p:sp>
-        <p:nvSpPr>
-          <p:cNvPr id="163" name="Shape 163"/>
+          <p:cNvPr id="210" name="Shape 210"/>
           <p:cNvSpPr>
             <a:spLocks noGrp="1" noRot="1" noChangeAspect="1"/>
           </p:cNvSpPr>
@@ -1135,110 +1166,7 @@
       </p:sp>
       <p:sp>
         <p:nvSpPr>
-          <p:cNvPr id="164" name="Shape 164"/>
-          <p:cNvSpPr>
-            <a:spLocks noGrp="1"/>
-          </p:cNvSpPr>
-          <p:nvPr>
-            <p:ph type="body" sz="quarter" idx="1"/>
-          </p:nvPr>
-        </p:nvSpPr>
-        <p:spPr>
-          <a:prstGeom prst="rect">
-            <a:avLst/>
-          </a:prstGeom>
-        </p:spPr>
-        <p:txBody>
-          <a:bodyPr/>
-          <a:lstStyle>
-            <a:lvl1pPr>
-              <a:defRPr u="sng">
-                <a:hlinkClick r:id="rId3"/>
-              </a:defRPr>
-            </a:lvl1pPr>
-          </a:lstStyle>
-          <a:p>
-            <a:pPr>
-              <a:defRPr u="none"/>
-            </a:pPr>
-            <a:r>
-              <a:rPr u="sng" dirty="0">
-                <a:hlinkClick r:id="rId3"/>
-              </a:rPr>
-              <a:t>https://filestore.aqa.org.uk/resources/computing/AQA-75162-75172-ALI.PDF</a:t>
-            </a:r>
-            <a:endParaRPr lang="en-GB" u="sng" dirty="0">
-              <a:hlinkClick r:id="rId3"/>
-            </a:endParaRPr>
-          </a:p>
-          <a:p>
-            <a:pPr>
-              <a:defRPr u="none"/>
-            </a:pPr>
-            <a:r>
-              <a:rPr lang="en-GB" u="sng" dirty="0">
-                <a:hlinkClick r:id="rId3"/>
-              </a:rPr>
-              <a:t>End – 11:00</a:t>
-            </a:r>
-          </a:p>
-        </p:txBody>
-      </p:sp>
-    </p:spTree>
-  </p:cSld>
-  <p:clrMapOvr>
-    <a:masterClrMapping/>
-  </p:clrMapOvr>
-</p:notes>
-</file>
-
-<file path=ppt/notesSlides/notesSlide7.xml><?xml version="1.0" encoding="utf-8"?>
-<p:notes xmlns:a="http://schemas.openxmlformats.org/drawingml/2006/main" xmlns:r="http://schemas.openxmlformats.org/officeDocument/2006/relationships" xmlns:p="http://schemas.openxmlformats.org/presentationml/2006/main">
-  <p:cSld>
-    <p:spTree>
-      <p:nvGrpSpPr>
-        <p:cNvPr id="1" name=""/>
-        <p:cNvGrpSpPr/>
-        <p:nvPr/>
-      </p:nvGrpSpPr>
-      <p:grpSpPr>
-        <a:xfrm>
-          <a:off x="0" y="0"/>
-          <a:ext cx="0" cy="0"/>
-          <a:chOff x="0" y="0"/>
-          <a:chExt cx="0" cy="0"/>
-        </a:xfrm>
-      </p:grpSpPr>
-      <p:sp>
-        <p:nvSpPr>
-          <p:cNvPr id="176" name="Shape 176"/>
-          <p:cNvSpPr>
-            <a:spLocks noGrp="1" noRot="1" noChangeAspect="1"/>
-          </p:cNvSpPr>
-          <p:nvPr>
-            <p:ph type="sldImg"/>
-          </p:nvPr>
-        </p:nvSpPr>
-        <p:spPr>
-          <a:xfrm>
-            <a:off x="381000" y="685800"/>
-            <a:ext cx="6096000" cy="3429000"/>
-          </a:xfrm>
-          <a:prstGeom prst="rect">
-            <a:avLst/>
-          </a:prstGeom>
-        </p:spPr>
-        <p:txBody>
-          <a:bodyPr/>
-          <a:lstStyle/>
-          <a:p>
-            <a:endParaRPr/>
-          </a:p>
-        </p:txBody>
-      </p:sp>
-      <p:sp>
-        <p:nvSpPr>
-          <p:cNvPr id="177" name="Shape 177"/>
+          <p:cNvPr id="211" name="Shape 211"/>
           <p:cNvSpPr>
             <a:spLocks noGrp="1"/>
           </p:cNvSpPr>
@@ -1257,13 +1185,18 @@
           <a:p>
             <a:r>
               <a:rPr lang="en-GB" dirty="0"/>
-              <a:t>End - 11:05</a:t>
+              <a:t>End – 11:20</a:t>
             </a:r>
             <a:endParaRPr dirty="0"/>
           </a:p>
         </p:txBody>
       </p:sp>
     </p:spTree>
+    <p:extLst>
+      <p:ext uri="{BB962C8B-B14F-4D97-AF65-F5344CB8AC3E}">
+        <p14:creationId xmlns:p14="http://schemas.microsoft.com/office/powerpoint/2010/main" val="1845828102"/>
+      </p:ext>
+    </p:extLst>
   </p:cSld>
   <p:clrMapOvr>
     <a:masterClrMapping/>
@@ -1271,7 +1204,7 @@
 </p:notes>
 </file>
 
-<file path=ppt/notesSlides/notesSlide8.xml><?xml version="1.0" encoding="utf-8"?>
+<file path=ppt/notesSlides/notesSlide6.xml><?xml version="1.0" encoding="utf-8"?>
 <p:notes xmlns:a="http://schemas.openxmlformats.org/drawingml/2006/main" xmlns:r="http://schemas.openxmlformats.org/officeDocument/2006/relationships" xmlns:p="http://schemas.openxmlformats.org/presentationml/2006/main">
   <p:cSld>
     <p:spTree>
@@ -1322,7 +1255,7 @@
           <a:p>
             <a:r>
               <a:rPr lang="en-US" dirty="0"/>
-              <a:t>End – 11:10</a:t>
+              <a:t>End – 11:00</a:t>
             </a:r>
           </a:p>
         </p:txBody>
@@ -1330,9 +1263,191 @@
     </p:spTree>
     <p:extLst>
       <p:ext uri="{BB962C8B-B14F-4D97-AF65-F5344CB8AC3E}">
-        <p14:creationId xmlns:p14="http://schemas.microsoft.com/office/powerpoint/2010/main" val="2886040463"/>
+        <p14:creationId xmlns:p14="http://schemas.microsoft.com/office/powerpoint/2010/main" val="2842074938"/>
       </p:ext>
     </p:extLst>
+  </p:cSld>
+  <p:clrMapOvr>
+    <a:masterClrMapping/>
+  </p:clrMapOvr>
+</p:notes>
+</file>
+
+<file path=ppt/notesSlides/notesSlide7.xml><?xml version="1.0" encoding="utf-8"?>
+<p:notes xmlns:a="http://schemas.openxmlformats.org/drawingml/2006/main" xmlns:r="http://schemas.openxmlformats.org/officeDocument/2006/relationships" xmlns:p="http://schemas.openxmlformats.org/presentationml/2006/main">
+  <p:cSld>
+    <p:spTree>
+      <p:nvGrpSpPr>
+        <p:cNvPr id="1" name=""/>
+        <p:cNvGrpSpPr/>
+        <p:nvPr/>
+      </p:nvGrpSpPr>
+      <p:grpSpPr>
+        <a:xfrm>
+          <a:off x="0" y="0"/>
+          <a:ext cx="0" cy="0"/>
+          <a:chOff x="0" y="0"/>
+          <a:chExt cx="0" cy="0"/>
+        </a:xfrm>
+      </p:grpSpPr>
+      <p:sp>
+        <p:nvSpPr>
+          <p:cNvPr id="163" name="Shape 163"/>
+          <p:cNvSpPr>
+            <a:spLocks noGrp="1" noRot="1" noChangeAspect="1"/>
+          </p:cNvSpPr>
+          <p:nvPr>
+            <p:ph type="sldImg"/>
+          </p:nvPr>
+        </p:nvSpPr>
+        <p:spPr>
+          <a:xfrm>
+            <a:off x="381000" y="685800"/>
+            <a:ext cx="6096000" cy="3429000"/>
+          </a:xfrm>
+          <a:prstGeom prst="rect">
+            <a:avLst/>
+          </a:prstGeom>
+        </p:spPr>
+        <p:txBody>
+          <a:bodyPr/>
+          <a:lstStyle/>
+          <a:p>
+            <a:endParaRPr/>
+          </a:p>
+        </p:txBody>
+      </p:sp>
+      <p:sp>
+        <p:nvSpPr>
+          <p:cNvPr id="164" name="Shape 164"/>
+          <p:cNvSpPr>
+            <a:spLocks noGrp="1"/>
+          </p:cNvSpPr>
+          <p:nvPr>
+            <p:ph type="body" sz="quarter" idx="1"/>
+          </p:nvPr>
+        </p:nvSpPr>
+        <p:spPr>
+          <a:prstGeom prst="rect">
+            <a:avLst/>
+          </a:prstGeom>
+        </p:spPr>
+        <p:txBody>
+          <a:bodyPr/>
+          <a:lstStyle>
+            <a:lvl1pPr>
+              <a:defRPr u="sng">
+                <a:hlinkClick r:id="rId3"/>
+              </a:defRPr>
+            </a:lvl1pPr>
+          </a:lstStyle>
+          <a:p>
+            <a:pPr>
+              <a:defRPr u="none"/>
+            </a:pPr>
+            <a:r>
+              <a:rPr u="sng" dirty="0">
+                <a:hlinkClick r:id="rId3"/>
+              </a:rPr>
+              <a:t>https://filestore.aqa.org.uk/resources/computing/AQA-75162-75172-ALI.PDF</a:t>
+            </a:r>
+            <a:endParaRPr lang="en-GB" u="sng" dirty="0">
+              <a:hlinkClick r:id="rId3"/>
+            </a:endParaRPr>
+          </a:p>
+          <a:p>
+            <a:pPr>
+              <a:defRPr u="none"/>
+            </a:pPr>
+            <a:r>
+              <a:rPr lang="en-GB" u="sng" dirty="0">
+                <a:hlinkClick r:id="rId3"/>
+              </a:rPr>
+              <a:t>End – 11:00</a:t>
+            </a:r>
+          </a:p>
+        </p:txBody>
+      </p:sp>
+    </p:spTree>
+  </p:cSld>
+  <p:clrMapOvr>
+    <a:masterClrMapping/>
+  </p:clrMapOvr>
+</p:notes>
+</file>
+
+<file path=ppt/notesSlides/notesSlide8.xml><?xml version="1.0" encoding="utf-8"?>
+<p:notes xmlns:a="http://schemas.openxmlformats.org/drawingml/2006/main" xmlns:r="http://schemas.openxmlformats.org/officeDocument/2006/relationships" xmlns:p="http://schemas.openxmlformats.org/presentationml/2006/main">
+  <p:cSld>
+    <p:spTree>
+      <p:nvGrpSpPr>
+        <p:cNvPr id="1" name=""/>
+        <p:cNvGrpSpPr/>
+        <p:nvPr/>
+      </p:nvGrpSpPr>
+      <p:grpSpPr>
+        <a:xfrm>
+          <a:off x="0" y="0"/>
+          <a:ext cx="0" cy="0"/>
+          <a:chOff x="0" y="0"/>
+          <a:chExt cx="0" cy="0"/>
+        </a:xfrm>
+      </p:grpSpPr>
+      <p:sp>
+        <p:nvSpPr>
+          <p:cNvPr id="176" name="Shape 176"/>
+          <p:cNvSpPr>
+            <a:spLocks noGrp="1" noRot="1" noChangeAspect="1"/>
+          </p:cNvSpPr>
+          <p:nvPr>
+            <p:ph type="sldImg"/>
+          </p:nvPr>
+        </p:nvSpPr>
+        <p:spPr>
+          <a:xfrm>
+            <a:off x="381000" y="685800"/>
+            <a:ext cx="6096000" cy="3429000"/>
+          </a:xfrm>
+          <a:prstGeom prst="rect">
+            <a:avLst/>
+          </a:prstGeom>
+        </p:spPr>
+        <p:txBody>
+          <a:bodyPr/>
+          <a:lstStyle/>
+          <a:p>
+            <a:endParaRPr/>
+          </a:p>
+        </p:txBody>
+      </p:sp>
+      <p:sp>
+        <p:nvSpPr>
+          <p:cNvPr id="177" name="Shape 177"/>
+          <p:cNvSpPr>
+            <a:spLocks noGrp="1"/>
+          </p:cNvSpPr>
+          <p:nvPr>
+            <p:ph type="body" sz="quarter" idx="1"/>
+          </p:nvPr>
+        </p:nvSpPr>
+        <p:spPr>
+          <a:prstGeom prst="rect">
+            <a:avLst/>
+          </a:prstGeom>
+        </p:spPr>
+        <p:txBody>
+          <a:bodyPr/>
+          <a:lstStyle/>
+          <a:p>
+            <a:r>
+              <a:rPr lang="en-GB" dirty="0"/>
+              <a:t>End - 11:05</a:t>
+            </a:r>
+            <a:endParaRPr dirty="0"/>
+          </a:p>
+        </p:txBody>
+      </p:sp>
+    </p:spTree>
   </p:cSld>
   <p:clrMapOvr>
     <a:masterClrMapping/>
@@ -1359,7 +1474,7 @@
       </p:grpSpPr>
       <p:sp>
         <p:nvSpPr>
-          <p:cNvPr id="201" name="Shape 201"/>
+          <p:cNvPr id="2" name="Slide Image Placeholder 1"/>
           <p:cNvSpPr>
             <a:spLocks noGrp="1" noRot="1" noChangeAspect="1"/>
           </p:cNvSpPr>
@@ -1372,66 +1487,36 @@
             <a:off x="381000" y="685800"/>
             <a:ext cx="6096000" cy="3429000"/>
           </a:xfrm>
-          <a:prstGeom prst="rect">
-            <a:avLst/>
-          </a:prstGeom>
         </p:spPr>
-        <p:txBody>
-          <a:bodyPr/>
-          <a:lstStyle/>
-          <a:p>
-            <a:endParaRPr/>
-          </a:p>
-        </p:txBody>
       </p:sp>
       <p:sp>
         <p:nvSpPr>
-          <p:cNvPr id="202" name="Shape 202"/>
+          <p:cNvPr id="3" name="Notes Placeholder 2"/>
           <p:cNvSpPr>
             <a:spLocks noGrp="1"/>
           </p:cNvSpPr>
           <p:nvPr>
-            <p:ph type="body" sz="quarter" idx="1"/>
+            <p:ph type="body" idx="1"/>
           </p:nvPr>
         </p:nvSpPr>
-        <p:spPr>
-          <a:prstGeom prst="rect">
-            <a:avLst/>
-          </a:prstGeom>
-        </p:spPr>
+        <p:spPr/>
         <p:txBody>
           <a:bodyPr/>
           <a:lstStyle/>
           <a:p>
-            <a:pPr marL="342900" indent="-342900">
-              <a:buFontTx/>
-              <a:buChar char="-"/>
-            </a:pPr>
             <a:r>
-              <a:rPr lang="en-GB" dirty="0"/>
-              <a:t>2 Types of While</a:t>
+              <a:rPr lang="en-US" dirty="0"/>
+              <a:t>End – 11:10</a:t>
             </a:r>
-          </a:p>
-          <a:p>
-            <a:pPr marL="342900" indent="-342900">
-              <a:buFontTx/>
-              <a:buChar char="-"/>
-            </a:pPr>
-            <a:r>
-              <a:rPr lang="en-GB" dirty="0"/>
-              <a:t>End – 11:15</a:t>
-            </a:r>
-          </a:p>
-          <a:p>
-            <a:pPr marL="342900" indent="-342900">
-              <a:buFontTx/>
-              <a:buChar char="-"/>
-            </a:pPr>
-            <a:endParaRPr dirty="0"/>
           </a:p>
         </p:txBody>
       </p:sp>
     </p:spTree>
+    <p:extLst>
+      <p:ext uri="{BB962C8B-B14F-4D97-AF65-F5344CB8AC3E}">
+        <p14:creationId xmlns:p14="http://schemas.microsoft.com/office/powerpoint/2010/main" val="2886040463"/>
+      </p:ext>
+    </p:extLst>
   </p:cSld>
   <p:clrMapOvr>
     <a:masterClrMapping/>
@@ -5225,6 +5310,949 @@
       </p:grpSpPr>
       <p:sp>
         <p:nvSpPr>
+          <p:cNvPr id="186" name="WHILE  LOOPS"/>
+          <p:cNvSpPr txBox="1">
+            <a:spLocks noGrp="1"/>
+          </p:cNvSpPr>
+          <p:nvPr>
+            <p:ph type="title"/>
+          </p:nvPr>
+        </p:nvSpPr>
+        <p:spPr>
+          <a:prstGeom prst="rect">
+            <a:avLst/>
+          </a:prstGeom>
+        </p:spPr>
+        <p:txBody>
+          <a:bodyPr/>
+          <a:lstStyle/>
+          <a:p>
+            <a:r>
+              <a:rPr b="1" dirty="0"/>
+              <a:t>WHILE  LOOPS</a:t>
+            </a:r>
+          </a:p>
+        </p:txBody>
+      </p:sp>
+      <p:sp>
+        <p:nvSpPr>
+          <p:cNvPr id="187" name="Rounded Rectangle"/>
+          <p:cNvSpPr/>
+          <p:nvPr/>
+        </p:nvSpPr>
+        <p:spPr>
+          <a:xfrm>
+            <a:off x="1495804" y="3384668"/>
+            <a:ext cx="10833724" cy="8898465"/>
+          </a:xfrm>
+          <a:prstGeom prst="roundRect">
+            <a:avLst>
+              <a:gd name="adj" fmla="val 11402"/>
+            </a:avLst>
+          </a:prstGeom>
+          <a:solidFill>
+            <a:schemeClr val="accent4"/>
+          </a:solidFill>
+          <a:ln w="12700">
+            <a:miter lim="400000"/>
+          </a:ln>
+        </p:spPr>
+        <p:txBody>
+          <a:bodyPr lIns="50800" tIns="50800" rIns="50800" bIns="50800" anchor="ctr"/>
+          <a:lstStyle/>
+          <a:p>
+            <a:pPr>
+              <a:lnSpc>
+                <a:spcPct val="120000"/>
+              </a:lnSpc>
+              <a:defRPr sz="3000" cap="all">
+                <a:latin typeface="Proxima Nova Extrabold"/>
+                <a:ea typeface="Proxima Nova Extrabold"/>
+                <a:cs typeface="Proxima Nova Extrabold"/>
+                <a:sym typeface="Proxima Nova Extrabold"/>
+              </a:defRPr>
+            </a:pPr>
+            <a:endParaRPr/>
+          </a:p>
+        </p:txBody>
+      </p:sp>
+      <p:sp>
+        <p:nvSpPr>
+          <p:cNvPr id="189" name="while ...:…"/>
+          <p:cNvSpPr txBox="1"/>
+          <p:nvPr/>
+        </p:nvSpPr>
+        <p:spPr>
+          <a:xfrm>
+            <a:off x="4082551" y="4036381"/>
+            <a:ext cx="5601519" cy="1701801"/>
+          </a:xfrm>
+          <a:prstGeom prst="rect">
+            <a:avLst/>
+          </a:prstGeom>
+          <a:ln w="12700">
+            <a:miter lim="400000"/>
+          </a:ln>
+          <a:extLst>
+            <a:ext uri="{C572A759-6A51-4108-AA02-DFA0A04FC94B}">
+              <ma14:wrappingTextBoxFlag xmlns="" xmlns:m="http://schemas.openxmlformats.org/officeDocument/2006/math" xmlns:a14="http://schemas.microsoft.com/office/drawing/2010/main" xmlns:ma14="http://schemas.microsoft.com/office/mac/drawingml/2011/main" val="1"/>
+            </a:ext>
+          </a:extLst>
+        </p:spPr>
+        <p:txBody>
+          <a:bodyPr wrap="none" lIns="50800" tIns="50800" rIns="50800" bIns="50800" anchor="ctr">
+            <a:spAutoFit/>
+          </a:bodyPr>
+          <a:lstStyle>
+            <a:lvl1pPr algn="l">
+              <a:defRPr sz="5500" b="1">
+                <a:latin typeface="Courier New"/>
+                <a:ea typeface="Courier New"/>
+                <a:cs typeface="Courier New"/>
+                <a:sym typeface="Courier New"/>
+              </a:defRPr>
+            </a:lvl1pPr>
+            <a:lvl2pPr algn="l">
+              <a:defRPr sz="5500" b="1">
+                <a:latin typeface="Courier New"/>
+                <a:ea typeface="Courier New"/>
+                <a:cs typeface="Courier New"/>
+                <a:sym typeface="Courier New"/>
+              </a:defRPr>
+            </a:lvl2pPr>
+          </a:lstStyle>
+          <a:p>
+            <a:r>
+              <a:rPr dirty="0"/>
+              <a:t>while ...:</a:t>
+            </a:r>
+          </a:p>
+          <a:p>
+            <a:pPr lvl="1"/>
+            <a:r>
+              <a:rPr dirty="0"/>
+              <a:t># INNER CODE</a:t>
+            </a:r>
+          </a:p>
+        </p:txBody>
+      </p:sp>
+      <p:sp>
+        <p:nvSpPr>
+          <p:cNvPr id="191" name="Rounded Rectangle"/>
+          <p:cNvSpPr/>
+          <p:nvPr/>
+        </p:nvSpPr>
+        <p:spPr>
+          <a:xfrm>
+            <a:off x="13093177" y="3384668"/>
+            <a:ext cx="9761020" cy="8898465"/>
+          </a:xfrm>
+          <a:prstGeom prst="roundRect">
+            <a:avLst>
+              <a:gd name="adj" fmla="val 11402"/>
+            </a:avLst>
+          </a:prstGeom>
+          <a:solidFill>
+            <a:schemeClr val="accent4"/>
+          </a:solidFill>
+          <a:ln w="12700">
+            <a:miter lim="400000"/>
+          </a:ln>
+        </p:spPr>
+        <p:txBody>
+          <a:bodyPr lIns="50800" tIns="50800" rIns="50800" bIns="50800" anchor="ctr"/>
+          <a:lstStyle/>
+          <a:p>
+            <a:pPr>
+              <a:lnSpc>
+                <a:spcPct val="120000"/>
+              </a:lnSpc>
+              <a:defRPr sz="3000" cap="all">
+                <a:latin typeface="Proxima Nova Extrabold"/>
+                <a:ea typeface="Proxima Nova Extrabold"/>
+                <a:cs typeface="Proxima Nova Extrabold"/>
+                <a:sym typeface="Proxima Nova Extrabold"/>
+              </a:defRPr>
+            </a:pPr>
+            <a:endParaRPr/>
+          </a:p>
+        </p:txBody>
+      </p:sp>
+      <p:sp>
+        <p:nvSpPr>
+          <p:cNvPr id="192" name="while ...:…"/>
+          <p:cNvSpPr txBox="1"/>
+          <p:nvPr/>
+        </p:nvSpPr>
+        <p:spPr>
+          <a:xfrm>
+            <a:off x="15412505" y="4036381"/>
+            <a:ext cx="5601520" cy="1701801"/>
+          </a:xfrm>
+          <a:prstGeom prst="rect">
+            <a:avLst/>
+          </a:prstGeom>
+          <a:ln w="12700">
+            <a:miter lim="400000"/>
+          </a:ln>
+          <a:extLst>
+            <a:ext uri="{C572A759-6A51-4108-AA02-DFA0A04FC94B}">
+              <ma14:wrappingTextBoxFlag xmlns="" xmlns:m="http://schemas.openxmlformats.org/officeDocument/2006/math" xmlns:a14="http://schemas.microsoft.com/office/drawing/2010/main" xmlns:ma14="http://schemas.microsoft.com/office/mac/drawingml/2011/main" val="1"/>
+            </a:ext>
+          </a:extLst>
+        </p:spPr>
+        <p:txBody>
+          <a:bodyPr wrap="none" lIns="50800" tIns="50800" rIns="50800" bIns="50800" anchor="ctr">
+            <a:spAutoFit/>
+          </a:bodyPr>
+          <a:lstStyle>
+            <a:lvl1pPr algn="l">
+              <a:defRPr sz="5500" b="1">
+                <a:latin typeface="Courier New"/>
+                <a:ea typeface="Courier New"/>
+                <a:cs typeface="Courier New"/>
+                <a:sym typeface="Courier New"/>
+              </a:defRPr>
+            </a:lvl1pPr>
+            <a:lvl2pPr algn="l">
+              <a:defRPr sz="5500" b="1">
+                <a:latin typeface="Courier New"/>
+                <a:ea typeface="Courier New"/>
+                <a:cs typeface="Courier New"/>
+                <a:sym typeface="Courier New"/>
+              </a:defRPr>
+            </a:lvl2pPr>
+          </a:lstStyle>
+          <a:p>
+            <a:r>
+              <a:t>while ...:</a:t>
+            </a:r>
+          </a:p>
+          <a:p>
+            <a:pPr lvl="1"/>
+            <a:r>
+              <a:t># INNER CODE</a:t>
+            </a:r>
+          </a:p>
+        </p:txBody>
+      </p:sp>
+      <p:grpSp>
+        <p:nvGrpSpPr>
+          <p:cNvPr id="2" name="Group 1">
+            <a:extLst>
+              <a:ext uri="{FF2B5EF4-FFF2-40B4-BE49-F238E27FC236}">
+                <a16:creationId xmlns:a16="http://schemas.microsoft.com/office/drawing/2014/main" id="{5DE65689-2608-4718-1F4A-EE6DD32218EC}"/>
+              </a:ext>
+            </a:extLst>
+          </p:cNvPr>
+          <p:cNvGrpSpPr/>
+          <p:nvPr/>
+        </p:nvGrpSpPr>
+        <p:grpSpPr>
+          <a:xfrm>
+            <a:off x="1727638" y="6841679"/>
+            <a:ext cx="10249898" cy="4635501"/>
+            <a:chOff x="1727638" y="6841679"/>
+            <a:chExt cx="10249898" cy="4635501"/>
+          </a:xfrm>
+        </p:grpSpPr>
+        <p:sp>
+          <p:nvSpPr>
+            <p:cNvPr id="188" name="loopStart:…"/>
+            <p:cNvSpPr txBox="1"/>
+            <p:nvPr/>
+          </p:nvSpPr>
+          <p:spPr>
+            <a:xfrm>
+              <a:off x="2339968" y="6841679"/>
+              <a:ext cx="9145396" cy="4635501"/>
+            </a:xfrm>
+            <a:prstGeom prst="rect">
+              <a:avLst/>
+            </a:prstGeom>
+            <a:ln w="12700">
+              <a:miter lim="400000"/>
+            </a:ln>
+            <a:extLst>
+              <a:ext uri="{C572A759-6A51-4108-AA02-DFA0A04FC94B}">
+                <ma14:wrappingTextBoxFlag xmlns="" xmlns:m="http://schemas.openxmlformats.org/officeDocument/2006/math" xmlns:a14="http://schemas.microsoft.com/office/drawing/2010/main" xmlns:ma14="http://schemas.microsoft.com/office/mac/drawingml/2011/main" val="1"/>
+              </a:ext>
+            </a:extLst>
+          </p:spPr>
+          <p:txBody>
+            <a:bodyPr wrap="none" lIns="50800" tIns="50800" rIns="50800" bIns="50800" anchor="ctr">
+              <a:spAutoFit/>
+            </a:bodyPr>
+            <a:lstStyle/>
+            <a:p>
+              <a:pPr algn="l">
+                <a:defRPr sz="4500" b="1">
+                  <a:latin typeface="Courier New"/>
+                  <a:ea typeface="Courier New"/>
+                  <a:cs typeface="Courier New"/>
+                  <a:sym typeface="Courier New"/>
+                </a:defRPr>
+              </a:pPr>
+              <a:r>
+                <a:rPr dirty="0" err="1"/>
+                <a:t>loopStart</a:t>
+              </a:r>
+              <a:r>
+                <a:rPr dirty="0"/>
+                <a:t>:</a:t>
+              </a:r>
+            </a:p>
+            <a:p>
+              <a:pPr lvl="1" algn="l">
+                <a:defRPr sz="4500" b="1">
+                  <a:latin typeface="Courier New"/>
+                  <a:ea typeface="Courier New"/>
+                  <a:cs typeface="Courier New"/>
+                  <a:sym typeface="Courier New"/>
+                </a:defRPr>
+              </a:pPr>
+              <a:r>
+                <a:rPr dirty="0"/>
+                <a:t>CMP ...</a:t>
+              </a:r>
+            </a:p>
+            <a:p>
+              <a:pPr lvl="1" algn="l">
+                <a:defRPr sz="4500" b="1">
+                  <a:latin typeface="Courier New"/>
+                  <a:ea typeface="Courier New"/>
+                  <a:cs typeface="Courier New"/>
+                  <a:sym typeface="Courier New"/>
+                </a:defRPr>
+              </a:pPr>
+              <a:r>
+                <a:rPr dirty="0"/>
+                <a:t>B&lt;NOT Condition&gt; </a:t>
+              </a:r>
+              <a:r>
+                <a:rPr dirty="0" err="1"/>
+                <a:t>loopDone</a:t>
+              </a:r>
+              <a:endParaRPr dirty="0"/>
+            </a:p>
+            <a:p>
+              <a:pPr lvl="1" algn="l">
+                <a:defRPr sz="4500" b="1">
+                  <a:latin typeface="Courier New"/>
+                  <a:ea typeface="Courier New"/>
+                  <a:cs typeface="Courier New"/>
+                  <a:sym typeface="Courier New"/>
+                </a:defRPr>
+              </a:pPr>
+              <a:r>
+                <a:rPr dirty="0"/>
+                <a:t># Inner Code</a:t>
+              </a:r>
+            </a:p>
+            <a:p>
+              <a:pPr lvl="1" algn="l">
+                <a:defRPr sz="4500" b="1">
+                  <a:latin typeface="Courier New"/>
+                  <a:ea typeface="Courier New"/>
+                  <a:cs typeface="Courier New"/>
+                  <a:sym typeface="Courier New"/>
+                </a:defRPr>
+              </a:pPr>
+              <a:r>
+                <a:rPr dirty="0"/>
+                <a:t>B </a:t>
+              </a:r>
+              <a:r>
+                <a:rPr dirty="0" err="1"/>
+                <a:t>loopStart</a:t>
+              </a:r>
+              <a:endParaRPr dirty="0"/>
+            </a:p>
+            <a:p>
+              <a:pPr algn="l">
+                <a:defRPr sz="4500" b="1">
+                  <a:latin typeface="Courier New"/>
+                  <a:ea typeface="Courier New"/>
+                  <a:cs typeface="Courier New"/>
+                  <a:sym typeface="Courier New"/>
+                </a:defRPr>
+              </a:pPr>
+              <a:r>
+                <a:rPr dirty="0" err="1"/>
+                <a:t>loopDone</a:t>
+              </a:r>
+              <a:r>
+                <a:rPr dirty="0"/>
+                <a:t>:</a:t>
+              </a:r>
+            </a:p>
+            <a:p>
+              <a:pPr lvl="1" algn="l">
+                <a:defRPr sz="4500" b="1">
+                  <a:latin typeface="Courier New"/>
+                  <a:ea typeface="Courier New"/>
+                  <a:cs typeface="Courier New"/>
+                  <a:sym typeface="Courier New"/>
+                </a:defRPr>
+              </a:pPr>
+              <a:r>
+                <a:rPr dirty="0"/>
+                <a:t># After</a:t>
+              </a:r>
+            </a:p>
+          </p:txBody>
+        </p:sp>
+        <p:sp>
+          <p:nvSpPr>
+            <p:cNvPr id="197" name="Connection Line"/>
+            <p:cNvSpPr/>
+            <p:nvPr/>
+          </p:nvSpPr>
+          <p:spPr>
+            <a:xfrm>
+              <a:off x="1727638" y="8492187"/>
+              <a:ext cx="1044041" cy="1929768"/>
+            </a:xfrm>
+            <a:custGeom>
+              <a:avLst/>
+              <a:gdLst/>
+              <a:ahLst/>
+              <a:cxnLst>
+                <a:cxn ang="0">
+                  <a:pos x="wd2" y="hd2"/>
+                </a:cxn>
+                <a:cxn ang="5400000">
+                  <a:pos x="wd2" y="hd2"/>
+                </a:cxn>
+                <a:cxn ang="10800000">
+                  <a:pos x="wd2" y="hd2"/>
+                </a:cxn>
+                <a:cxn ang="16200000">
+                  <a:pos x="wd2" y="hd2"/>
+                </a:cxn>
+              </a:cxnLst>
+              <a:rect l="0" t="0" r="r" b="b"/>
+              <a:pathLst>
+                <a:path w="16532" h="21600" extrusionOk="0">
+                  <a:moveTo>
+                    <a:pt x="16532" y="0"/>
+                  </a:moveTo>
+                  <a:cubicBezTo>
+                    <a:pt x="-2387" y="3818"/>
+                    <a:pt x="-5068" y="11018"/>
+                    <a:pt x="8488" y="21600"/>
+                  </a:cubicBezTo>
+                </a:path>
+              </a:pathLst>
+            </a:custGeom>
+            <a:ln w="101600">
+              <a:solidFill>
+                <a:schemeClr val="accent5"/>
+              </a:solidFill>
+              <a:miter lim="400000"/>
+              <a:tailEnd type="triangle"/>
+            </a:ln>
+          </p:spPr>
+          <p:txBody>
+            <a:bodyPr/>
+            <a:lstStyle/>
+            <a:p>
+              <a:endParaRPr/>
+            </a:p>
+          </p:txBody>
+        </p:sp>
+        <p:sp>
+          <p:nvSpPr>
+            <p:cNvPr id="198" name="Connection Line"/>
+            <p:cNvSpPr/>
+            <p:nvPr/>
+          </p:nvSpPr>
+          <p:spPr>
+            <a:xfrm>
+              <a:off x="6273800" y="7188200"/>
+              <a:ext cx="5703736" cy="2575178"/>
+            </a:xfrm>
+            <a:custGeom>
+              <a:avLst/>
+              <a:gdLst/>
+              <a:ahLst/>
+              <a:cxnLst>
+                <a:cxn ang="0">
+                  <a:pos x="wd2" y="hd2"/>
+                </a:cxn>
+                <a:cxn ang="5400000">
+                  <a:pos x="wd2" y="hd2"/>
+                </a:cxn>
+                <a:cxn ang="10800000">
+                  <a:pos x="wd2" y="hd2"/>
+                </a:cxn>
+                <a:cxn ang="16200000">
+                  <a:pos x="wd2" y="hd2"/>
+                </a:cxn>
+              </a:cxnLst>
+              <a:rect l="0" t="0" r="r" b="b"/>
+              <a:pathLst>
+                <a:path w="16228" h="21600" extrusionOk="0">
+                  <a:moveTo>
+                    <a:pt x="2565" y="21600"/>
+                  </a:moveTo>
+                  <a:cubicBezTo>
+                    <a:pt x="21600" y="14702"/>
+                    <a:pt x="20745" y="7502"/>
+                    <a:pt x="0" y="0"/>
+                  </a:cubicBezTo>
+                </a:path>
+              </a:pathLst>
+            </a:custGeom>
+            <a:ln w="101600">
+              <a:solidFill>
+                <a:schemeClr val="accent2">
+                  <a:hueOff val="312616"/>
+                  <a:satOff val="21048"/>
+                  <a:lumOff val="-29411"/>
+                </a:schemeClr>
+              </a:solidFill>
+              <a:miter lim="400000"/>
+              <a:tailEnd type="triangle"/>
+            </a:ln>
+          </p:spPr>
+          <p:txBody>
+            <a:bodyPr/>
+            <a:lstStyle/>
+            <a:p>
+              <a:endParaRPr/>
+            </a:p>
+          </p:txBody>
+        </p:sp>
+      </p:grpSp>
+      <p:grpSp>
+        <p:nvGrpSpPr>
+          <p:cNvPr id="3" name="Group 2">
+            <a:extLst>
+              <a:ext uri="{FF2B5EF4-FFF2-40B4-BE49-F238E27FC236}">
+                <a16:creationId xmlns:a16="http://schemas.microsoft.com/office/drawing/2014/main" id="{3483BA19-D589-517A-4E0A-3A81FCA7F798}"/>
+              </a:ext>
+            </a:extLst>
+          </p:cNvPr>
+          <p:cNvGrpSpPr/>
+          <p:nvPr/>
+        </p:nvGrpSpPr>
+        <p:grpSpPr>
+          <a:xfrm>
+            <a:off x="13730253" y="6841679"/>
+            <a:ext cx="8796349" cy="4635501"/>
+            <a:chOff x="13730253" y="6841679"/>
+            <a:chExt cx="8796349" cy="4635501"/>
+          </a:xfrm>
+        </p:grpSpPr>
+        <p:sp>
+          <p:nvSpPr>
+            <p:cNvPr id="194" name="B test…"/>
+            <p:cNvSpPr txBox="1"/>
+            <p:nvPr/>
+          </p:nvSpPr>
+          <p:spPr>
+            <a:xfrm>
+              <a:off x="14497956" y="6841679"/>
+              <a:ext cx="7430618" cy="4635501"/>
+            </a:xfrm>
+            <a:prstGeom prst="rect">
+              <a:avLst/>
+            </a:prstGeom>
+            <a:ln w="12700">
+              <a:miter lim="400000"/>
+            </a:ln>
+            <a:extLst>
+              <a:ext uri="{C572A759-6A51-4108-AA02-DFA0A04FC94B}">
+                <ma14:wrappingTextBoxFlag xmlns="" xmlns:m="http://schemas.openxmlformats.org/officeDocument/2006/math" xmlns:a14="http://schemas.microsoft.com/office/drawing/2010/main" xmlns:ma14="http://schemas.microsoft.com/office/mac/drawingml/2011/main" val="1"/>
+              </a:ext>
+            </a:extLst>
+          </p:spPr>
+          <p:txBody>
+            <a:bodyPr wrap="none" lIns="50800" tIns="50800" rIns="50800" bIns="50800" anchor="ctr">
+              <a:spAutoFit/>
+            </a:bodyPr>
+            <a:lstStyle/>
+            <a:p>
+              <a:pPr lvl="1" algn="l">
+                <a:defRPr sz="4500" b="1">
+                  <a:latin typeface="Courier New"/>
+                  <a:ea typeface="Courier New"/>
+                  <a:cs typeface="Courier New"/>
+                  <a:sym typeface="Courier New"/>
+                </a:defRPr>
+              </a:pPr>
+              <a:r>
+                <a:rPr dirty="0"/>
+                <a:t>B test</a:t>
+              </a:r>
+            </a:p>
+            <a:p>
+              <a:pPr algn="l">
+                <a:defRPr sz="4500" b="1">
+                  <a:latin typeface="Courier New"/>
+                  <a:ea typeface="Courier New"/>
+                  <a:cs typeface="Courier New"/>
+                  <a:sym typeface="Courier New"/>
+                </a:defRPr>
+              </a:pPr>
+              <a:r>
+                <a:rPr dirty="0" err="1"/>
+                <a:t>loopTop</a:t>
+              </a:r>
+              <a:r>
+                <a:rPr dirty="0"/>
+                <a:t>:</a:t>
+              </a:r>
+            </a:p>
+            <a:p>
+              <a:pPr lvl="1" algn="l">
+                <a:defRPr sz="4500" b="1">
+                  <a:latin typeface="Courier New"/>
+                  <a:ea typeface="Courier New"/>
+                  <a:cs typeface="Courier New"/>
+                  <a:sym typeface="Courier New"/>
+                </a:defRPr>
+              </a:pPr>
+              <a:r>
+                <a:rPr dirty="0"/>
+                <a:t># Inner Code</a:t>
+              </a:r>
+            </a:p>
+            <a:p>
+              <a:pPr algn="l">
+                <a:defRPr sz="4500" b="1">
+                  <a:latin typeface="Courier New"/>
+                  <a:ea typeface="Courier New"/>
+                  <a:cs typeface="Courier New"/>
+                  <a:sym typeface="Courier New"/>
+                </a:defRPr>
+              </a:pPr>
+              <a:r>
+                <a:rPr dirty="0"/>
+                <a:t>test:</a:t>
+              </a:r>
+            </a:p>
+            <a:p>
+              <a:pPr lvl="1" algn="l">
+                <a:defRPr sz="4500" b="1">
+                  <a:latin typeface="Courier New"/>
+                  <a:ea typeface="Courier New"/>
+                  <a:cs typeface="Courier New"/>
+                  <a:sym typeface="Courier New"/>
+                </a:defRPr>
+              </a:pPr>
+              <a:r>
+                <a:rPr dirty="0"/>
+                <a:t>CMP …</a:t>
+              </a:r>
+            </a:p>
+            <a:p>
+              <a:pPr lvl="1" algn="l">
+                <a:defRPr sz="4500" b="1">
+                  <a:latin typeface="Courier New"/>
+                  <a:ea typeface="Courier New"/>
+                  <a:cs typeface="Courier New"/>
+                  <a:sym typeface="Courier New"/>
+                </a:defRPr>
+              </a:pPr>
+              <a:r>
+                <a:rPr dirty="0"/>
+                <a:t>B&lt;Condition&gt; </a:t>
+              </a:r>
+              <a:r>
+                <a:rPr dirty="0" err="1"/>
+                <a:t>loopTop</a:t>
+              </a:r>
+              <a:endParaRPr dirty="0"/>
+            </a:p>
+            <a:p>
+              <a:pPr lvl="1" algn="l">
+                <a:defRPr sz="4500" b="1">
+                  <a:latin typeface="Courier New"/>
+                  <a:ea typeface="Courier New"/>
+                  <a:cs typeface="Courier New"/>
+                  <a:sym typeface="Courier New"/>
+                </a:defRPr>
+              </a:pPr>
+              <a:r>
+                <a:rPr dirty="0"/>
+                <a:t># After Code</a:t>
+              </a:r>
+            </a:p>
+          </p:txBody>
+        </p:sp>
+        <p:sp>
+          <p:nvSpPr>
+            <p:cNvPr id="199" name="Connection Line"/>
+            <p:cNvSpPr/>
+            <p:nvPr/>
+          </p:nvSpPr>
+          <p:spPr>
+            <a:xfrm>
+              <a:off x="13730253" y="7201968"/>
+              <a:ext cx="973778" cy="2031369"/>
+            </a:xfrm>
+            <a:custGeom>
+              <a:avLst/>
+              <a:gdLst/>
+              <a:ahLst/>
+              <a:cxnLst>
+                <a:cxn ang="0">
+                  <a:pos x="wd2" y="hd2"/>
+                </a:cxn>
+                <a:cxn ang="5400000">
+                  <a:pos x="wd2" y="hd2"/>
+                </a:cxn>
+                <a:cxn ang="10800000">
+                  <a:pos x="wd2" y="hd2"/>
+                </a:cxn>
+                <a:cxn ang="16200000">
+                  <a:pos x="wd2" y="hd2"/>
+                </a:cxn>
+              </a:cxnLst>
+              <a:rect l="0" t="0" r="r" b="b"/>
+              <a:pathLst>
+                <a:path w="16430" h="21600" extrusionOk="0">
+                  <a:moveTo>
+                    <a:pt x="16430" y="0"/>
+                  </a:moveTo>
+                  <a:cubicBezTo>
+                    <a:pt x="-2884" y="5572"/>
+                    <a:pt x="-5170" y="12772"/>
+                    <a:pt x="9573" y="21600"/>
+                  </a:cubicBezTo>
+                </a:path>
+              </a:pathLst>
+            </a:custGeom>
+            <a:ln w="101600">
+              <a:solidFill>
+                <a:schemeClr val="accent5"/>
+              </a:solidFill>
+              <a:miter lim="400000"/>
+              <a:tailEnd type="triangle"/>
+            </a:ln>
+          </p:spPr>
+          <p:txBody>
+            <a:bodyPr/>
+            <a:lstStyle/>
+            <a:p>
+              <a:endParaRPr/>
+            </a:p>
+          </p:txBody>
+        </p:sp>
+        <p:sp>
+          <p:nvSpPr>
+            <p:cNvPr id="200" name="Connection Line"/>
+            <p:cNvSpPr/>
+            <p:nvPr/>
+          </p:nvSpPr>
+          <p:spPr>
+            <a:xfrm>
+              <a:off x="17526000" y="7874000"/>
+              <a:ext cx="5000602" cy="2586921"/>
+            </a:xfrm>
+            <a:custGeom>
+              <a:avLst/>
+              <a:gdLst/>
+              <a:ahLst/>
+              <a:cxnLst>
+                <a:cxn ang="0">
+                  <a:pos x="wd2" y="hd2"/>
+                </a:cxn>
+                <a:cxn ang="5400000">
+                  <a:pos x="wd2" y="hd2"/>
+                </a:cxn>
+                <a:cxn ang="10800000">
+                  <a:pos x="wd2" y="hd2"/>
+                </a:cxn>
+                <a:cxn ang="16200000">
+                  <a:pos x="wd2" y="hd2"/>
+                </a:cxn>
+              </a:cxnLst>
+              <a:rect l="0" t="0" r="r" b="b"/>
+              <a:pathLst>
+                <a:path w="18362" h="21600" extrusionOk="0">
+                  <a:moveTo>
+                    <a:pt x="16555" y="21600"/>
+                  </a:moveTo>
+                  <a:cubicBezTo>
+                    <a:pt x="21600" y="13036"/>
+                    <a:pt x="16082" y="5836"/>
+                    <a:pt x="0" y="0"/>
+                  </a:cubicBezTo>
+                </a:path>
+              </a:pathLst>
+            </a:custGeom>
+            <a:ln w="101600">
+              <a:solidFill>
+                <a:schemeClr val="accent2">
+                  <a:hueOff val="312616"/>
+                  <a:satOff val="21048"/>
+                  <a:lumOff val="-29411"/>
+                </a:schemeClr>
+              </a:solidFill>
+              <a:miter lim="400000"/>
+              <a:tailEnd type="triangle"/>
+            </a:ln>
+          </p:spPr>
+          <p:txBody>
+            <a:bodyPr/>
+            <a:lstStyle/>
+            <a:p>
+              <a:endParaRPr/>
+            </a:p>
+          </p:txBody>
+        </p:sp>
+      </p:grpSp>
+    </p:spTree>
+  </p:cSld>
+  <p:clrMapOvr>
+    <a:masterClrMapping/>
+  </p:clrMapOvr>
+  <p:transition spd="med"/>
+  <p:timing>
+    <p:tnLst>
+      <p:par>
+        <p:cTn id="1" dur="indefinite" restart="never" nodeType="tmRoot">
+          <p:childTnLst>
+            <p:seq concurrent="1" nextAc="seek">
+              <p:cTn id="2" dur="indefinite" nodeType="mainSeq">
+                <p:childTnLst>
+                  <p:par>
+                    <p:cTn id="3" fill="hold">
+                      <p:stCondLst>
+                        <p:cond delay="indefinite"/>
+                      </p:stCondLst>
+                      <p:childTnLst>
+                        <p:par>
+                          <p:cTn id="4" fill="hold">
+                            <p:stCondLst>
+                              <p:cond delay="0"/>
+                            </p:stCondLst>
+                            <p:childTnLst>
+                              <p:par>
+                                <p:cTn id="5" presetID="1" presetClass="entr" presetSubtype="0" fill="hold" nodeType="clickEffect">
+                                  <p:stCondLst>
+                                    <p:cond delay="0"/>
+                                  </p:stCondLst>
+                                  <p:childTnLst>
+                                    <p:set>
+                                      <p:cBhvr>
+                                        <p:cTn id="6" dur="1" fill="hold">
+                                          <p:stCondLst>
+                                            <p:cond delay="0"/>
+                                          </p:stCondLst>
+                                        </p:cTn>
+                                        <p:tgtEl>
+                                          <p:spTgt spid="2"/>
+                                        </p:tgtEl>
+                                        <p:attrNameLst>
+                                          <p:attrName>style.visibility</p:attrName>
+                                        </p:attrNameLst>
+                                      </p:cBhvr>
+                                      <p:to>
+                                        <p:strVal val="visible"/>
+                                      </p:to>
+                                    </p:set>
+                                  </p:childTnLst>
+                                </p:cTn>
+                              </p:par>
+                            </p:childTnLst>
+                          </p:cTn>
+                        </p:par>
+                      </p:childTnLst>
+                    </p:cTn>
+                  </p:par>
+                  <p:par>
+                    <p:cTn id="7" fill="hold">
+                      <p:stCondLst>
+                        <p:cond delay="indefinite"/>
+                      </p:stCondLst>
+                      <p:childTnLst>
+                        <p:par>
+                          <p:cTn id="8" fill="hold">
+                            <p:stCondLst>
+                              <p:cond delay="0"/>
+                            </p:stCondLst>
+                            <p:childTnLst>
+                              <p:par>
+                                <p:cTn id="9" presetID="1" presetClass="entr" presetSubtype="0" fill="hold" nodeType="clickEffect">
+                                  <p:stCondLst>
+                                    <p:cond delay="0"/>
+                                  </p:stCondLst>
+                                  <p:childTnLst>
+                                    <p:set>
+                                      <p:cBhvr>
+                                        <p:cTn id="10" dur="1" fill="hold">
+                                          <p:stCondLst>
+                                            <p:cond delay="0"/>
+                                          </p:stCondLst>
+                                        </p:cTn>
+                                        <p:tgtEl>
+                                          <p:spTgt spid="3"/>
+                                        </p:tgtEl>
+                                        <p:attrNameLst>
+                                          <p:attrName>style.visibility</p:attrName>
+                                        </p:attrNameLst>
+                                      </p:cBhvr>
+                                      <p:to>
+                                        <p:strVal val="visible"/>
+                                      </p:to>
+                                    </p:set>
+                                  </p:childTnLst>
+                                </p:cTn>
+                              </p:par>
+                            </p:childTnLst>
+                          </p:cTn>
+                        </p:par>
+                      </p:childTnLst>
+                    </p:cTn>
+                  </p:par>
+                </p:childTnLst>
+              </p:cTn>
+              <p:prevCondLst>
+                <p:cond evt="onPrev" delay="0">
+                  <p:tgtEl>
+                    <p:sldTgt/>
+                  </p:tgtEl>
+                </p:cond>
+              </p:prevCondLst>
+              <p:nextCondLst>
+                <p:cond evt="onNext" delay="0">
+                  <p:tgtEl>
+                    <p:sldTgt/>
+                  </p:tgtEl>
+                </p:cond>
+              </p:nextCondLst>
+            </p:seq>
+          </p:childTnLst>
+        </p:cTn>
+      </p:par>
+    </p:tnLst>
+  </p:timing>
+</p:sld>
+</file>
+
+<file path=ppt/slides/slide11.xml><?xml version="1.0" encoding="utf-8"?>
+<p:sld xmlns:a="http://schemas.openxmlformats.org/drawingml/2006/main" xmlns:r="http://schemas.openxmlformats.org/officeDocument/2006/relationships" xmlns:p="http://schemas.openxmlformats.org/presentationml/2006/main">
+  <p:cSld>
+    <p:spTree>
+      <p:nvGrpSpPr>
+        <p:cNvPr id="1" name=""/>
+        <p:cNvGrpSpPr/>
+        <p:nvPr/>
+      </p:nvGrpSpPr>
+      <p:grpSpPr>
+        <a:xfrm>
+          <a:off x="0" y="0"/>
+          <a:ext cx="0" cy="0"/>
+          <a:chOff x="0" y="0"/>
+          <a:chExt cx="0" cy="0"/>
+        </a:xfrm>
+      </p:grpSpPr>
+      <p:sp>
+        <p:nvSpPr>
           <p:cNvPr id="204" name="Rounded Rectangle"/>
           <p:cNvSpPr/>
           <p:nvPr/>
@@ -5758,7 +6786,7 @@
 </p:sld>
 </file>
 
-<file path=ppt/slides/slide11.xml><?xml version="1.0" encoding="utf-8"?>
+<file path=ppt/slides/slide12.xml><?xml version="1.0" encoding="utf-8"?>
 <p:sld xmlns:a="http://schemas.openxmlformats.org/drawingml/2006/main" xmlns:r="http://schemas.openxmlformats.org/officeDocument/2006/relationships" xmlns:p="http://schemas.openxmlformats.org/presentationml/2006/main">
   <p:cSld>
     <p:spTree>
@@ -6065,7 +7093,7 @@
 </p:sld>
 </file>
 
-<file path=ppt/slides/slide12.xml><?xml version="1.0" encoding="utf-8"?>
+<file path=ppt/slides/slide13.xml><?xml version="1.0" encoding="utf-8"?>
 <p:sld xmlns:a="http://schemas.openxmlformats.org/drawingml/2006/main" xmlns:r="http://schemas.openxmlformats.org/officeDocument/2006/relationships" xmlns:p="http://schemas.openxmlformats.org/presentationml/2006/main">
   <p:cSld>
     <p:spTree>
@@ -11773,6 +12801,573 @@
           <a:chExt cx="0" cy="0"/>
         </a:xfrm>
       </p:grpSpPr>
+      <p:sp>
+        <p:nvSpPr>
+          <p:cNvPr id="204" name="Rounded Rectangle"/>
+          <p:cNvSpPr/>
+          <p:nvPr/>
+        </p:nvSpPr>
+        <p:spPr>
+          <a:xfrm>
+            <a:off x="1495804" y="3384668"/>
+            <a:ext cx="10833724" cy="8898465"/>
+          </a:xfrm>
+          <a:prstGeom prst="roundRect">
+            <a:avLst>
+              <a:gd name="adj" fmla="val 11402"/>
+            </a:avLst>
+          </a:prstGeom>
+          <a:solidFill>
+            <a:schemeClr val="accent4"/>
+          </a:solidFill>
+          <a:ln w="12700">
+            <a:miter lim="400000"/>
+          </a:ln>
+        </p:spPr>
+        <p:txBody>
+          <a:bodyPr lIns="50800" tIns="50800" rIns="50800" bIns="50800" anchor="ctr"/>
+          <a:lstStyle/>
+          <a:p>
+            <a:pPr>
+              <a:lnSpc>
+                <a:spcPct val="120000"/>
+              </a:lnSpc>
+              <a:defRPr sz="3000" cap="all">
+                <a:latin typeface="Proxima Nova Extrabold"/>
+                <a:ea typeface="Proxima Nova Extrabold"/>
+                <a:cs typeface="Proxima Nova Extrabold"/>
+                <a:sym typeface="Proxima Nova Extrabold"/>
+              </a:defRPr>
+            </a:pPr>
+            <a:endParaRPr/>
+          </a:p>
+        </p:txBody>
+      </p:sp>
+      <p:sp>
+        <p:nvSpPr>
+          <p:cNvPr id="208" name="Your Turn"/>
+          <p:cNvSpPr txBox="1">
+            <a:spLocks noGrp="1"/>
+          </p:cNvSpPr>
+          <p:nvPr>
+            <p:ph type="title"/>
+          </p:nvPr>
+        </p:nvSpPr>
+        <p:spPr>
+          <a:prstGeom prst="rect">
+            <a:avLst/>
+          </a:prstGeom>
+        </p:spPr>
+        <p:txBody>
+          <a:bodyPr/>
+          <a:lstStyle/>
+          <a:p>
+            <a:r>
+              <a:rPr b="1" dirty="0"/>
+              <a:t>Your Turn</a:t>
+            </a:r>
+          </a:p>
+        </p:txBody>
+      </p:sp>
+      <p:sp>
+        <p:nvSpPr>
+          <p:cNvPr id="205" name="Rounded Rectangle"/>
+          <p:cNvSpPr/>
+          <p:nvPr/>
+        </p:nvSpPr>
+        <p:spPr>
+          <a:xfrm>
+            <a:off x="13093177" y="3384668"/>
+            <a:ext cx="9761020" cy="8898465"/>
+          </a:xfrm>
+          <a:prstGeom prst="roundRect">
+            <a:avLst>
+              <a:gd name="adj" fmla="val 11402"/>
+            </a:avLst>
+          </a:prstGeom>
+          <a:solidFill>
+            <a:schemeClr val="accent4"/>
+          </a:solidFill>
+          <a:ln w="12700">
+            <a:miter lim="400000"/>
+          </a:ln>
+        </p:spPr>
+        <p:txBody>
+          <a:bodyPr lIns="50800" tIns="50800" rIns="50800" bIns="50800" anchor="ctr"/>
+          <a:lstStyle/>
+          <a:p>
+            <a:pPr>
+              <a:lnSpc>
+                <a:spcPct val="120000"/>
+              </a:lnSpc>
+              <a:defRPr sz="3000" cap="all">
+                <a:latin typeface="Proxima Nova Extrabold"/>
+                <a:ea typeface="Proxima Nova Extrabold"/>
+                <a:cs typeface="Proxima Nova Extrabold"/>
+                <a:sym typeface="Proxima Nova Extrabold"/>
+              </a:defRPr>
+            </a:pPr>
+            <a:endParaRPr/>
+          </a:p>
+        </p:txBody>
+      </p:sp>
+      <p:sp>
+        <p:nvSpPr>
+          <p:cNvPr id="3" name="Store the result of sum in location 42.…">
+            <a:extLst>
+              <a:ext uri="{FF2B5EF4-FFF2-40B4-BE49-F238E27FC236}">
+                <a16:creationId xmlns:a16="http://schemas.microsoft.com/office/drawing/2014/main" id="{B7DB2F1B-CA5F-8778-12BF-9E92A048CA08}"/>
+              </a:ext>
+            </a:extLst>
+          </p:cNvPr>
+          <p:cNvSpPr txBox="1"/>
+          <p:nvPr/>
+        </p:nvSpPr>
+        <p:spPr>
+          <a:xfrm>
+            <a:off x="2098772" y="4159825"/>
+            <a:ext cx="9333823" cy="5396349"/>
+          </a:xfrm>
+          <a:prstGeom prst="rect">
+            <a:avLst/>
+          </a:prstGeom>
+          <a:ln w="12700">
+            <a:miter lim="400000"/>
+          </a:ln>
+          <a:extLst>
+            <a:ext uri="{C572A759-6A51-4108-AA02-DFA0A04FC94B}">
+              <ma14:wrappingTextBoxFlag xmlns="" xmlns:m="http://schemas.openxmlformats.org/officeDocument/2006/math" xmlns:a14="http://schemas.microsoft.com/office/drawing/2010/main" xmlns:ma14="http://schemas.microsoft.com/office/mac/drawingml/2011/main" val="1"/>
+            </a:ext>
+          </a:extLst>
+        </p:spPr>
+        <p:txBody>
+          <a:bodyPr wrap="square" lIns="50800" tIns="50800" rIns="50800" bIns="50800" anchor="ctr">
+            <a:spAutoFit/>
+          </a:bodyPr>
+          <a:lstStyle/>
+          <a:p>
+            <a:pPr algn="l">
+              <a:defRPr sz="4300" b="1">
+                <a:latin typeface="Courier New"/>
+                <a:ea typeface="Courier New"/>
+                <a:cs typeface="Courier New"/>
+                <a:sym typeface="Courier New"/>
+              </a:defRPr>
+            </a:pPr>
+            <a:r>
+              <a:rPr lang="en-GB" dirty="0"/>
+              <a:t>Write a Regular Expression for a string that:</a:t>
+            </a:r>
+          </a:p>
+          <a:p>
+            <a:pPr algn="l">
+              <a:defRPr sz="4300" b="1">
+                <a:latin typeface="Courier New"/>
+                <a:ea typeface="Courier New"/>
+                <a:cs typeface="Courier New"/>
+                <a:sym typeface="Courier New"/>
+              </a:defRPr>
+            </a:pPr>
+            <a:r>
+              <a:rPr lang="en-GB" dirty="0"/>
+              <a:t>-	Starts with 10</a:t>
+            </a:r>
+          </a:p>
+          <a:p>
+            <a:pPr algn="l">
+              <a:defRPr sz="4300" b="1">
+                <a:latin typeface="Courier New"/>
+                <a:ea typeface="Courier New"/>
+                <a:cs typeface="Courier New"/>
+                <a:sym typeface="Courier New"/>
+              </a:defRPr>
+            </a:pPr>
+            <a:r>
+              <a:rPr lang="en-GB" dirty="0"/>
+              <a:t>-	Has zero or more occurrences of any combination of 0 or 1  in the middle</a:t>
+            </a:r>
+          </a:p>
+          <a:p>
+            <a:pPr algn="l">
+              <a:defRPr sz="4300" b="1">
+                <a:latin typeface="Courier New"/>
+                <a:ea typeface="Courier New"/>
+                <a:cs typeface="Courier New"/>
+                <a:sym typeface="Courier New"/>
+              </a:defRPr>
+            </a:pPr>
+            <a:r>
+              <a:rPr lang="en-GB" dirty="0"/>
+              <a:t>-	Ends with 01</a:t>
+            </a:r>
+          </a:p>
+        </p:txBody>
+      </p:sp>
+      <p:sp>
+        <p:nvSpPr>
+          <p:cNvPr id="4" name="13B - Wednesday 25th January 2023">
+            <a:extLst>
+              <a:ext uri="{FF2B5EF4-FFF2-40B4-BE49-F238E27FC236}">
+                <a16:creationId xmlns:a16="http://schemas.microsoft.com/office/drawing/2014/main" id="{C54CB9A1-7119-877F-B2FA-FC55C7530289}"/>
+              </a:ext>
+            </a:extLst>
+          </p:cNvPr>
+          <p:cNvSpPr txBox="1">
+            <a:spLocks/>
+          </p:cNvSpPr>
+          <p:nvPr/>
+        </p:nvSpPr>
+        <p:spPr>
+          <a:xfrm>
+            <a:off x="2098772" y="10198099"/>
+            <a:ext cx="9333823" cy="1280160"/>
+          </a:xfrm>
+          <a:prstGeom prst="rect">
+            <a:avLst/>
+          </a:prstGeom>
+          <a:ln w="12700">
+            <a:miter lim="400000"/>
+          </a:ln>
+          <a:extLst>
+            <a:ext uri="{C572A759-6A51-4108-AA02-DFA0A04FC94B}">
+              <ma14:wrappingTextBoxFlag xmlns="" xmlns:m="http://schemas.openxmlformats.org/officeDocument/2006/math" xmlns:a14="http://schemas.microsoft.com/office/drawing/2010/main" xmlns:ma14="http://schemas.microsoft.com/office/mac/drawingml/2011/main" val="1"/>
+            </a:ext>
+          </a:extLst>
+        </p:spPr>
+        <p:txBody>
+          <a:bodyPr lIns="50800" tIns="50800" rIns="50800" bIns="50800">
+            <a:noAutofit/>
+          </a:bodyPr>
+          <a:lstStyle>
+            <a:lvl1pPr marL="685800" marR="0" indent="-685800" algn="l" defTabSz="584200" rtl="0" latinLnBrk="0">
+              <a:lnSpc>
+                <a:spcPct val="80000"/>
+              </a:lnSpc>
+              <a:spcBef>
+                <a:spcPts val="2400"/>
+              </a:spcBef>
+              <a:spcAft>
+                <a:spcPts val="0"/>
+              </a:spcAft>
+              <a:buClr>
+                <a:srgbClr val="57BEF0"/>
+              </a:buClr>
+              <a:buSzPct val="250000"/>
+              <a:buFontTx/>
+              <a:buChar char="-"/>
+              <a:tabLst/>
+              <a:defRPr sz="4200" b="1" i="0" u="none" strike="noStrike" cap="none" spc="0" baseline="0">
+                <a:solidFill>
+                  <a:srgbClr val="53585F"/>
+                </a:solidFill>
+                <a:uFillTx/>
+                <a:latin typeface="Proxima Nova"/>
+                <a:ea typeface="Proxima Nova"/>
+                <a:cs typeface="Proxima Nova"/>
+                <a:sym typeface="Proxima Nova"/>
+              </a:defRPr>
+            </a:lvl1pPr>
+            <a:lvl2pPr marL="1371600" marR="0" indent="-685800" algn="l" defTabSz="584200" rtl="0" latinLnBrk="0">
+              <a:lnSpc>
+                <a:spcPct val="80000"/>
+              </a:lnSpc>
+              <a:spcBef>
+                <a:spcPts val="2400"/>
+              </a:spcBef>
+              <a:spcAft>
+                <a:spcPts val="0"/>
+              </a:spcAft>
+              <a:buClr>
+                <a:srgbClr val="57BEF0"/>
+              </a:buClr>
+              <a:buSzPct val="250000"/>
+              <a:buFontTx/>
+              <a:buChar char="-"/>
+              <a:tabLst/>
+              <a:defRPr sz="4200" b="1" i="0" u="none" strike="noStrike" cap="none" spc="0" baseline="0">
+                <a:solidFill>
+                  <a:srgbClr val="53585F"/>
+                </a:solidFill>
+                <a:uFillTx/>
+                <a:latin typeface="Proxima Nova"/>
+                <a:ea typeface="Proxima Nova"/>
+                <a:cs typeface="Proxima Nova"/>
+                <a:sym typeface="Proxima Nova"/>
+              </a:defRPr>
+            </a:lvl2pPr>
+            <a:lvl3pPr marL="2057400" marR="0" indent="-685800" algn="l" defTabSz="584200" rtl="0" latinLnBrk="0">
+              <a:lnSpc>
+                <a:spcPct val="80000"/>
+              </a:lnSpc>
+              <a:spcBef>
+                <a:spcPts val="2400"/>
+              </a:spcBef>
+              <a:spcAft>
+                <a:spcPts val="0"/>
+              </a:spcAft>
+              <a:buClr>
+                <a:srgbClr val="57BEF0"/>
+              </a:buClr>
+              <a:buSzPct val="250000"/>
+              <a:buFontTx/>
+              <a:buChar char="-"/>
+              <a:tabLst/>
+              <a:defRPr sz="4200" b="1" i="0" u="none" strike="noStrike" cap="none" spc="0" baseline="0">
+                <a:solidFill>
+                  <a:srgbClr val="53585F"/>
+                </a:solidFill>
+                <a:uFillTx/>
+                <a:latin typeface="Proxima Nova"/>
+                <a:ea typeface="Proxima Nova"/>
+                <a:cs typeface="Proxima Nova"/>
+                <a:sym typeface="Proxima Nova"/>
+              </a:defRPr>
+            </a:lvl3pPr>
+            <a:lvl4pPr marL="2743200" marR="0" indent="-685800" algn="l" defTabSz="584200" rtl="0" latinLnBrk="0">
+              <a:lnSpc>
+                <a:spcPct val="80000"/>
+              </a:lnSpc>
+              <a:spcBef>
+                <a:spcPts val="2400"/>
+              </a:spcBef>
+              <a:spcAft>
+                <a:spcPts val="0"/>
+              </a:spcAft>
+              <a:buClr>
+                <a:srgbClr val="57BEF0"/>
+              </a:buClr>
+              <a:buSzPct val="250000"/>
+              <a:buFontTx/>
+              <a:buChar char="-"/>
+              <a:tabLst/>
+              <a:defRPr sz="4200" b="1" i="0" u="none" strike="noStrike" cap="none" spc="0" baseline="0">
+                <a:solidFill>
+                  <a:srgbClr val="53585F"/>
+                </a:solidFill>
+                <a:uFillTx/>
+                <a:latin typeface="Proxima Nova"/>
+                <a:ea typeface="Proxima Nova"/>
+                <a:cs typeface="Proxima Nova"/>
+                <a:sym typeface="Proxima Nova"/>
+              </a:defRPr>
+            </a:lvl4pPr>
+            <a:lvl5pPr marL="3429000" marR="0" indent="-685800" algn="l" defTabSz="584200" rtl="0" latinLnBrk="0">
+              <a:lnSpc>
+                <a:spcPct val="80000"/>
+              </a:lnSpc>
+              <a:spcBef>
+                <a:spcPts val="2400"/>
+              </a:spcBef>
+              <a:spcAft>
+                <a:spcPts val="0"/>
+              </a:spcAft>
+              <a:buClr>
+                <a:srgbClr val="57BEF0"/>
+              </a:buClr>
+              <a:buSzPct val="250000"/>
+              <a:buFontTx/>
+              <a:buChar char="-"/>
+              <a:tabLst/>
+              <a:defRPr sz="4200" b="1" i="0" u="none" strike="noStrike" cap="none" spc="0" baseline="0">
+                <a:solidFill>
+                  <a:srgbClr val="53585F"/>
+                </a:solidFill>
+                <a:uFillTx/>
+                <a:latin typeface="Proxima Nova"/>
+                <a:ea typeface="Proxima Nova"/>
+                <a:cs typeface="Proxima Nova"/>
+                <a:sym typeface="Proxima Nova"/>
+              </a:defRPr>
+            </a:lvl5pPr>
+            <a:lvl6pPr marL="4114800" marR="0" indent="-685800" algn="l" defTabSz="584200" rtl="0" latinLnBrk="0">
+              <a:lnSpc>
+                <a:spcPct val="80000"/>
+              </a:lnSpc>
+              <a:spcBef>
+                <a:spcPts val="2400"/>
+              </a:spcBef>
+              <a:spcAft>
+                <a:spcPts val="0"/>
+              </a:spcAft>
+              <a:buClr>
+                <a:srgbClr val="57BEF0"/>
+              </a:buClr>
+              <a:buSzPct val="250000"/>
+              <a:buFontTx/>
+              <a:buChar char="-"/>
+              <a:tabLst/>
+              <a:defRPr sz="4200" b="1" i="0" u="none" strike="noStrike" cap="none" spc="0" baseline="0">
+                <a:solidFill>
+                  <a:srgbClr val="53585F"/>
+                </a:solidFill>
+                <a:uFillTx/>
+                <a:latin typeface="Proxima Nova"/>
+                <a:ea typeface="Proxima Nova"/>
+                <a:cs typeface="Proxima Nova"/>
+                <a:sym typeface="Proxima Nova"/>
+              </a:defRPr>
+            </a:lvl6pPr>
+            <a:lvl7pPr marL="4800600" marR="0" indent="-685800" algn="l" defTabSz="584200" rtl="0" latinLnBrk="0">
+              <a:lnSpc>
+                <a:spcPct val="80000"/>
+              </a:lnSpc>
+              <a:spcBef>
+                <a:spcPts val="2400"/>
+              </a:spcBef>
+              <a:spcAft>
+                <a:spcPts val="0"/>
+              </a:spcAft>
+              <a:buClr>
+                <a:srgbClr val="57BEF0"/>
+              </a:buClr>
+              <a:buSzPct val="250000"/>
+              <a:buFontTx/>
+              <a:buChar char="-"/>
+              <a:tabLst/>
+              <a:defRPr sz="4200" b="1" i="0" u="none" strike="noStrike" cap="none" spc="0" baseline="0">
+                <a:solidFill>
+                  <a:srgbClr val="53585F"/>
+                </a:solidFill>
+                <a:uFillTx/>
+                <a:latin typeface="Proxima Nova"/>
+                <a:ea typeface="Proxima Nova"/>
+                <a:cs typeface="Proxima Nova"/>
+                <a:sym typeface="Proxima Nova"/>
+              </a:defRPr>
+            </a:lvl7pPr>
+            <a:lvl8pPr marL="5486400" marR="0" indent="-685800" algn="l" defTabSz="584200" rtl="0" latinLnBrk="0">
+              <a:lnSpc>
+                <a:spcPct val="80000"/>
+              </a:lnSpc>
+              <a:spcBef>
+                <a:spcPts val="2400"/>
+              </a:spcBef>
+              <a:spcAft>
+                <a:spcPts val="0"/>
+              </a:spcAft>
+              <a:buClr>
+                <a:srgbClr val="57BEF0"/>
+              </a:buClr>
+              <a:buSzPct val="250000"/>
+              <a:buFontTx/>
+              <a:buChar char="-"/>
+              <a:tabLst/>
+              <a:defRPr sz="4200" b="1" i="0" u="none" strike="noStrike" cap="none" spc="0" baseline="0">
+                <a:solidFill>
+                  <a:srgbClr val="53585F"/>
+                </a:solidFill>
+                <a:uFillTx/>
+                <a:latin typeface="Proxima Nova"/>
+                <a:ea typeface="Proxima Nova"/>
+                <a:cs typeface="Proxima Nova"/>
+                <a:sym typeface="Proxima Nova"/>
+              </a:defRPr>
+            </a:lvl8pPr>
+            <a:lvl9pPr marL="6172200" marR="0" indent="-685800" algn="l" defTabSz="584200" rtl="0" latinLnBrk="0">
+              <a:lnSpc>
+                <a:spcPct val="80000"/>
+              </a:lnSpc>
+              <a:spcBef>
+                <a:spcPts val="2400"/>
+              </a:spcBef>
+              <a:spcAft>
+                <a:spcPts val="0"/>
+              </a:spcAft>
+              <a:buClr>
+                <a:srgbClr val="57BEF0"/>
+              </a:buClr>
+              <a:buSzPct val="250000"/>
+              <a:buFontTx/>
+              <a:buChar char="-"/>
+              <a:tabLst/>
+              <a:defRPr sz="4200" b="1" i="0" u="none" strike="noStrike" cap="none" spc="0" baseline="0">
+                <a:solidFill>
+                  <a:srgbClr val="53585F"/>
+                </a:solidFill>
+                <a:uFillTx/>
+                <a:latin typeface="Proxima Nova"/>
+                <a:ea typeface="Proxima Nova"/>
+                <a:cs typeface="Proxima Nova"/>
+                <a:sym typeface="Proxima Nova"/>
+              </a:defRPr>
+            </a:lvl9pPr>
+          </a:lstStyle>
+          <a:p>
+            <a:pPr marL="0" indent="0" hangingPunct="1">
+              <a:buNone/>
+            </a:pPr>
+            <a:r>
+              <a:rPr lang="en-GB" sz="8800" b="1" dirty="0">
+                <a:solidFill>
+                  <a:schemeClr val="tx1"/>
+                </a:solidFill>
+              </a:rPr>
+              <a:t>10 (0|1)* 01</a:t>
+            </a:r>
+          </a:p>
+        </p:txBody>
+      </p:sp>
+      <p:pic>
+        <p:nvPicPr>
+          <p:cNvPr id="5" name="Picture 4" descr="A pair of glasses&#10;&#10;Description automatically generated with low confidence">
+            <a:extLst>
+              <a:ext uri="{FF2B5EF4-FFF2-40B4-BE49-F238E27FC236}">
+                <a16:creationId xmlns:a16="http://schemas.microsoft.com/office/drawing/2014/main" id="{D61F2368-EE86-CAC2-9030-1CFE914A6350}"/>
+              </a:ext>
+            </a:extLst>
+          </p:cNvPr>
+          <p:cNvPicPr>
+            <a:picLocks noChangeAspect="1"/>
+          </p:cNvPicPr>
+          <p:nvPr/>
+        </p:nvPicPr>
+        <p:blipFill>
+          <a:blip r:embed="rId3"/>
+          <a:stretch>
+            <a:fillRect/>
+          </a:stretch>
+        </p:blipFill>
+        <p:spPr>
+          <a:xfrm>
+            <a:off x="13974579" y="4159825"/>
+            <a:ext cx="7998216" cy="2298700"/>
+          </a:xfrm>
+          <a:prstGeom prst="rect">
+            <a:avLst/>
+          </a:prstGeom>
+        </p:spPr>
+      </p:pic>
+    </p:spTree>
+    <p:extLst>
+      <p:ext uri="{BB962C8B-B14F-4D97-AF65-F5344CB8AC3E}">
+        <p14:creationId xmlns:p14="http://schemas.microsoft.com/office/powerpoint/2010/main" val="2876768566"/>
+      </p:ext>
+    </p:extLst>
+  </p:cSld>
+  <p:clrMapOvr>
+    <a:masterClrMapping/>
+  </p:clrMapOvr>
+  <p:transition spd="med"/>
+</p:sld>
+</file>
+
+<file path=ppt/slides/slide6.xml><?xml version="1.0" encoding="utf-8"?>
+<p:sld xmlns:a="http://schemas.openxmlformats.org/drawingml/2006/main" xmlns:r="http://schemas.openxmlformats.org/officeDocument/2006/relationships" xmlns:p="http://schemas.openxmlformats.org/presentationml/2006/main">
+  <p:cSld>
+    <p:spTree>
+      <p:nvGrpSpPr>
+        <p:cNvPr id="1" name=""/>
+        <p:cNvGrpSpPr/>
+        <p:nvPr/>
+      </p:nvGrpSpPr>
+      <p:grpSpPr>
+        <a:xfrm>
+          <a:off x="0" y="0"/>
+          <a:ext cx="0" cy="0"/>
+          <a:chOff x="0" y="0"/>
+          <a:chExt cx="0" cy="0"/>
+        </a:xfrm>
+      </p:grpSpPr>
       <p:pic>
         <p:nvPicPr>
           <p:cNvPr id="158" name="Image" descr="Image"/>
@@ -11809,7 +13404,7 @@
 </p:sld>
 </file>
 
-<file path=ppt/slides/slide6.xml><?xml version="1.0" encoding="utf-8"?>
+<file path=ppt/slides/slide7.xml><?xml version="1.0" encoding="utf-8"?>
 <p:sld xmlns:a="http://schemas.openxmlformats.org/drawingml/2006/main" xmlns:r="http://schemas.openxmlformats.org/officeDocument/2006/relationships" xmlns:p="http://schemas.openxmlformats.org/presentationml/2006/main">
   <p:cSld>
     <p:spTree>
@@ -11915,7 +13510,7 @@
 </p:sld>
 </file>
 
-<file path=ppt/slides/slide7.xml><?xml version="1.0" encoding="utf-8"?>
+<file path=ppt/slides/slide8.xml><?xml version="1.0" encoding="utf-8"?>
 <p:sld xmlns:a="http://schemas.openxmlformats.org/drawingml/2006/main" xmlns:r="http://schemas.openxmlformats.org/officeDocument/2006/relationships" xmlns:p="http://schemas.openxmlformats.org/presentationml/2006/main">
   <p:cSld>
     <p:spTree>
@@ -12634,7 +14229,7 @@
 </p:sld>
 </file>
 
-<file path=ppt/slides/slide8.xml><?xml version="1.0" encoding="utf-8"?>
+<file path=ppt/slides/slide9.xml><?xml version="1.0" encoding="utf-8"?>
 <p:sld xmlns:a="http://schemas.openxmlformats.org/drawingml/2006/main" xmlns:r="http://schemas.openxmlformats.org/officeDocument/2006/relationships" xmlns:p="http://schemas.openxmlformats.org/presentationml/2006/main">
   <p:cSld>
     <p:spTree>
@@ -13195,949 +14790,6 @@
       <p:bldP spid="180" grpId="0" animBg="1"/>
       <p:bldP spid="184" grpId="0" animBg="1"/>
     </p:bldLst>
-  </p:timing>
-</p:sld>
-</file>
-
-<file path=ppt/slides/slide9.xml><?xml version="1.0" encoding="utf-8"?>
-<p:sld xmlns:a="http://schemas.openxmlformats.org/drawingml/2006/main" xmlns:r="http://schemas.openxmlformats.org/officeDocument/2006/relationships" xmlns:p="http://schemas.openxmlformats.org/presentationml/2006/main">
-  <p:cSld>
-    <p:spTree>
-      <p:nvGrpSpPr>
-        <p:cNvPr id="1" name=""/>
-        <p:cNvGrpSpPr/>
-        <p:nvPr/>
-      </p:nvGrpSpPr>
-      <p:grpSpPr>
-        <a:xfrm>
-          <a:off x="0" y="0"/>
-          <a:ext cx="0" cy="0"/>
-          <a:chOff x="0" y="0"/>
-          <a:chExt cx="0" cy="0"/>
-        </a:xfrm>
-      </p:grpSpPr>
-      <p:sp>
-        <p:nvSpPr>
-          <p:cNvPr id="186" name="WHILE  LOOPS"/>
-          <p:cNvSpPr txBox="1">
-            <a:spLocks noGrp="1"/>
-          </p:cNvSpPr>
-          <p:nvPr>
-            <p:ph type="title"/>
-          </p:nvPr>
-        </p:nvSpPr>
-        <p:spPr>
-          <a:prstGeom prst="rect">
-            <a:avLst/>
-          </a:prstGeom>
-        </p:spPr>
-        <p:txBody>
-          <a:bodyPr/>
-          <a:lstStyle/>
-          <a:p>
-            <a:r>
-              <a:rPr b="1" dirty="0"/>
-              <a:t>WHILE  LOOPS</a:t>
-            </a:r>
-          </a:p>
-        </p:txBody>
-      </p:sp>
-      <p:sp>
-        <p:nvSpPr>
-          <p:cNvPr id="187" name="Rounded Rectangle"/>
-          <p:cNvSpPr/>
-          <p:nvPr/>
-        </p:nvSpPr>
-        <p:spPr>
-          <a:xfrm>
-            <a:off x="1495804" y="3384668"/>
-            <a:ext cx="10833724" cy="8898465"/>
-          </a:xfrm>
-          <a:prstGeom prst="roundRect">
-            <a:avLst>
-              <a:gd name="adj" fmla="val 11402"/>
-            </a:avLst>
-          </a:prstGeom>
-          <a:solidFill>
-            <a:schemeClr val="accent4"/>
-          </a:solidFill>
-          <a:ln w="12700">
-            <a:miter lim="400000"/>
-          </a:ln>
-        </p:spPr>
-        <p:txBody>
-          <a:bodyPr lIns="50800" tIns="50800" rIns="50800" bIns="50800" anchor="ctr"/>
-          <a:lstStyle/>
-          <a:p>
-            <a:pPr>
-              <a:lnSpc>
-                <a:spcPct val="120000"/>
-              </a:lnSpc>
-              <a:defRPr sz="3000" cap="all">
-                <a:latin typeface="Proxima Nova Extrabold"/>
-                <a:ea typeface="Proxima Nova Extrabold"/>
-                <a:cs typeface="Proxima Nova Extrabold"/>
-                <a:sym typeface="Proxima Nova Extrabold"/>
-              </a:defRPr>
-            </a:pPr>
-            <a:endParaRPr/>
-          </a:p>
-        </p:txBody>
-      </p:sp>
-      <p:sp>
-        <p:nvSpPr>
-          <p:cNvPr id="189" name="while ...:…"/>
-          <p:cNvSpPr txBox="1"/>
-          <p:nvPr/>
-        </p:nvSpPr>
-        <p:spPr>
-          <a:xfrm>
-            <a:off x="4082551" y="4036381"/>
-            <a:ext cx="5601519" cy="1701801"/>
-          </a:xfrm>
-          <a:prstGeom prst="rect">
-            <a:avLst/>
-          </a:prstGeom>
-          <a:ln w="12700">
-            <a:miter lim="400000"/>
-          </a:ln>
-          <a:extLst>
-            <a:ext uri="{C572A759-6A51-4108-AA02-DFA0A04FC94B}">
-              <ma14:wrappingTextBoxFlag xmlns="" xmlns:m="http://schemas.openxmlformats.org/officeDocument/2006/math" xmlns:a14="http://schemas.microsoft.com/office/drawing/2010/main" xmlns:ma14="http://schemas.microsoft.com/office/mac/drawingml/2011/main" val="1"/>
-            </a:ext>
-          </a:extLst>
-        </p:spPr>
-        <p:txBody>
-          <a:bodyPr wrap="none" lIns="50800" tIns="50800" rIns="50800" bIns="50800" anchor="ctr">
-            <a:spAutoFit/>
-          </a:bodyPr>
-          <a:lstStyle>
-            <a:lvl1pPr algn="l">
-              <a:defRPr sz="5500" b="1">
-                <a:latin typeface="Courier New"/>
-                <a:ea typeface="Courier New"/>
-                <a:cs typeface="Courier New"/>
-                <a:sym typeface="Courier New"/>
-              </a:defRPr>
-            </a:lvl1pPr>
-            <a:lvl2pPr algn="l">
-              <a:defRPr sz="5500" b="1">
-                <a:latin typeface="Courier New"/>
-                <a:ea typeface="Courier New"/>
-                <a:cs typeface="Courier New"/>
-                <a:sym typeface="Courier New"/>
-              </a:defRPr>
-            </a:lvl2pPr>
-          </a:lstStyle>
-          <a:p>
-            <a:r>
-              <a:rPr dirty="0"/>
-              <a:t>while ...:</a:t>
-            </a:r>
-          </a:p>
-          <a:p>
-            <a:pPr lvl="1"/>
-            <a:r>
-              <a:rPr dirty="0"/>
-              <a:t># INNER CODE</a:t>
-            </a:r>
-          </a:p>
-        </p:txBody>
-      </p:sp>
-      <p:sp>
-        <p:nvSpPr>
-          <p:cNvPr id="191" name="Rounded Rectangle"/>
-          <p:cNvSpPr/>
-          <p:nvPr/>
-        </p:nvSpPr>
-        <p:spPr>
-          <a:xfrm>
-            <a:off x="13093177" y="3384668"/>
-            <a:ext cx="9761020" cy="8898465"/>
-          </a:xfrm>
-          <a:prstGeom prst="roundRect">
-            <a:avLst>
-              <a:gd name="adj" fmla="val 11402"/>
-            </a:avLst>
-          </a:prstGeom>
-          <a:solidFill>
-            <a:schemeClr val="accent4"/>
-          </a:solidFill>
-          <a:ln w="12700">
-            <a:miter lim="400000"/>
-          </a:ln>
-        </p:spPr>
-        <p:txBody>
-          <a:bodyPr lIns="50800" tIns="50800" rIns="50800" bIns="50800" anchor="ctr"/>
-          <a:lstStyle/>
-          <a:p>
-            <a:pPr>
-              <a:lnSpc>
-                <a:spcPct val="120000"/>
-              </a:lnSpc>
-              <a:defRPr sz="3000" cap="all">
-                <a:latin typeface="Proxima Nova Extrabold"/>
-                <a:ea typeface="Proxima Nova Extrabold"/>
-                <a:cs typeface="Proxima Nova Extrabold"/>
-                <a:sym typeface="Proxima Nova Extrabold"/>
-              </a:defRPr>
-            </a:pPr>
-            <a:endParaRPr/>
-          </a:p>
-        </p:txBody>
-      </p:sp>
-      <p:sp>
-        <p:nvSpPr>
-          <p:cNvPr id="192" name="while ...:…"/>
-          <p:cNvSpPr txBox="1"/>
-          <p:nvPr/>
-        </p:nvSpPr>
-        <p:spPr>
-          <a:xfrm>
-            <a:off x="15412505" y="4036381"/>
-            <a:ext cx="5601520" cy="1701801"/>
-          </a:xfrm>
-          <a:prstGeom prst="rect">
-            <a:avLst/>
-          </a:prstGeom>
-          <a:ln w="12700">
-            <a:miter lim="400000"/>
-          </a:ln>
-          <a:extLst>
-            <a:ext uri="{C572A759-6A51-4108-AA02-DFA0A04FC94B}">
-              <ma14:wrappingTextBoxFlag xmlns="" xmlns:m="http://schemas.openxmlformats.org/officeDocument/2006/math" xmlns:a14="http://schemas.microsoft.com/office/drawing/2010/main" xmlns:ma14="http://schemas.microsoft.com/office/mac/drawingml/2011/main" val="1"/>
-            </a:ext>
-          </a:extLst>
-        </p:spPr>
-        <p:txBody>
-          <a:bodyPr wrap="none" lIns="50800" tIns="50800" rIns="50800" bIns="50800" anchor="ctr">
-            <a:spAutoFit/>
-          </a:bodyPr>
-          <a:lstStyle>
-            <a:lvl1pPr algn="l">
-              <a:defRPr sz="5500" b="1">
-                <a:latin typeface="Courier New"/>
-                <a:ea typeface="Courier New"/>
-                <a:cs typeface="Courier New"/>
-                <a:sym typeface="Courier New"/>
-              </a:defRPr>
-            </a:lvl1pPr>
-            <a:lvl2pPr algn="l">
-              <a:defRPr sz="5500" b="1">
-                <a:latin typeface="Courier New"/>
-                <a:ea typeface="Courier New"/>
-                <a:cs typeface="Courier New"/>
-                <a:sym typeface="Courier New"/>
-              </a:defRPr>
-            </a:lvl2pPr>
-          </a:lstStyle>
-          <a:p>
-            <a:r>
-              <a:t>while ...:</a:t>
-            </a:r>
-          </a:p>
-          <a:p>
-            <a:pPr lvl="1"/>
-            <a:r>
-              <a:t># INNER CODE</a:t>
-            </a:r>
-          </a:p>
-        </p:txBody>
-      </p:sp>
-      <p:grpSp>
-        <p:nvGrpSpPr>
-          <p:cNvPr id="2" name="Group 1">
-            <a:extLst>
-              <a:ext uri="{FF2B5EF4-FFF2-40B4-BE49-F238E27FC236}">
-                <a16:creationId xmlns:a16="http://schemas.microsoft.com/office/drawing/2014/main" id="{5DE65689-2608-4718-1F4A-EE6DD32218EC}"/>
-              </a:ext>
-            </a:extLst>
-          </p:cNvPr>
-          <p:cNvGrpSpPr/>
-          <p:nvPr/>
-        </p:nvGrpSpPr>
-        <p:grpSpPr>
-          <a:xfrm>
-            <a:off x="1727638" y="6841679"/>
-            <a:ext cx="10249898" cy="4635501"/>
-            <a:chOff x="1727638" y="6841679"/>
-            <a:chExt cx="10249898" cy="4635501"/>
-          </a:xfrm>
-        </p:grpSpPr>
-        <p:sp>
-          <p:nvSpPr>
-            <p:cNvPr id="188" name="loopStart:…"/>
-            <p:cNvSpPr txBox="1"/>
-            <p:nvPr/>
-          </p:nvSpPr>
-          <p:spPr>
-            <a:xfrm>
-              <a:off x="2339968" y="6841679"/>
-              <a:ext cx="9145396" cy="4635501"/>
-            </a:xfrm>
-            <a:prstGeom prst="rect">
-              <a:avLst/>
-            </a:prstGeom>
-            <a:ln w="12700">
-              <a:miter lim="400000"/>
-            </a:ln>
-            <a:extLst>
-              <a:ext uri="{C572A759-6A51-4108-AA02-DFA0A04FC94B}">
-                <ma14:wrappingTextBoxFlag xmlns="" xmlns:m="http://schemas.openxmlformats.org/officeDocument/2006/math" xmlns:a14="http://schemas.microsoft.com/office/drawing/2010/main" xmlns:ma14="http://schemas.microsoft.com/office/mac/drawingml/2011/main" val="1"/>
-              </a:ext>
-            </a:extLst>
-          </p:spPr>
-          <p:txBody>
-            <a:bodyPr wrap="none" lIns="50800" tIns="50800" rIns="50800" bIns="50800" anchor="ctr">
-              <a:spAutoFit/>
-            </a:bodyPr>
-            <a:lstStyle/>
-            <a:p>
-              <a:pPr algn="l">
-                <a:defRPr sz="4500" b="1">
-                  <a:latin typeface="Courier New"/>
-                  <a:ea typeface="Courier New"/>
-                  <a:cs typeface="Courier New"/>
-                  <a:sym typeface="Courier New"/>
-                </a:defRPr>
-              </a:pPr>
-              <a:r>
-                <a:rPr dirty="0" err="1"/>
-                <a:t>loopStart</a:t>
-              </a:r>
-              <a:r>
-                <a:rPr dirty="0"/>
-                <a:t>:</a:t>
-              </a:r>
-            </a:p>
-            <a:p>
-              <a:pPr lvl="1" algn="l">
-                <a:defRPr sz="4500" b="1">
-                  <a:latin typeface="Courier New"/>
-                  <a:ea typeface="Courier New"/>
-                  <a:cs typeface="Courier New"/>
-                  <a:sym typeface="Courier New"/>
-                </a:defRPr>
-              </a:pPr>
-              <a:r>
-                <a:rPr dirty="0"/>
-                <a:t>CMP ...</a:t>
-              </a:r>
-            </a:p>
-            <a:p>
-              <a:pPr lvl="1" algn="l">
-                <a:defRPr sz="4500" b="1">
-                  <a:latin typeface="Courier New"/>
-                  <a:ea typeface="Courier New"/>
-                  <a:cs typeface="Courier New"/>
-                  <a:sym typeface="Courier New"/>
-                </a:defRPr>
-              </a:pPr>
-              <a:r>
-                <a:rPr dirty="0"/>
-                <a:t>B&lt;NOT Condition&gt; </a:t>
-              </a:r>
-              <a:r>
-                <a:rPr dirty="0" err="1"/>
-                <a:t>loopDone</a:t>
-              </a:r>
-              <a:endParaRPr dirty="0"/>
-            </a:p>
-            <a:p>
-              <a:pPr lvl="1" algn="l">
-                <a:defRPr sz="4500" b="1">
-                  <a:latin typeface="Courier New"/>
-                  <a:ea typeface="Courier New"/>
-                  <a:cs typeface="Courier New"/>
-                  <a:sym typeface="Courier New"/>
-                </a:defRPr>
-              </a:pPr>
-              <a:r>
-                <a:rPr dirty="0"/>
-                <a:t># Inner Code</a:t>
-              </a:r>
-            </a:p>
-            <a:p>
-              <a:pPr lvl="1" algn="l">
-                <a:defRPr sz="4500" b="1">
-                  <a:latin typeface="Courier New"/>
-                  <a:ea typeface="Courier New"/>
-                  <a:cs typeface="Courier New"/>
-                  <a:sym typeface="Courier New"/>
-                </a:defRPr>
-              </a:pPr>
-              <a:r>
-                <a:rPr dirty="0"/>
-                <a:t>B </a:t>
-              </a:r>
-              <a:r>
-                <a:rPr dirty="0" err="1"/>
-                <a:t>loopStart</a:t>
-              </a:r>
-              <a:endParaRPr dirty="0"/>
-            </a:p>
-            <a:p>
-              <a:pPr algn="l">
-                <a:defRPr sz="4500" b="1">
-                  <a:latin typeface="Courier New"/>
-                  <a:ea typeface="Courier New"/>
-                  <a:cs typeface="Courier New"/>
-                  <a:sym typeface="Courier New"/>
-                </a:defRPr>
-              </a:pPr>
-              <a:r>
-                <a:rPr dirty="0" err="1"/>
-                <a:t>loopDone</a:t>
-              </a:r>
-              <a:r>
-                <a:rPr dirty="0"/>
-                <a:t>:</a:t>
-              </a:r>
-            </a:p>
-            <a:p>
-              <a:pPr lvl="1" algn="l">
-                <a:defRPr sz="4500" b="1">
-                  <a:latin typeface="Courier New"/>
-                  <a:ea typeface="Courier New"/>
-                  <a:cs typeface="Courier New"/>
-                  <a:sym typeface="Courier New"/>
-                </a:defRPr>
-              </a:pPr>
-              <a:r>
-                <a:rPr dirty="0"/>
-                <a:t># After</a:t>
-              </a:r>
-            </a:p>
-          </p:txBody>
-        </p:sp>
-        <p:sp>
-          <p:nvSpPr>
-            <p:cNvPr id="197" name="Connection Line"/>
-            <p:cNvSpPr/>
-            <p:nvPr/>
-          </p:nvSpPr>
-          <p:spPr>
-            <a:xfrm>
-              <a:off x="1727638" y="8492187"/>
-              <a:ext cx="1044041" cy="1929768"/>
-            </a:xfrm>
-            <a:custGeom>
-              <a:avLst/>
-              <a:gdLst/>
-              <a:ahLst/>
-              <a:cxnLst>
-                <a:cxn ang="0">
-                  <a:pos x="wd2" y="hd2"/>
-                </a:cxn>
-                <a:cxn ang="5400000">
-                  <a:pos x="wd2" y="hd2"/>
-                </a:cxn>
-                <a:cxn ang="10800000">
-                  <a:pos x="wd2" y="hd2"/>
-                </a:cxn>
-                <a:cxn ang="16200000">
-                  <a:pos x="wd2" y="hd2"/>
-                </a:cxn>
-              </a:cxnLst>
-              <a:rect l="0" t="0" r="r" b="b"/>
-              <a:pathLst>
-                <a:path w="16532" h="21600" extrusionOk="0">
-                  <a:moveTo>
-                    <a:pt x="16532" y="0"/>
-                  </a:moveTo>
-                  <a:cubicBezTo>
-                    <a:pt x="-2387" y="3818"/>
-                    <a:pt x="-5068" y="11018"/>
-                    <a:pt x="8488" y="21600"/>
-                  </a:cubicBezTo>
-                </a:path>
-              </a:pathLst>
-            </a:custGeom>
-            <a:ln w="101600">
-              <a:solidFill>
-                <a:schemeClr val="accent5"/>
-              </a:solidFill>
-              <a:miter lim="400000"/>
-              <a:tailEnd type="triangle"/>
-            </a:ln>
-          </p:spPr>
-          <p:txBody>
-            <a:bodyPr/>
-            <a:lstStyle/>
-            <a:p>
-              <a:endParaRPr/>
-            </a:p>
-          </p:txBody>
-        </p:sp>
-        <p:sp>
-          <p:nvSpPr>
-            <p:cNvPr id="198" name="Connection Line"/>
-            <p:cNvSpPr/>
-            <p:nvPr/>
-          </p:nvSpPr>
-          <p:spPr>
-            <a:xfrm>
-              <a:off x="6273800" y="7188200"/>
-              <a:ext cx="5703736" cy="2575178"/>
-            </a:xfrm>
-            <a:custGeom>
-              <a:avLst/>
-              <a:gdLst/>
-              <a:ahLst/>
-              <a:cxnLst>
-                <a:cxn ang="0">
-                  <a:pos x="wd2" y="hd2"/>
-                </a:cxn>
-                <a:cxn ang="5400000">
-                  <a:pos x="wd2" y="hd2"/>
-                </a:cxn>
-                <a:cxn ang="10800000">
-                  <a:pos x="wd2" y="hd2"/>
-                </a:cxn>
-                <a:cxn ang="16200000">
-                  <a:pos x="wd2" y="hd2"/>
-                </a:cxn>
-              </a:cxnLst>
-              <a:rect l="0" t="0" r="r" b="b"/>
-              <a:pathLst>
-                <a:path w="16228" h="21600" extrusionOk="0">
-                  <a:moveTo>
-                    <a:pt x="2565" y="21600"/>
-                  </a:moveTo>
-                  <a:cubicBezTo>
-                    <a:pt x="21600" y="14702"/>
-                    <a:pt x="20745" y="7502"/>
-                    <a:pt x="0" y="0"/>
-                  </a:cubicBezTo>
-                </a:path>
-              </a:pathLst>
-            </a:custGeom>
-            <a:ln w="101600">
-              <a:solidFill>
-                <a:schemeClr val="accent2">
-                  <a:hueOff val="312616"/>
-                  <a:satOff val="21048"/>
-                  <a:lumOff val="-29411"/>
-                </a:schemeClr>
-              </a:solidFill>
-              <a:miter lim="400000"/>
-              <a:tailEnd type="triangle"/>
-            </a:ln>
-          </p:spPr>
-          <p:txBody>
-            <a:bodyPr/>
-            <a:lstStyle/>
-            <a:p>
-              <a:endParaRPr/>
-            </a:p>
-          </p:txBody>
-        </p:sp>
-      </p:grpSp>
-      <p:grpSp>
-        <p:nvGrpSpPr>
-          <p:cNvPr id="3" name="Group 2">
-            <a:extLst>
-              <a:ext uri="{FF2B5EF4-FFF2-40B4-BE49-F238E27FC236}">
-                <a16:creationId xmlns:a16="http://schemas.microsoft.com/office/drawing/2014/main" id="{3483BA19-D589-517A-4E0A-3A81FCA7F798}"/>
-              </a:ext>
-            </a:extLst>
-          </p:cNvPr>
-          <p:cNvGrpSpPr/>
-          <p:nvPr/>
-        </p:nvGrpSpPr>
-        <p:grpSpPr>
-          <a:xfrm>
-            <a:off x="13730253" y="6841679"/>
-            <a:ext cx="8796349" cy="4635501"/>
-            <a:chOff x="13730253" y="6841679"/>
-            <a:chExt cx="8796349" cy="4635501"/>
-          </a:xfrm>
-        </p:grpSpPr>
-        <p:sp>
-          <p:nvSpPr>
-            <p:cNvPr id="194" name="B test…"/>
-            <p:cNvSpPr txBox="1"/>
-            <p:nvPr/>
-          </p:nvSpPr>
-          <p:spPr>
-            <a:xfrm>
-              <a:off x="14497956" y="6841679"/>
-              <a:ext cx="7430618" cy="4635501"/>
-            </a:xfrm>
-            <a:prstGeom prst="rect">
-              <a:avLst/>
-            </a:prstGeom>
-            <a:ln w="12700">
-              <a:miter lim="400000"/>
-            </a:ln>
-            <a:extLst>
-              <a:ext uri="{C572A759-6A51-4108-AA02-DFA0A04FC94B}">
-                <ma14:wrappingTextBoxFlag xmlns="" xmlns:m="http://schemas.openxmlformats.org/officeDocument/2006/math" xmlns:a14="http://schemas.microsoft.com/office/drawing/2010/main" xmlns:ma14="http://schemas.microsoft.com/office/mac/drawingml/2011/main" val="1"/>
-              </a:ext>
-            </a:extLst>
-          </p:spPr>
-          <p:txBody>
-            <a:bodyPr wrap="none" lIns="50800" tIns="50800" rIns="50800" bIns="50800" anchor="ctr">
-              <a:spAutoFit/>
-            </a:bodyPr>
-            <a:lstStyle/>
-            <a:p>
-              <a:pPr lvl="1" algn="l">
-                <a:defRPr sz="4500" b="1">
-                  <a:latin typeface="Courier New"/>
-                  <a:ea typeface="Courier New"/>
-                  <a:cs typeface="Courier New"/>
-                  <a:sym typeface="Courier New"/>
-                </a:defRPr>
-              </a:pPr>
-              <a:r>
-                <a:rPr dirty="0"/>
-                <a:t>B test</a:t>
-              </a:r>
-            </a:p>
-            <a:p>
-              <a:pPr algn="l">
-                <a:defRPr sz="4500" b="1">
-                  <a:latin typeface="Courier New"/>
-                  <a:ea typeface="Courier New"/>
-                  <a:cs typeface="Courier New"/>
-                  <a:sym typeface="Courier New"/>
-                </a:defRPr>
-              </a:pPr>
-              <a:r>
-                <a:rPr dirty="0" err="1"/>
-                <a:t>loopTop</a:t>
-              </a:r>
-              <a:r>
-                <a:rPr dirty="0"/>
-                <a:t>:</a:t>
-              </a:r>
-            </a:p>
-            <a:p>
-              <a:pPr lvl="1" algn="l">
-                <a:defRPr sz="4500" b="1">
-                  <a:latin typeface="Courier New"/>
-                  <a:ea typeface="Courier New"/>
-                  <a:cs typeface="Courier New"/>
-                  <a:sym typeface="Courier New"/>
-                </a:defRPr>
-              </a:pPr>
-              <a:r>
-                <a:rPr dirty="0"/>
-                <a:t># Inner Code</a:t>
-              </a:r>
-            </a:p>
-            <a:p>
-              <a:pPr algn="l">
-                <a:defRPr sz="4500" b="1">
-                  <a:latin typeface="Courier New"/>
-                  <a:ea typeface="Courier New"/>
-                  <a:cs typeface="Courier New"/>
-                  <a:sym typeface="Courier New"/>
-                </a:defRPr>
-              </a:pPr>
-              <a:r>
-                <a:rPr dirty="0"/>
-                <a:t>test:</a:t>
-              </a:r>
-            </a:p>
-            <a:p>
-              <a:pPr lvl="1" algn="l">
-                <a:defRPr sz="4500" b="1">
-                  <a:latin typeface="Courier New"/>
-                  <a:ea typeface="Courier New"/>
-                  <a:cs typeface="Courier New"/>
-                  <a:sym typeface="Courier New"/>
-                </a:defRPr>
-              </a:pPr>
-              <a:r>
-                <a:rPr dirty="0"/>
-                <a:t>CMP …</a:t>
-              </a:r>
-            </a:p>
-            <a:p>
-              <a:pPr lvl="1" algn="l">
-                <a:defRPr sz="4500" b="1">
-                  <a:latin typeface="Courier New"/>
-                  <a:ea typeface="Courier New"/>
-                  <a:cs typeface="Courier New"/>
-                  <a:sym typeface="Courier New"/>
-                </a:defRPr>
-              </a:pPr>
-              <a:r>
-                <a:rPr dirty="0"/>
-                <a:t>B&lt;Condition&gt; </a:t>
-              </a:r>
-              <a:r>
-                <a:rPr dirty="0" err="1"/>
-                <a:t>loopTop</a:t>
-              </a:r>
-              <a:endParaRPr dirty="0"/>
-            </a:p>
-            <a:p>
-              <a:pPr lvl="1" algn="l">
-                <a:defRPr sz="4500" b="1">
-                  <a:latin typeface="Courier New"/>
-                  <a:ea typeface="Courier New"/>
-                  <a:cs typeface="Courier New"/>
-                  <a:sym typeface="Courier New"/>
-                </a:defRPr>
-              </a:pPr>
-              <a:r>
-                <a:rPr dirty="0"/>
-                <a:t># After Code</a:t>
-              </a:r>
-            </a:p>
-          </p:txBody>
-        </p:sp>
-        <p:sp>
-          <p:nvSpPr>
-            <p:cNvPr id="199" name="Connection Line"/>
-            <p:cNvSpPr/>
-            <p:nvPr/>
-          </p:nvSpPr>
-          <p:spPr>
-            <a:xfrm>
-              <a:off x="13730253" y="7201968"/>
-              <a:ext cx="973778" cy="2031369"/>
-            </a:xfrm>
-            <a:custGeom>
-              <a:avLst/>
-              <a:gdLst/>
-              <a:ahLst/>
-              <a:cxnLst>
-                <a:cxn ang="0">
-                  <a:pos x="wd2" y="hd2"/>
-                </a:cxn>
-                <a:cxn ang="5400000">
-                  <a:pos x="wd2" y="hd2"/>
-                </a:cxn>
-                <a:cxn ang="10800000">
-                  <a:pos x="wd2" y="hd2"/>
-                </a:cxn>
-                <a:cxn ang="16200000">
-                  <a:pos x="wd2" y="hd2"/>
-                </a:cxn>
-              </a:cxnLst>
-              <a:rect l="0" t="0" r="r" b="b"/>
-              <a:pathLst>
-                <a:path w="16430" h="21600" extrusionOk="0">
-                  <a:moveTo>
-                    <a:pt x="16430" y="0"/>
-                  </a:moveTo>
-                  <a:cubicBezTo>
-                    <a:pt x="-2884" y="5572"/>
-                    <a:pt x="-5170" y="12772"/>
-                    <a:pt x="9573" y="21600"/>
-                  </a:cubicBezTo>
-                </a:path>
-              </a:pathLst>
-            </a:custGeom>
-            <a:ln w="101600">
-              <a:solidFill>
-                <a:schemeClr val="accent5"/>
-              </a:solidFill>
-              <a:miter lim="400000"/>
-              <a:tailEnd type="triangle"/>
-            </a:ln>
-          </p:spPr>
-          <p:txBody>
-            <a:bodyPr/>
-            <a:lstStyle/>
-            <a:p>
-              <a:endParaRPr/>
-            </a:p>
-          </p:txBody>
-        </p:sp>
-        <p:sp>
-          <p:nvSpPr>
-            <p:cNvPr id="200" name="Connection Line"/>
-            <p:cNvSpPr/>
-            <p:nvPr/>
-          </p:nvSpPr>
-          <p:spPr>
-            <a:xfrm>
-              <a:off x="17526000" y="7874000"/>
-              <a:ext cx="5000602" cy="2586921"/>
-            </a:xfrm>
-            <a:custGeom>
-              <a:avLst/>
-              <a:gdLst/>
-              <a:ahLst/>
-              <a:cxnLst>
-                <a:cxn ang="0">
-                  <a:pos x="wd2" y="hd2"/>
-                </a:cxn>
-                <a:cxn ang="5400000">
-                  <a:pos x="wd2" y="hd2"/>
-                </a:cxn>
-                <a:cxn ang="10800000">
-                  <a:pos x="wd2" y="hd2"/>
-                </a:cxn>
-                <a:cxn ang="16200000">
-                  <a:pos x="wd2" y="hd2"/>
-                </a:cxn>
-              </a:cxnLst>
-              <a:rect l="0" t="0" r="r" b="b"/>
-              <a:pathLst>
-                <a:path w="18362" h="21600" extrusionOk="0">
-                  <a:moveTo>
-                    <a:pt x="16555" y="21600"/>
-                  </a:moveTo>
-                  <a:cubicBezTo>
-                    <a:pt x="21600" y="13036"/>
-                    <a:pt x="16082" y="5836"/>
-                    <a:pt x="0" y="0"/>
-                  </a:cubicBezTo>
-                </a:path>
-              </a:pathLst>
-            </a:custGeom>
-            <a:ln w="101600">
-              <a:solidFill>
-                <a:schemeClr val="accent2">
-                  <a:hueOff val="312616"/>
-                  <a:satOff val="21048"/>
-                  <a:lumOff val="-29411"/>
-                </a:schemeClr>
-              </a:solidFill>
-              <a:miter lim="400000"/>
-              <a:tailEnd type="triangle"/>
-            </a:ln>
-          </p:spPr>
-          <p:txBody>
-            <a:bodyPr/>
-            <a:lstStyle/>
-            <a:p>
-              <a:endParaRPr/>
-            </a:p>
-          </p:txBody>
-        </p:sp>
-      </p:grpSp>
-    </p:spTree>
-  </p:cSld>
-  <p:clrMapOvr>
-    <a:masterClrMapping/>
-  </p:clrMapOvr>
-  <p:transition spd="med"/>
-  <p:timing>
-    <p:tnLst>
-      <p:par>
-        <p:cTn id="1" dur="indefinite" restart="never" nodeType="tmRoot">
-          <p:childTnLst>
-            <p:seq concurrent="1" nextAc="seek">
-              <p:cTn id="2" dur="indefinite" nodeType="mainSeq">
-                <p:childTnLst>
-                  <p:par>
-                    <p:cTn id="3" fill="hold">
-                      <p:stCondLst>
-                        <p:cond delay="indefinite"/>
-                      </p:stCondLst>
-                      <p:childTnLst>
-                        <p:par>
-                          <p:cTn id="4" fill="hold">
-                            <p:stCondLst>
-                              <p:cond delay="0"/>
-                            </p:stCondLst>
-                            <p:childTnLst>
-                              <p:par>
-                                <p:cTn id="5" presetID="1" presetClass="entr" presetSubtype="0" fill="hold" nodeType="clickEffect">
-                                  <p:stCondLst>
-                                    <p:cond delay="0"/>
-                                  </p:stCondLst>
-                                  <p:childTnLst>
-                                    <p:set>
-                                      <p:cBhvr>
-                                        <p:cTn id="6" dur="1" fill="hold">
-                                          <p:stCondLst>
-                                            <p:cond delay="0"/>
-                                          </p:stCondLst>
-                                        </p:cTn>
-                                        <p:tgtEl>
-                                          <p:spTgt spid="2"/>
-                                        </p:tgtEl>
-                                        <p:attrNameLst>
-                                          <p:attrName>style.visibility</p:attrName>
-                                        </p:attrNameLst>
-                                      </p:cBhvr>
-                                      <p:to>
-                                        <p:strVal val="visible"/>
-                                      </p:to>
-                                    </p:set>
-                                  </p:childTnLst>
-                                </p:cTn>
-                              </p:par>
-                            </p:childTnLst>
-                          </p:cTn>
-                        </p:par>
-                      </p:childTnLst>
-                    </p:cTn>
-                  </p:par>
-                  <p:par>
-                    <p:cTn id="7" fill="hold">
-                      <p:stCondLst>
-                        <p:cond delay="indefinite"/>
-                      </p:stCondLst>
-                      <p:childTnLst>
-                        <p:par>
-                          <p:cTn id="8" fill="hold">
-                            <p:stCondLst>
-                              <p:cond delay="0"/>
-                            </p:stCondLst>
-                            <p:childTnLst>
-                              <p:par>
-                                <p:cTn id="9" presetID="1" presetClass="entr" presetSubtype="0" fill="hold" nodeType="clickEffect">
-                                  <p:stCondLst>
-                                    <p:cond delay="0"/>
-                                  </p:stCondLst>
-                                  <p:childTnLst>
-                                    <p:set>
-                                      <p:cBhvr>
-                                        <p:cTn id="10" dur="1" fill="hold">
-                                          <p:stCondLst>
-                                            <p:cond delay="0"/>
-                                          </p:stCondLst>
-                                        </p:cTn>
-                                        <p:tgtEl>
-                                          <p:spTgt spid="3"/>
-                                        </p:tgtEl>
-                                        <p:attrNameLst>
-                                          <p:attrName>style.visibility</p:attrName>
-                                        </p:attrNameLst>
-                                      </p:cBhvr>
-                                      <p:to>
-                                        <p:strVal val="visible"/>
-                                      </p:to>
-                                    </p:set>
-                                  </p:childTnLst>
-                                </p:cTn>
-                              </p:par>
-                            </p:childTnLst>
-                          </p:cTn>
-                        </p:par>
-                      </p:childTnLst>
-                    </p:cTn>
-                  </p:par>
-                </p:childTnLst>
-              </p:cTn>
-              <p:prevCondLst>
-                <p:cond evt="onPrev" delay="0">
-                  <p:tgtEl>
-                    <p:sldTgt/>
-                  </p:tgtEl>
-                </p:cond>
-              </p:prevCondLst>
-              <p:nextCondLst>
-                <p:cond evt="onNext" delay="0">
-                  <p:tgtEl>
-                    <p:sldTgt/>
-                  </p:tgtEl>
-                </p:cond>
-              </p:nextCondLst>
-            </p:seq>
-          </p:childTnLst>
-        </p:cTn>
-      </p:par>
-    </p:tnLst>
   </p:timing>
 </p:sld>
 </file>

</xml_diff>

<commit_message>
final update for regular expressions and y10 attacks
</commit_message>
<xml_diff>
--- a/ALevel/RegularAndContextFreeLanguages/RegularExpressionsAndContextFreeLanguages.pptx
+++ b/ALevel/RegularAndContextFreeLanguages/RegularExpressionsAndContextFreeLanguages.pptx
@@ -3826,7 +3826,7 @@
           </a:ln>
           <a:extLst>
             <a:ext uri="{C572A759-6A51-4108-AA02-DFA0A04FC94B}">
-              <ma14:wrappingTextBoxFlag xmlns="" xmlns:m="http://schemas.openxmlformats.org/officeDocument/2006/math" xmlns:a14="http://schemas.microsoft.com/office/drawing/2010/main" xmlns:ma14="http://schemas.microsoft.com/office/mac/drawingml/2011/main" val="1"/>
+              <ma14:wrappingTextBoxFlag xmlns:ma14="http://schemas.microsoft.com/office/mac/drawingml/2011/main" xmlns:a14="http://schemas.microsoft.com/office/drawing/2010/main" xmlns:m="http://schemas.openxmlformats.org/officeDocument/2006/math" xmlns="" val="1"/>
             </a:ext>
           </a:extLst>
         </p:spPr>
@@ -3881,7 +3881,7 @@
           </a:ln>
           <a:extLst>
             <a:ext uri="{C572A759-6A51-4108-AA02-DFA0A04FC94B}">
-              <ma14:wrappingTextBoxFlag xmlns="" xmlns:m="http://schemas.openxmlformats.org/officeDocument/2006/math" xmlns:a14="http://schemas.microsoft.com/office/drawing/2010/main" xmlns:ma14="http://schemas.microsoft.com/office/mac/drawingml/2011/main" val="1"/>
+              <ma14:wrappingTextBoxFlag xmlns:ma14="http://schemas.microsoft.com/office/mac/drawingml/2011/main" xmlns:a14="http://schemas.microsoft.com/office/drawing/2010/main" xmlns:m="http://schemas.openxmlformats.org/officeDocument/2006/math" xmlns="" val="1"/>
             </a:ext>
           </a:extLst>
         </p:spPr>
@@ -4848,8 +4848,8 @@
           </a:p>
         </p:txBody>
       </p:sp>
-      <mc:AlternateContent xmlns:mc="http://schemas.openxmlformats.org/markup-compatibility/2006">
-        <mc:Choice xmlns:a14="http://schemas.microsoft.com/office/drawing/2010/main" Requires="a14">
+      <mc:AlternateContent xmlns:mc="http://schemas.openxmlformats.org/markup-compatibility/2006" xmlns:a14="http://schemas.microsoft.com/office/drawing/2010/main">
+        <mc:Choice Requires="a14">
           <p:sp>
             <p:nvSpPr>
               <p:cNvPr id="4" name="Your exam">
@@ -4877,7 +4877,7 @@
               </a:ln>
               <a:extLst>
                 <a:ext uri="{C572A759-6A51-4108-AA02-DFA0A04FC94B}">
-                  <ma14:wrappingTextBoxFlag xmlns="" xmlns:m="http://schemas.openxmlformats.org/officeDocument/2006/math" xmlns:ma14="http://schemas.microsoft.com/office/mac/drawingml/2011/main" val="1"/>
+                  <ma14:wrappingTextBoxFlag xmlns:ma14="http://schemas.microsoft.com/office/mac/drawingml/2011/main" xmlns:m="http://schemas.openxmlformats.org/officeDocument/2006/math" xmlns="" val="1"/>
                 </a:ext>
               </a:extLst>
             </p:spPr>
@@ -5254,7 +5254,7 @@
             </p:txBody>
           </p:sp>
         </mc:Choice>
-        <mc:Fallback>
+        <mc:Fallback xmlns="">
           <p:sp>
             <p:nvSpPr>
               <p:cNvPr id="4" name="Your exam">
@@ -5336,7 +5336,7 @@
           </a:ln>
           <a:extLst>
             <a:ext uri="{C572A759-6A51-4108-AA02-DFA0A04FC94B}">
-              <ma14:wrappingTextBoxFlag xmlns="" xmlns:m="http://schemas.openxmlformats.org/officeDocument/2006/math" xmlns:a14="http://schemas.microsoft.com/office/drawing/2010/main" xmlns:ma14="http://schemas.microsoft.com/office/mac/drawingml/2011/main" val="1"/>
+              <ma14:wrappingTextBoxFlag xmlns:ma14="http://schemas.microsoft.com/office/mac/drawingml/2011/main" xmlns:a14="http://schemas.microsoft.com/office/drawing/2010/main" xmlns:m="http://schemas.openxmlformats.org/officeDocument/2006/math" xmlns="" val="1"/>
             </a:ext>
           </a:extLst>
         </p:spPr>
@@ -5635,7 +5635,7 @@
         </p:nvSpPr>
         <p:spPr>
           <a:xfrm>
-            <a:off x="3109291" y="10437877"/>
+            <a:off x="5289885" y="9859083"/>
             <a:ext cx="3780183" cy="2298700"/>
           </a:xfrm>
           <a:prstGeom prst="rect">
@@ -5648,7 +5648,7 @@
           </a:ln>
           <a:extLst>
             <a:ext uri="{C572A759-6A51-4108-AA02-DFA0A04FC94B}">
-              <ma14:wrappingTextBoxFlag xmlns="" xmlns:m="http://schemas.openxmlformats.org/officeDocument/2006/math" xmlns:a14="http://schemas.microsoft.com/office/drawing/2010/main" xmlns:ma14="http://schemas.microsoft.com/office/mac/drawingml/2011/main" val="1"/>
+              <ma14:wrappingTextBoxFlag xmlns:ma14="http://schemas.microsoft.com/office/mac/drawingml/2011/main" xmlns:a14="http://schemas.microsoft.com/office/drawing/2010/main" xmlns:m="http://schemas.openxmlformats.org/officeDocument/2006/math" xmlns="" val="1"/>
             </a:ext>
           </a:extLst>
         </p:spPr>
@@ -5947,7 +5947,7 @@
         </p:nvSpPr>
         <p:spPr>
           <a:xfrm>
-            <a:off x="6889474" y="3773318"/>
+            <a:off x="7686133" y="3856916"/>
             <a:ext cx="2405080" cy="2298700"/>
           </a:xfrm>
           <a:prstGeom prst="rect">
@@ -5960,7 +5960,7 @@
           </a:ln>
           <a:extLst>
             <a:ext uri="{C572A759-6A51-4108-AA02-DFA0A04FC94B}">
-              <ma14:wrappingTextBoxFlag xmlns="" xmlns:m="http://schemas.openxmlformats.org/officeDocument/2006/math" xmlns:a14="http://schemas.microsoft.com/office/drawing/2010/main" xmlns:ma14="http://schemas.microsoft.com/office/mac/drawingml/2011/main" val="1"/>
+              <ma14:wrappingTextBoxFlag xmlns:ma14="http://schemas.microsoft.com/office/mac/drawingml/2011/main" xmlns:a14="http://schemas.microsoft.com/office/drawing/2010/main" xmlns:m="http://schemas.openxmlformats.org/officeDocument/2006/math" xmlns="" val="1"/>
             </a:ext>
           </a:extLst>
         </p:spPr>
@@ -6259,7 +6259,7 @@
         </p:nvSpPr>
         <p:spPr>
           <a:xfrm>
-            <a:off x="9973728" y="9859083"/>
+            <a:off x="10227200" y="9859083"/>
             <a:ext cx="2383307" cy="1156787"/>
           </a:xfrm>
           <a:prstGeom prst="rect">
@@ -6272,7 +6272,7 @@
           </a:ln>
           <a:extLst>
             <a:ext uri="{C572A759-6A51-4108-AA02-DFA0A04FC94B}">
-              <ma14:wrappingTextBoxFlag xmlns="" xmlns:m="http://schemas.openxmlformats.org/officeDocument/2006/math" xmlns:a14="http://schemas.microsoft.com/office/drawing/2010/main" xmlns:ma14="http://schemas.microsoft.com/office/mac/drawingml/2011/main" val="1"/>
+              <ma14:wrappingTextBoxFlag xmlns:ma14="http://schemas.microsoft.com/office/mac/drawingml/2011/main" xmlns:a14="http://schemas.microsoft.com/office/drawing/2010/main" xmlns:m="http://schemas.openxmlformats.org/officeDocument/2006/math" xmlns="" val="1"/>
             </a:ext>
           </a:extLst>
         </p:spPr>
@@ -6584,7 +6584,7 @@
           </a:ln>
           <a:extLst>
             <a:ext uri="{C572A759-6A51-4108-AA02-DFA0A04FC94B}">
-              <ma14:wrappingTextBoxFlag xmlns="" xmlns:m="http://schemas.openxmlformats.org/officeDocument/2006/math" xmlns:a14="http://schemas.microsoft.com/office/drawing/2010/main" xmlns:ma14="http://schemas.microsoft.com/office/mac/drawingml/2011/main" val="1"/>
+              <ma14:wrappingTextBoxFlag xmlns:ma14="http://schemas.microsoft.com/office/mac/drawingml/2011/main" xmlns:a14="http://schemas.microsoft.com/office/drawing/2010/main" xmlns:m="http://schemas.openxmlformats.org/officeDocument/2006/math" xmlns="" val="1"/>
             </a:ext>
           </a:extLst>
         </p:spPr>
@@ -6883,7 +6883,7 @@
         </p:nvSpPr>
         <p:spPr>
           <a:xfrm>
-            <a:off x="13260695" y="9859083"/>
+            <a:off x="13452081" y="9851646"/>
             <a:ext cx="2383307" cy="1156787"/>
           </a:xfrm>
           <a:prstGeom prst="rect">
@@ -6896,7 +6896,7 @@
           </a:ln>
           <a:extLst>
             <a:ext uri="{C572A759-6A51-4108-AA02-DFA0A04FC94B}">
-              <ma14:wrappingTextBoxFlag xmlns="" xmlns:m="http://schemas.openxmlformats.org/officeDocument/2006/math" xmlns:a14="http://schemas.microsoft.com/office/drawing/2010/main" xmlns:ma14="http://schemas.microsoft.com/office/mac/drawingml/2011/main" val="1"/>
+              <ma14:wrappingTextBoxFlag xmlns:ma14="http://schemas.microsoft.com/office/mac/drawingml/2011/main" xmlns:a14="http://schemas.microsoft.com/office/drawing/2010/main" xmlns:m="http://schemas.openxmlformats.org/officeDocument/2006/math" xmlns="" val="1"/>
             </a:ext>
           </a:extLst>
         </p:spPr>
@@ -7208,7 +7208,7 @@
           </a:ln>
           <a:extLst>
             <a:ext uri="{C572A759-6A51-4108-AA02-DFA0A04FC94B}">
-              <ma14:wrappingTextBoxFlag xmlns="" xmlns:m="http://schemas.openxmlformats.org/officeDocument/2006/math" xmlns:a14="http://schemas.microsoft.com/office/drawing/2010/main" xmlns:ma14="http://schemas.microsoft.com/office/mac/drawingml/2011/main" val="1"/>
+              <ma14:wrappingTextBoxFlag xmlns:ma14="http://schemas.microsoft.com/office/mac/drawingml/2011/main" xmlns:a14="http://schemas.microsoft.com/office/drawing/2010/main" xmlns:m="http://schemas.openxmlformats.org/officeDocument/2006/math" xmlns="" val="1"/>
             </a:ext>
           </a:extLst>
         </p:spPr>
@@ -7502,6 +7502,360 @@
     <a:masterClrMapping/>
   </p:clrMapOvr>
   <p:transition spd="med"/>
+  <p:timing>
+    <p:tnLst>
+      <p:par>
+        <p:cTn id="1" dur="indefinite" restart="never" nodeType="tmRoot">
+          <p:childTnLst>
+            <p:seq concurrent="1" nextAc="seek">
+              <p:cTn id="2" dur="indefinite" nodeType="mainSeq">
+                <p:childTnLst>
+                  <p:par>
+                    <p:cTn id="3" fill="hold">
+                      <p:stCondLst>
+                        <p:cond delay="indefinite"/>
+                      </p:stCondLst>
+                      <p:childTnLst>
+                        <p:par>
+                          <p:cTn id="4" fill="hold">
+                            <p:stCondLst>
+                              <p:cond delay="0"/>
+                            </p:stCondLst>
+                            <p:childTnLst>
+                              <p:par>
+                                <p:cTn id="5" presetID="1" presetClass="entr" presetSubtype="0" fill="hold" grpId="0" nodeType="clickEffect">
+                                  <p:stCondLst>
+                                    <p:cond delay="0"/>
+                                  </p:stCondLst>
+                                  <p:childTnLst>
+                                    <p:set>
+                                      <p:cBhvr>
+                                        <p:cTn id="6" dur="1" fill="hold">
+                                          <p:stCondLst>
+                                            <p:cond delay="0"/>
+                                          </p:stCondLst>
+                                        </p:cTn>
+                                        <p:tgtEl>
+                                          <p:spTgt spid="6"/>
+                                        </p:tgtEl>
+                                        <p:attrNameLst>
+                                          <p:attrName>style.visibility</p:attrName>
+                                        </p:attrNameLst>
+                                      </p:cBhvr>
+                                      <p:to>
+                                        <p:strVal val="visible"/>
+                                      </p:to>
+                                    </p:set>
+                                  </p:childTnLst>
+                                </p:cTn>
+                              </p:par>
+                            </p:childTnLst>
+                          </p:cTn>
+                        </p:par>
+                      </p:childTnLst>
+                    </p:cTn>
+                  </p:par>
+                  <p:par>
+                    <p:cTn id="7" fill="hold">
+                      <p:stCondLst>
+                        <p:cond delay="indefinite"/>
+                      </p:stCondLst>
+                      <p:childTnLst>
+                        <p:par>
+                          <p:cTn id="8" fill="hold">
+                            <p:stCondLst>
+                              <p:cond delay="0"/>
+                            </p:stCondLst>
+                            <p:childTnLst>
+                              <p:par>
+                                <p:cTn id="9" presetID="1" presetClass="entr" presetSubtype="0" fill="hold" grpId="0" nodeType="clickEffect">
+                                  <p:stCondLst>
+                                    <p:cond delay="0"/>
+                                  </p:stCondLst>
+                                  <p:childTnLst>
+                                    <p:set>
+                                      <p:cBhvr>
+                                        <p:cTn id="10" dur="1" fill="hold">
+                                          <p:stCondLst>
+                                            <p:cond delay="0"/>
+                                          </p:stCondLst>
+                                        </p:cTn>
+                                        <p:tgtEl>
+                                          <p:spTgt spid="7"/>
+                                        </p:tgtEl>
+                                        <p:attrNameLst>
+                                          <p:attrName>style.visibility</p:attrName>
+                                        </p:attrNameLst>
+                                      </p:cBhvr>
+                                      <p:to>
+                                        <p:strVal val="visible"/>
+                                      </p:to>
+                                    </p:set>
+                                  </p:childTnLst>
+                                </p:cTn>
+                              </p:par>
+                            </p:childTnLst>
+                          </p:cTn>
+                        </p:par>
+                      </p:childTnLst>
+                    </p:cTn>
+                  </p:par>
+                  <p:par>
+                    <p:cTn id="11" fill="hold">
+                      <p:stCondLst>
+                        <p:cond delay="indefinite"/>
+                      </p:stCondLst>
+                      <p:childTnLst>
+                        <p:par>
+                          <p:cTn id="12" fill="hold">
+                            <p:stCondLst>
+                              <p:cond delay="0"/>
+                            </p:stCondLst>
+                            <p:childTnLst>
+                              <p:par>
+                                <p:cTn id="13" presetID="1" presetClass="entr" presetSubtype="0" fill="hold" grpId="0" nodeType="clickEffect">
+                                  <p:stCondLst>
+                                    <p:cond delay="0"/>
+                                  </p:stCondLst>
+                                  <p:childTnLst>
+                                    <p:set>
+                                      <p:cBhvr>
+                                        <p:cTn id="14" dur="1" fill="hold">
+                                          <p:stCondLst>
+                                            <p:cond delay="0"/>
+                                          </p:stCondLst>
+                                        </p:cTn>
+                                        <p:tgtEl>
+                                          <p:spTgt spid="8"/>
+                                        </p:tgtEl>
+                                        <p:attrNameLst>
+                                          <p:attrName>style.visibility</p:attrName>
+                                        </p:attrNameLst>
+                                      </p:cBhvr>
+                                      <p:to>
+                                        <p:strVal val="visible"/>
+                                      </p:to>
+                                    </p:set>
+                                  </p:childTnLst>
+                                </p:cTn>
+                              </p:par>
+                            </p:childTnLst>
+                          </p:cTn>
+                        </p:par>
+                      </p:childTnLst>
+                    </p:cTn>
+                  </p:par>
+                  <p:par>
+                    <p:cTn id="15" fill="hold">
+                      <p:stCondLst>
+                        <p:cond delay="indefinite"/>
+                      </p:stCondLst>
+                      <p:childTnLst>
+                        <p:par>
+                          <p:cTn id="16" fill="hold">
+                            <p:stCondLst>
+                              <p:cond delay="0"/>
+                            </p:stCondLst>
+                            <p:childTnLst>
+                              <p:par>
+                                <p:cTn id="17" presetID="1" presetClass="entr" presetSubtype="0" fill="hold" grpId="0" nodeType="clickEffect">
+                                  <p:stCondLst>
+                                    <p:cond delay="0"/>
+                                  </p:stCondLst>
+                                  <p:childTnLst>
+                                    <p:set>
+                                      <p:cBhvr>
+                                        <p:cTn id="18" dur="1" fill="hold">
+                                          <p:stCondLst>
+                                            <p:cond delay="0"/>
+                                          </p:stCondLst>
+                                        </p:cTn>
+                                        <p:tgtEl>
+                                          <p:spTgt spid="9"/>
+                                        </p:tgtEl>
+                                        <p:attrNameLst>
+                                          <p:attrName>style.visibility</p:attrName>
+                                        </p:attrNameLst>
+                                      </p:cBhvr>
+                                      <p:to>
+                                        <p:strVal val="visible"/>
+                                      </p:to>
+                                    </p:set>
+                                  </p:childTnLst>
+                                </p:cTn>
+                              </p:par>
+                            </p:childTnLst>
+                          </p:cTn>
+                        </p:par>
+                      </p:childTnLst>
+                    </p:cTn>
+                  </p:par>
+                  <p:par>
+                    <p:cTn id="19" fill="hold">
+                      <p:stCondLst>
+                        <p:cond delay="indefinite"/>
+                      </p:stCondLst>
+                      <p:childTnLst>
+                        <p:par>
+                          <p:cTn id="20" fill="hold">
+                            <p:stCondLst>
+                              <p:cond delay="0"/>
+                            </p:stCondLst>
+                            <p:childTnLst>
+                              <p:par>
+                                <p:cTn id="21" presetID="1" presetClass="entr" presetSubtype="0" fill="hold" grpId="0" nodeType="clickEffect">
+                                  <p:stCondLst>
+                                    <p:cond delay="0"/>
+                                  </p:stCondLst>
+                                  <p:childTnLst>
+                                    <p:set>
+                                      <p:cBhvr>
+                                        <p:cTn id="22" dur="1" fill="hold">
+                                          <p:stCondLst>
+                                            <p:cond delay="0"/>
+                                          </p:stCondLst>
+                                        </p:cTn>
+                                        <p:tgtEl>
+                                          <p:spTgt spid="10"/>
+                                        </p:tgtEl>
+                                        <p:attrNameLst>
+                                          <p:attrName>style.visibility</p:attrName>
+                                        </p:attrNameLst>
+                                      </p:cBhvr>
+                                      <p:to>
+                                        <p:strVal val="visible"/>
+                                      </p:to>
+                                    </p:set>
+                                  </p:childTnLst>
+                                </p:cTn>
+                              </p:par>
+                            </p:childTnLst>
+                          </p:cTn>
+                        </p:par>
+                      </p:childTnLst>
+                    </p:cTn>
+                  </p:par>
+                  <p:par>
+                    <p:cTn id="23" fill="hold">
+                      <p:stCondLst>
+                        <p:cond delay="indefinite"/>
+                      </p:stCondLst>
+                      <p:childTnLst>
+                        <p:par>
+                          <p:cTn id="24" fill="hold">
+                            <p:stCondLst>
+                              <p:cond delay="0"/>
+                            </p:stCondLst>
+                            <p:childTnLst>
+                              <p:par>
+                                <p:cTn id="25" presetID="1" presetClass="entr" presetSubtype="0" fill="hold" grpId="0" nodeType="clickEffect">
+                                  <p:stCondLst>
+                                    <p:cond delay="0"/>
+                                  </p:stCondLst>
+                                  <p:childTnLst>
+                                    <p:set>
+                                      <p:cBhvr>
+                                        <p:cTn id="26" dur="1" fill="hold">
+                                          <p:stCondLst>
+                                            <p:cond delay="0"/>
+                                          </p:stCondLst>
+                                        </p:cTn>
+                                        <p:tgtEl>
+                                          <p:spTgt spid="11"/>
+                                        </p:tgtEl>
+                                        <p:attrNameLst>
+                                          <p:attrName>style.visibility</p:attrName>
+                                        </p:attrNameLst>
+                                      </p:cBhvr>
+                                      <p:to>
+                                        <p:strVal val="visible"/>
+                                      </p:to>
+                                    </p:set>
+                                  </p:childTnLst>
+                                </p:cTn>
+                              </p:par>
+                            </p:childTnLst>
+                          </p:cTn>
+                        </p:par>
+                      </p:childTnLst>
+                    </p:cTn>
+                  </p:par>
+                  <p:par>
+                    <p:cTn id="27" fill="hold">
+                      <p:stCondLst>
+                        <p:cond delay="indefinite"/>
+                      </p:stCondLst>
+                      <p:childTnLst>
+                        <p:par>
+                          <p:cTn id="28" fill="hold">
+                            <p:stCondLst>
+                              <p:cond delay="0"/>
+                            </p:stCondLst>
+                            <p:childTnLst>
+                              <p:par>
+                                <p:cTn id="29" presetID="1" presetClass="entr" presetSubtype="0" fill="hold" grpId="0" nodeType="clickEffect">
+                                  <p:stCondLst>
+                                    <p:cond delay="0"/>
+                                  </p:stCondLst>
+                                  <p:childTnLst>
+                                    <p:set>
+                                      <p:cBhvr>
+                                        <p:cTn id="30" dur="1" fill="hold">
+                                          <p:stCondLst>
+                                            <p:cond delay="0"/>
+                                          </p:stCondLst>
+                                        </p:cTn>
+                                        <p:tgtEl>
+                                          <p:spTgt spid="13"/>
+                                        </p:tgtEl>
+                                        <p:attrNameLst>
+                                          <p:attrName>style.visibility</p:attrName>
+                                        </p:attrNameLst>
+                                      </p:cBhvr>
+                                      <p:to>
+                                        <p:strVal val="visible"/>
+                                      </p:to>
+                                    </p:set>
+                                  </p:childTnLst>
+                                </p:cTn>
+                              </p:par>
+                            </p:childTnLst>
+                          </p:cTn>
+                        </p:par>
+                      </p:childTnLst>
+                    </p:cTn>
+                  </p:par>
+                </p:childTnLst>
+              </p:cTn>
+              <p:prevCondLst>
+                <p:cond evt="onPrev" delay="0">
+                  <p:tgtEl>
+                    <p:sldTgt/>
+                  </p:tgtEl>
+                </p:cond>
+              </p:prevCondLst>
+              <p:nextCondLst>
+                <p:cond evt="onNext" delay="0">
+                  <p:tgtEl>
+                    <p:sldTgt/>
+                  </p:tgtEl>
+                </p:cond>
+              </p:nextCondLst>
+            </p:seq>
+          </p:childTnLst>
+        </p:cTn>
+      </p:par>
+    </p:tnLst>
+    <p:bldLst>
+      <p:bldP spid="6" grpId="0" animBg="1"/>
+      <p:bldP spid="7" grpId="0" animBg="1"/>
+      <p:bldP spid="8" grpId="0" animBg="1"/>
+      <p:bldP spid="9" grpId="0" animBg="1"/>
+      <p:bldP spid="10" grpId="0" animBg="1"/>
+      <p:bldP spid="11" grpId="0" animBg="1"/>
+      <p:bldP spid="13" grpId="0" animBg="1"/>
+    </p:bldLst>
+  </p:timing>
 </p:sld>
 </file>
 
@@ -7579,7 +7933,7 @@
           </a:prstGeom>
           <a:extLst>
             <a:ext uri="{C572A759-6A51-4108-AA02-DFA0A04FC94B}">
-              <ma14:wrappingTextBoxFlag xmlns="" xmlns:m="http://schemas.openxmlformats.org/officeDocument/2006/math" xmlns:a14="http://schemas.microsoft.com/office/drawing/2010/main" xmlns:ma14="http://schemas.microsoft.com/office/mac/drawingml/2011/main" val="1"/>
+              <ma14:wrappingTextBoxFlag xmlns:ma14="http://schemas.microsoft.com/office/mac/drawingml/2011/main" xmlns:a14="http://schemas.microsoft.com/office/drawing/2010/main" xmlns:m="http://schemas.openxmlformats.org/officeDocument/2006/math" xmlns="" val="1"/>
             </a:ext>
           </a:extLst>
         </p:spPr>
@@ -7627,7 +7981,7 @@
           </a:ln>
           <a:extLst>
             <a:ext uri="{C572A759-6A51-4108-AA02-DFA0A04FC94B}">
-              <ma14:wrappingTextBoxFlag xmlns="" xmlns:m="http://schemas.openxmlformats.org/officeDocument/2006/math" xmlns:a14="http://schemas.microsoft.com/office/drawing/2010/main" xmlns:ma14="http://schemas.microsoft.com/office/mac/drawingml/2011/main" val="1"/>
+              <ma14:wrappingTextBoxFlag xmlns:ma14="http://schemas.microsoft.com/office/mac/drawingml/2011/main" xmlns:a14="http://schemas.microsoft.com/office/drawing/2010/main" xmlns:m="http://schemas.openxmlformats.org/officeDocument/2006/math" xmlns="" val="1"/>
             </a:ext>
           </a:extLst>
         </p:spPr>
@@ -7875,35 +8229,35 @@
             <a:pPr algn="l" hangingPunct="1"/>
             <a:r>
               <a:rPr lang="en-GB" sz="8800" b="1" dirty="0"/>
-              <a:t>* 	= Zero or more</a:t>
+              <a:t>* </a:t>
             </a:r>
           </a:p>
           <a:p>
             <a:pPr algn="l" hangingPunct="1"/>
             <a:r>
               <a:rPr lang="en-GB" sz="8800" b="1" dirty="0"/>
-              <a:t>+ 	= One or more</a:t>
+              <a:t>+ 	</a:t>
             </a:r>
           </a:p>
           <a:p>
             <a:pPr algn="l" hangingPunct="1"/>
             <a:r>
               <a:rPr lang="en-GB" sz="8800" b="1" dirty="0"/>
-              <a:t>? 	= Optional</a:t>
+              <a:t>? </a:t>
             </a:r>
           </a:p>
           <a:p>
             <a:pPr algn="l" hangingPunct="1"/>
             <a:r>
               <a:rPr lang="en-GB" sz="8800" b="1" dirty="0"/>
-              <a:t>|	= OR</a:t>
+              <a:t>|</a:t>
             </a:r>
           </a:p>
           <a:p>
             <a:pPr algn="l" hangingPunct="1"/>
             <a:r>
               <a:rPr lang="en-GB" sz="8800" b="1" dirty="0"/>
-              <a:t>()	= Group</a:t>
+              <a:t>()	</a:t>
             </a:r>
           </a:p>
         </p:txBody>
@@ -7937,13 +8291,13 @@
               </a:ln>
               <a:extLst>
                 <a:ext uri="{C572A759-6A51-4108-AA02-DFA0A04FC94B}">
-                  <ma14:wrappingTextBoxFlag xmlns="" xmlns:m="http://schemas.openxmlformats.org/officeDocument/2006/math" xmlns:ma14="http://schemas.microsoft.com/office/mac/drawingml/2011/main" val="1"/>
+                  <ma14:wrappingTextBoxFlag xmlns:ma14="http://schemas.microsoft.com/office/mac/drawingml/2011/main" xmlns:m="http://schemas.openxmlformats.org/officeDocument/2006/math" xmlns="" val="1"/>
                 </a:ext>
               </a:extLst>
             </p:spPr>
             <p:txBody>
               <a:bodyPr lIns="50800" tIns="50800" rIns="50800" bIns="50800">
-                <a:normAutofit/>
+                <a:normAutofit lnSpcReduction="10000"/>
               </a:bodyPr>
               <a:lstStyle>
                 <a:lvl1pPr marL="685800" marR="0" indent="-685800" algn="l" defTabSz="584200" rtl="0" latinLnBrk="0">
@@ -8223,7 +8577,7 @@
                     </m:oMathParaPr>
                     <m:oMath xmlns:m="http://schemas.openxmlformats.org/officeDocument/2006/math">
                       <m:r>
-                        <a:rPr lang="en-GB" b="1" i="1" smtClean="0">
+                        <a:rPr lang="en-GB" sz="9600" b="1" i="1" smtClean="0">
                           <a:solidFill>
                             <a:schemeClr val="tx1"/>
                           </a:solidFill>
@@ -8232,7 +8586,7 @@
                         <m:t>𝒂</m:t>
                       </m:r>
                       <m:r>
-                        <a:rPr lang="en-GB" b="1" i="1" smtClean="0">
+                        <a:rPr lang="en-GB" sz="9600" b="1" i="1" smtClean="0">
                           <a:solidFill>
                             <a:schemeClr val="tx1"/>
                           </a:solidFill>
@@ -8243,7 +8597,7 @@
                       <m:d>
                         <m:dPr>
                           <m:ctrlPr>
-                            <a:rPr lang="en-GB" b="1" i="1" smtClean="0">
+                            <a:rPr lang="en-GB" sz="9600" b="1" i="1" smtClean="0">
                               <a:solidFill>
                                 <a:schemeClr val="tx1"/>
                               </a:solidFill>
@@ -8253,7 +8607,7 @@
                         </m:dPr>
                         <m:e>
                           <m:r>
-                            <a:rPr lang="en-GB" b="1" i="1" smtClean="0">
+                            <a:rPr lang="en-GB" sz="9600" b="1" i="1" smtClean="0">
                               <a:solidFill>
                                 <a:schemeClr val="tx1"/>
                               </a:solidFill>
@@ -8264,7 +8618,7 @@
                         </m:e>
                         <m:e>
                           <m:r>
-                            <a:rPr lang="en-GB" b="1" i="1" smtClean="0">
+                            <a:rPr lang="en-GB" sz="9600" b="1" i="1" smtClean="0">
                               <a:solidFill>
                                 <a:schemeClr val="tx1"/>
                               </a:solidFill>
@@ -8275,7 +8629,7 @@
                         </m:e>
                       </m:d>
                       <m:r>
-                        <a:rPr lang="en-GB" b="1" i="1" smtClean="0">
+                        <a:rPr lang="en-GB" sz="9600" b="1" i="1" smtClean="0">
                           <a:solidFill>
                             <a:schemeClr val="tx1"/>
                           </a:solidFill>
@@ -8286,7 +8640,7 @@
                     </m:oMath>
                   </m:oMathPara>
                 </a14:m>
-                <a:endParaRPr lang="en-GB" b="1" dirty="0">
+                <a:endParaRPr lang="en-GB" sz="9600" b="1" dirty="0">
                   <a:solidFill>
                     <a:schemeClr val="tx1"/>
                   </a:solidFill>
@@ -8362,7 +8716,7 @@
               <a:blipFill>
                 <a:blip r:embed="rId3"/>
                 <a:stretch>
-                  <a:fillRect l="-2185" t="-5901"/>
+                  <a:fillRect l="-2185" t="-7453" b="-4037"/>
                 </a:stretch>
               </a:blipFill>
               <a:ln w="12700">
@@ -8370,7 +8724,7 @@
               </a:ln>
               <a:extLst>
                 <a:ext uri="{C572A759-6A51-4108-AA02-DFA0A04FC94B}">
-                  <ma14:wrappingTextBoxFlag xmlns="" xmlns:m="http://schemas.openxmlformats.org/officeDocument/2006/math" xmlns:a14="http://schemas.microsoft.com/office/drawing/2010/main" xmlns:ma14="http://schemas.microsoft.com/office/mac/drawingml/2011/main" val="1"/>
+                  <ma14:wrappingTextBoxFlag xmlns:ma14="http://schemas.microsoft.com/office/mac/drawingml/2011/main" xmlns:m="http://schemas.openxmlformats.org/officeDocument/2006/math" xmlns="" xmlns:a14="http://schemas.microsoft.com/office/drawing/2010/main" val="1"/>
                 </a:ext>
               </a:extLst>
             </p:spPr>
@@ -8389,792 +8743,813 @@
           </p:sp>
         </mc:Fallback>
       </mc:AlternateContent>
-      <mc:AlternateContent xmlns:mc="http://schemas.openxmlformats.org/markup-compatibility/2006">
-        <mc:Choice xmlns:a14="http://schemas.microsoft.com/office/drawing/2010/main" Requires="a14">
-          <p:sp>
-            <p:nvSpPr>
-              <p:cNvPr id="10" name="13B - Wednesday 25th January 2023">
+      <p:grpSp>
+        <p:nvGrpSpPr>
+          <p:cNvPr id="2" name="Group 1">
+            <a:extLst>
+              <a:ext uri="{FF2B5EF4-FFF2-40B4-BE49-F238E27FC236}">
+                <a16:creationId xmlns:a16="http://schemas.microsoft.com/office/drawing/2014/main" id="{93B82FA4-D674-B907-A127-1CC304F12A72}"/>
+              </a:ext>
+            </a:extLst>
+          </p:cNvPr>
+          <p:cNvGrpSpPr/>
+          <p:nvPr/>
+        </p:nvGrpSpPr>
+        <p:grpSpPr>
+          <a:xfrm>
+            <a:off x="12192000" y="5120641"/>
+            <a:ext cx="4432662" cy="1280160"/>
+            <a:chOff x="12192000" y="5120641"/>
+            <a:chExt cx="4432662" cy="1280160"/>
+          </a:xfrm>
+        </p:grpSpPr>
+        <mc:AlternateContent xmlns:mc="http://schemas.openxmlformats.org/markup-compatibility/2006">
+          <mc:Choice xmlns:a14="http://schemas.microsoft.com/office/drawing/2010/main" Requires="a14">
+            <p:sp>
+              <p:nvSpPr>
+                <p:cNvPr id="10" name="13B - Wednesday 25th January 2023">
+                  <a:extLst>
+                    <a:ext uri="{FF2B5EF4-FFF2-40B4-BE49-F238E27FC236}">
+                      <a16:creationId xmlns:a16="http://schemas.microsoft.com/office/drawing/2014/main" id="{882D97E4-197C-9CD3-EF5D-F80DEC024382}"/>
+                    </a:ext>
+                  </a:extLst>
+                </p:cNvPr>
+                <p:cNvSpPr txBox="1">
+                  <a:spLocks/>
+                </p:cNvSpPr>
+                <p:nvPr/>
+              </p:nvSpPr>
+              <p:spPr>
+                <a:xfrm>
+                  <a:off x="12192000" y="5120641"/>
+                  <a:ext cx="3753393" cy="1280160"/>
+                </a:xfrm>
+                <a:prstGeom prst="rect">
+                  <a:avLst/>
+                </a:prstGeom>
+                <a:ln w="12700">
+                  <a:miter lim="400000"/>
+                </a:ln>
                 <a:extLst>
-                  <a:ext uri="{FF2B5EF4-FFF2-40B4-BE49-F238E27FC236}">
-                    <a16:creationId xmlns:a16="http://schemas.microsoft.com/office/drawing/2014/main" id="{882D97E4-197C-9CD3-EF5D-F80DEC024382}"/>
+                  <a:ext uri="{C572A759-6A51-4108-AA02-DFA0A04FC94B}">
+                    <ma14:wrappingTextBoxFlag xmlns:ma14="http://schemas.microsoft.com/office/mac/drawingml/2011/main" xmlns:m="http://schemas.openxmlformats.org/officeDocument/2006/math" xmlns="" val="1"/>
                   </a:ext>
                 </a:extLst>
-              </p:cNvPr>
-              <p:cNvSpPr txBox="1">
-                <a:spLocks/>
-              </p:cNvSpPr>
-              <p:nvPr/>
-            </p:nvSpPr>
-            <p:spPr>
-              <a:xfrm>
-                <a:off x="12192000" y="5120641"/>
-                <a:ext cx="3753393" cy="1280160"/>
-              </a:xfrm>
-              <a:prstGeom prst="rect">
-                <a:avLst/>
-              </a:prstGeom>
-              <a:ln w="12700">
-                <a:miter lim="400000"/>
-              </a:ln>
-              <a:extLst>
-                <a:ext uri="{C572A759-6A51-4108-AA02-DFA0A04FC94B}">
-                  <ma14:wrappingTextBoxFlag xmlns="" xmlns:m="http://schemas.openxmlformats.org/officeDocument/2006/math" xmlns:ma14="http://schemas.microsoft.com/office/mac/drawingml/2011/main" val="1"/>
-                </a:ext>
-              </a:extLst>
-            </p:spPr>
-            <p:txBody>
-              <a:bodyPr lIns="50800" tIns="50800" rIns="50800" bIns="50800">
-                <a:noAutofit/>
-              </a:bodyPr>
-              <a:lstStyle>
-                <a:lvl1pPr marL="685800" marR="0" indent="-685800" algn="l" defTabSz="584200" rtl="0" latinLnBrk="0">
-                  <a:lnSpc>
-                    <a:spcPct val="80000"/>
-                  </a:lnSpc>
-                  <a:spcBef>
-                    <a:spcPts val="2400"/>
-                  </a:spcBef>
-                  <a:spcAft>
-                    <a:spcPts val="0"/>
-                  </a:spcAft>
-                  <a:buClr>
-                    <a:srgbClr val="57BEF0"/>
-                  </a:buClr>
-                  <a:buSzPct val="250000"/>
-                  <a:buFontTx/>
-                  <a:buChar char="-"/>
-                  <a:tabLst/>
-                  <a:defRPr sz="4200" b="1" i="0" u="none" strike="noStrike" cap="none" spc="0" baseline="0">
+              </p:spPr>
+              <p:txBody>
+                <a:bodyPr lIns="50800" tIns="50800" rIns="50800" bIns="50800">
+                  <a:noAutofit/>
+                </a:bodyPr>
+                <a:lstStyle>
+                  <a:lvl1pPr marL="685800" marR="0" indent="-685800" algn="l" defTabSz="584200" rtl="0" latinLnBrk="0">
+                    <a:lnSpc>
+                      <a:spcPct val="80000"/>
+                    </a:lnSpc>
+                    <a:spcBef>
+                      <a:spcPts val="2400"/>
+                    </a:spcBef>
+                    <a:spcAft>
+                      <a:spcPts val="0"/>
+                    </a:spcAft>
+                    <a:buClr>
+                      <a:srgbClr val="57BEF0"/>
+                    </a:buClr>
+                    <a:buSzPct val="250000"/>
+                    <a:buFontTx/>
+                    <a:buChar char="-"/>
+                    <a:tabLst/>
+                    <a:defRPr sz="4200" b="1" i="0" u="none" strike="noStrike" cap="none" spc="0" baseline="0">
+                      <a:solidFill>
+                        <a:srgbClr val="53585F"/>
+                      </a:solidFill>
+                      <a:uFillTx/>
+                      <a:latin typeface="Proxima Nova"/>
+                      <a:ea typeface="Proxima Nova"/>
+                      <a:cs typeface="Proxima Nova"/>
+                      <a:sym typeface="Proxima Nova"/>
+                    </a:defRPr>
+                  </a:lvl1pPr>
+                  <a:lvl2pPr marL="1371600" marR="0" indent="-685800" algn="l" defTabSz="584200" rtl="0" latinLnBrk="0">
+                    <a:lnSpc>
+                      <a:spcPct val="80000"/>
+                    </a:lnSpc>
+                    <a:spcBef>
+                      <a:spcPts val="2400"/>
+                    </a:spcBef>
+                    <a:spcAft>
+                      <a:spcPts val="0"/>
+                    </a:spcAft>
+                    <a:buClr>
+                      <a:srgbClr val="57BEF0"/>
+                    </a:buClr>
+                    <a:buSzPct val="250000"/>
+                    <a:buFontTx/>
+                    <a:buChar char="-"/>
+                    <a:tabLst/>
+                    <a:defRPr sz="4200" b="1" i="0" u="none" strike="noStrike" cap="none" spc="0" baseline="0">
+                      <a:solidFill>
+                        <a:srgbClr val="53585F"/>
+                      </a:solidFill>
+                      <a:uFillTx/>
+                      <a:latin typeface="Proxima Nova"/>
+                      <a:ea typeface="Proxima Nova"/>
+                      <a:cs typeface="Proxima Nova"/>
+                      <a:sym typeface="Proxima Nova"/>
+                    </a:defRPr>
+                  </a:lvl2pPr>
+                  <a:lvl3pPr marL="2057400" marR="0" indent="-685800" algn="l" defTabSz="584200" rtl="0" latinLnBrk="0">
+                    <a:lnSpc>
+                      <a:spcPct val="80000"/>
+                    </a:lnSpc>
+                    <a:spcBef>
+                      <a:spcPts val="2400"/>
+                    </a:spcBef>
+                    <a:spcAft>
+                      <a:spcPts val="0"/>
+                    </a:spcAft>
+                    <a:buClr>
+                      <a:srgbClr val="57BEF0"/>
+                    </a:buClr>
+                    <a:buSzPct val="250000"/>
+                    <a:buFontTx/>
+                    <a:buChar char="-"/>
+                    <a:tabLst/>
+                    <a:defRPr sz="4200" b="1" i="0" u="none" strike="noStrike" cap="none" spc="0" baseline="0">
+                      <a:solidFill>
+                        <a:srgbClr val="53585F"/>
+                      </a:solidFill>
+                      <a:uFillTx/>
+                      <a:latin typeface="Proxima Nova"/>
+                      <a:ea typeface="Proxima Nova"/>
+                      <a:cs typeface="Proxima Nova"/>
+                      <a:sym typeface="Proxima Nova"/>
+                    </a:defRPr>
+                  </a:lvl3pPr>
+                  <a:lvl4pPr marL="2743200" marR="0" indent="-685800" algn="l" defTabSz="584200" rtl="0" latinLnBrk="0">
+                    <a:lnSpc>
+                      <a:spcPct val="80000"/>
+                    </a:lnSpc>
+                    <a:spcBef>
+                      <a:spcPts val="2400"/>
+                    </a:spcBef>
+                    <a:spcAft>
+                      <a:spcPts val="0"/>
+                    </a:spcAft>
+                    <a:buClr>
+                      <a:srgbClr val="57BEF0"/>
+                    </a:buClr>
+                    <a:buSzPct val="250000"/>
+                    <a:buFontTx/>
+                    <a:buChar char="-"/>
+                    <a:tabLst/>
+                    <a:defRPr sz="4200" b="1" i="0" u="none" strike="noStrike" cap="none" spc="0" baseline="0">
+                      <a:solidFill>
+                        <a:srgbClr val="53585F"/>
+                      </a:solidFill>
+                      <a:uFillTx/>
+                      <a:latin typeface="Proxima Nova"/>
+                      <a:ea typeface="Proxima Nova"/>
+                      <a:cs typeface="Proxima Nova"/>
+                      <a:sym typeface="Proxima Nova"/>
+                    </a:defRPr>
+                  </a:lvl4pPr>
+                  <a:lvl5pPr marL="3429000" marR="0" indent="-685800" algn="l" defTabSz="584200" rtl="0" latinLnBrk="0">
+                    <a:lnSpc>
+                      <a:spcPct val="80000"/>
+                    </a:lnSpc>
+                    <a:spcBef>
+                      <a:spcPts val="2400"/>
+                    </a:spcBef>
+                    <a:spcAft>
+                      <a:spcPts val="0"/>
+                    </a:spcAft>
+                    <a:buClr>
+                      <a:srgbClr val="57BEF0"/>
+                    </a:buClr>
+                    <a:buSzPct val="250000"/>
+                    <a:buFontTx/>
+                    <a:buChar char="-"/>
+                    <a:tabLst/>
+                    <a:defRPr sz="4200" b="1" i="0" u="none" strike="noStrike" cap="none" spc="0" baseline="0">
+                      <a:solidFill>
+                        <a:srgbClr val="53585F"/>
+                      </a:solidFill>
+                      <a:uFillTx/>
+                      <a:latin typeface="Proxima Nova"/>
+                      <a:ea typeface="Proxima Nova"/>
+                      <a:cs typeface="Proxima Nova"/>
+                      <a:sym typeface="Proxima Nova"/>
+                    </a:defRPr>
+                  </a:lvl5pPr>
+                  <a:lvl6pPr marL="4114800" marR="0" indent="-685800" algn="l" defTabSz="584200" rtl="0" latinLnBrk="0">
+                    <a:lnSpc>
+                      <a:spcPct val="80000"/>
+                    </a:lnSpc>
+                    <a:spcBef>
+                      <a:spcPts val="2400"/>
+                    </a:spcBef>
+                    <a:spcAft>
+                      <a:spcPts val="0"/>
+                    </a:spcAft>
+                    <a:buClr>
+                      <a:srgbClr val="57BEF0"/>
+                    </a:buClr>
+                    <a:buSzPct val="250000"/>
+                    <a:buFontTx/>
+                    <a:buChar char="-"/>
+                    <a:tabLst/>
+                    <a:defRPr sz="4200" b="1" i="0" u="none" strike="noStrike" cap="none" spc="0" baseline="0">
+                      <a:solidFill>
+                        <a:srgbClr val="53585F"/>
+                      </a:solidFill>
+                      <a:uFillTx/>
+                      <a:latin typeface="Proxima Nova"/>
+                      <a:ea typeface="Proxima Nova"/>
+                      <a:cs typeface="Proxima Nova"/>
+                      <a:sym typeface="Proxima Nova"/>
+                    </a:defRPr>
+                  </a:lvl6pPr>
+                  <a:lvl7pPr marL="4800600" marR="0" indent="-685800" algn="l" defTabSz="584200" rtl="0" latinLnBrk="0">
+                    <a:lnSpc>
+                      <a:spcPct val="80000"/>
+                    </a:lnSpc>
+                    <a:spcBef>
+                      <a:spcPts val="2400"/>
+                    </a:spcBef>
+                    <a:spcAft>
+                      <a:spcPts val="0"/>
+                    </a:spcAft>
+                    <a:buClr>
+                      <a:srgbClr val="57BEF0"/>
+                    </a:buClr>
+                    <a:buSzPct val="250000"/>
+                    <a:buFontTx/>
+                    <a:buChar char="-"/>
+                    <a:tabLst/>
+                    <a:defRPr sz="4200" b="1" i="0" u="none" strike="noStrike" cap="none" spc="0" baseline="0">
+                      <a:solidFill>
+                        <a:srgbClr val="53585F"/>
+                      </a:solidFill>
+                      <a:uFillTx/>
+                      <a:latin typeface="Proxima Nova"/>
+                      <a:ea typeface="Proxima Nova"/>
+                      <a:cs typeface="Proxima Nova"/>
+                      <a:sym typeface="Proxima Nova"/>
+                    </a:defRPr>
+                  </a:lvl7pPr>
+                  <a:lvl8pPr marL="5486400" marR="0" indent="-685800" algn="l" defTabSz="584200" rtl="0" latinLnBrk="0">
+                    <a:lnSpc>
+                      <a:spcPct val="80000"/>
+                    </a:lnSpc>
+                    <a:spcBef>
+                      <a:spcPts val="2400"/>
+                    </a:spcBef>
+                    <a:spcAft>
+                      <a:spcPts val="0"/>
+                    </a:spcAft>
+                    <a:buClr>
+                      <a:srgbClr val="57BEF0"/>
+                    </a:buClr>
+                    <a:buSzPct val="250000"/>
+                    <a:buFontTx/>
+                    <a:buChar char="-"/>
+                    <a:tabLst/>
+                    <a:defRPr sz="4200" b="1" i="0" u="none" strike="noStrike" cap="none" spc="0" baseline="0">
+                      <a:solidFill>
+                        <a:srgbClr val="53585F"/>
+                      </a:solidFill>
+                      <a:uFillTx/>
+                      <a:latin typeface="Proxima Nova"/>
+                      <a:ea typeface="Proxima Nova"/>
+                      <a:cs typeface="Proxima Nova"/>
+                      <a:sym typeface="Proxima Nova"/>
+                    </a:defRPr>
+                  </a:lvl8pPr>
+                  <a:lvl9pPr marL="6172200" marR="0" indent="-685800" algn="l" defTabSz="584200" rtl="0" latinLnBrk="0">
+                    <a:lnSpc>
+                      <a:spcPct val="80000"/>
+                    </a:lnSpc>
+                    <a:spcBef>
+                      <a:spcPts val="2400"/>
+                    </a:spcBef>
+                    <a:spcAft>
+                      <a:spcPts val="0"/>
+                    </a:spcAft>
+                    <a:buClr>
+                      <a:srgbClr val="57BEF0"/>
+                    </a:buClr>
+                    <a:buSzPct val="250000"/>
+                    <a:buFontTx/>
+                    <a:buChar char="-"/>
+                    <a:tabLst/>
+                    <a:defRPr sz="4200" b="1" i="0" u="none" strike="noStrike" cap="none" spc="0" baseline="0">
+                      <a:solidFill>
+                        <a:srgbClr val="53585F"/>
+                      </a:solidFill>
+                      <a:uFillTx/>
+                      <a:latin typeface="Proxima Nova"/>
+                      <a:ea typeface="Proxima Nova"/>
+                      <a:cs typeface="Proxima Nova"/>
+                      <a:sym typeface="Proxima Nova"/>
+                    </a:defRPr>
+                  </a:lvl9pPr>
+                </a:lstStyle>
+                <a:p>
+                  <a:pPr marL="0" indent="0" hangingPunct="1">
+                    <a:buNone/>
+                  </a:pPr>
+                  <a14:m>
+                    <m:oMathPara xmlns:m="http://schemas.openxmlformats.org/officeDocument/2006/math">
+                      <m:oMathParaPr>
+                        <m:jc m:val="left"/>
+                      </m:oMathParaPr>
+                      <m:oMath xmlns:m="http://schemas.openxmlformats.org/officeDocument/2006/math">
+                        <m:d>
+                          <m:dPr>
+                            <m:begChr m:val="["/>
+                            <m:endChr m:val="]"/>
+                            <m:ctrlPr>
+                              <a:rPr lang="en-GB" sz="8800" b="1" i="1" smtClean="0">
+                                <a:solidFill>
+                                  <a:schemeClr val="tx1"/>
+                                </a:solidFill>
+                                <a:latin typeface="Cambria Math" panose="02040503050406030204" pitchFamily="18" charset="0"/>
+                              </a:rPr>
+                            </m:ctrlPr>
+                          </m:dPr>
+                          <m:e>
+                            <m:r>
+                              <a:rPr lang="en-GB" sz="8800" b="1" i="1" smtClean="0">
+                                <a:solidFill>
+                                  <a:schemeClr val="tx1"/>
+                                </a:solidFill>
+                                <a:latin typeface="Cambria Math" panose="02040503050406030204" pitchFamily="18" charset="0"/>
+                              </a:rPr>
+                              <m:t>𝟎</m:t>
+                            </m:r>
+                            <m:r>
+                              <a:rPr lang="en-GB" sz="8800" b="1" i="1" smtClean="0">
+                                <a:solidFill>
+                                  <a:schemeClr val="tx1"/>
+                                </a:solidFill>
+                                <a:latin typeface="Cambria Math" panose="02040503050406030204" pitchFamily="18" charset="0"/>
+                              </a:rPr>
+                              <m:t>−</m:t>
+                            </m:r>
+                            <m:r>
+                              <a:rPr lang="en-GB" sz="8800" b="1" i="1" smtClean="0">
+                                <a:solidFill>
+                                  <a:schemeClr val="tx1"/>
+                                </a:solidFill>
+                                <a:latin typeface="Cambria Math" panose="02040503050406030204" pitchFamily="18" charset="0"/>
+                              </a:rPr>
+                              <m:t>𝟗</m:t>
+                            </m:r>
+                          </m:e>
+                        </m:d>
+                      </m:oMath>
+                    </m:oMathPara>
+                  </a14:m>
+                  <a:endParaRPr lang="en-GB" sz="8800" b="1" dirty="0">
                     <a:solidFill>
-                      <a:srgbClr val="53585F"/>
+                      <a:schemeClr val="tx1"/>
                     </a:solidFill>
-                    <a:uFillTx/>
-                    <a:latin typeface="Proxima Nova"/>
-                    <a:ea typeface="Proxima Nova"/>
-                    <a:cs typeface="Proxima Nova"/>
-                    <a:sym typeface="Proxima Nova"/>
-                  </a:defRPr>
-                </a:lvl1pPr>
-                <a:lvl2pPr marL="1371600" marR="0" indent="-685800" algn="l" defTabSz="584200" rtl="0" latinLnBrk="0">
-                  <a:lnSpc>
-                    <a:spcPct val="80000"/>
-                  </a:lnSpc>
-                  <a:spcBef>
-                    <a:spcPts val="2400"/>
-                  </a:spcBef>
-                  <a:spcAft>
-                    <a:spcPts val="0"/>
-                  </a:spcAft>
-                  <a:buClr>
-                    <a:srgbClr val="57BEF0"/>
-                  </a:buClr>
-                  <a:buSzPct val="250000"/>
-                  <a:buFontTx/>
-                  <a:buChar char="-"/>
-                  <a:tabLst/>
-                  <a:defRPr sz="4200" b="1" i="0" u="none" strike="noStrike" cap="none" spc="0" baseline="0">
-                    <a:solidFill>
-                      <a:srgbClr val="53585F"/>
-                    </a:solidFill>
-                    <a:uFillTx/>
-                    <a:latin typeface="Proxima Nova"/>
-                    <a:ea typeface="Proxima Nova"/>
-                    <a:cs typeface="Proxima Nova"/>
-                    <a:sym typeface="Proxima Nova"/>
-                  </a:defRPr>
-                </a:lvl2pPr>
-                <a:lvl3pPr marL="2057400" marR="0" indent="-685800" algn="l" defTabSz="584200" rtl="0" latinLnBrk="0">
-                  <a:lnSpc>
-                    <a:spcPct val="80000"/>
-                  </a:lnSpc>
-                  <a:spcBef>
-                    <a:spcPts val="2400"/>
-                  </a:spcBef>
-                  <a:spcAft>
-                    <a:spcPts val="0"/>
-                  </a:spcAft>
-                  <a:buClr>
-                    <a:srgbClr val="57BEF0"/>
-                  </a:buClr>
-                  <a:buSzPct val="250000"/>
-                  <a:buFontTx/>
-                  <a:buChar char="-"/>
-                  <a:tabLst/>
-                  <a:defRPr sz="4200" b="1" i="0" u="none" strike="noStrike" cap="none" spc="0" baseline="0">
-                    <a:solidFill>
-                      <a:srgbClr val="53585F"/>
-                    </a:solidFill>
-                    <a:uFillTx/>
-                    <a:latin typeface="Proxima Nova"/>
-                    <a:ea typeface="Proxima Nova"/>
-                    <a:cs typeface="Proxima Nova"/>
-                    <a:sym typeface="Proxima Nova"/>
-                  </a:defRPr>
-                </a:lvl3pPr>
-                <a:lvl4pPr marL="2743200" marR="0" indent="-685800" algn="l" defTabSz="584200" rtl="0" latinLnBrk="0">
-                  <a:lnSpc>
-                    <a:spcPct val="80000"/>
-                  </a:lnSpc>
-                  <a:spcBef>
-                    <a:spcPts val="2400"/>
-                  </a:spcBef>
-                  <a:spcAft>
-                    <a:spcPts val="0"/>
-                  </a:spcAft>
-                  <a:buClr>
-                    <a:srgbClr val="57BEF0"/>
-                  </a:buClr>
-                  <a:buSzPct val="250000"/>
-                  <a:buFontTx/>
-                  <a:buChar char="-"/>
-                  <a:tabLst/>
-                  <a:defRPr sz="4200" b="1" i="0" u="none" strike="noStrike" cap="none" spc="0" baseline="0">
-                    <a:solidFill>
-                      <a:srgbClr val="53585F"/>
-                    </a:solidFill>
-                    <a:uFillTx/>
-                    <a:latin typeface="Proxima Nova"/>
-                    <a:ea typeface="Proxima Nova"/>
-                    <a:cs typeface="Proxima Nova"/>
-                    <a:sym typeface="Proxima Nova"/>
-                  </a:defRPr>
-                </a:lvl4pPr>
-                <a:lvl5pPr marL="3429000" marR="0" indent="-685800" algn="l" defTabSz="584200" rtl="0" latinLnBrk="0">
-                  <a:lnSpc>
-                    <a:spcPct val="80000"/>
-                  </a:lnSpc>
-                  <a:spcBef>
-                    <a:spcPts val="2400"/>
-                  </a:spcBef>
-                  <a:spcAft>
-                    <a:spcPts val="0"/>
-                  </a:spcAft>
-                  <a:buClr>
-                    <a:srgbClr val="57BEF0"/>
-                  </a:buClr>
-                  <a:buSzPct val="250000"/>
-                  <a:buFontTx/>
-                  <a:buChar char="-"/>
-                  <a:tabLst/>
-                  <a:defRPr sz="4200" b="1" i="0" u="none" strike="noStrike" cap="none" spc="0" baseline="0">
-                    <a:solidFill>
-                      <a:srgbClr val="53585F"/>
-                    </a:solidFill>
-                    <a:uFillTx/>
-                    <a:latin typeface="Proxima Nova"/>
-                    <a:ea typeface="Proxima Nova"/>
-                    <a:cs typeface="Proxima Nova"/>
-                    <a:sym typeface="Proxima Nova"/>
-                  </a:defRPr>
-                </a:lvl5pPr>
-                <a:lvl6pPr marL="4114800" marR="0" indent="-685800" algn="l" defTabSz="584200" rtl="0" latinLnBrk="0">
-                  <a:lnSpc>
-                    <a:spcPct val="80000"/>
-                  </a:lnSpc>
-                  <a:spcBef>
-                    <a:spcPts val="2400"/>
-                  </a:spcBef>
-                  <a:spcAft>
-                    <a:spcPts val="0"/>
-                  </a:spcAft>
-                  <a:buClr>
-                    <a:srgbClr val="57BEF0"/>
-                  </a:buClr>
-                  <a:buSzPct val="250000"/>
-                  <a:buFontTx/>
-                  <a:buChar char="-"/>
-                  <a:tabLst/>
-                  <a:defRPr sz="4200" b="1" i="0" u="none" strike="noStrike" cap="none" spc="0" baseline="0">
-                    <a:solidFill>
-                      <a:srgbClr val="53585F"/>
-                    </a:solidFill>
-                    <a:uFillTx/>
-                    <a:latin typeface="Proxima Nova"/>
-                    <a:ea typeface="Proxima Nova"/>
-                    <a:cs typeface="Proxima Nova"/>
-                    <a:sym typeface="Proxima Nova"/>
-                  </a:defRPr>
-                </a:lvl6pPr>
-                <a:lvl7pPr marL="4800600" marR="0" indent="-685800" algn="l" defTabSz="584200" rtl="0" latinLnBrk="0">
-                  <a:lnSpc>
-                    <a:spcPct val="80000"/>
-                  </a:lnSpc>
-                  <a:spcBef>
-                    <a:spcPts val="2400"/>
-                  </a:spcBef>
-                  <a:spcAft>
-                    <a:spcPts val="0"/>
-                  </a:spcAft>
-                  <a:buClr>
-                    <a:srgbClr val="57BEF0"/>
-                  </a:buClr>
-                  <a:buSzPct val="250000"/>
-                  <a:buFontTx/>
-                  <a:buChar char="-"/>
-                  <a:tabLst/>
-                  <a:defRPr sz="4200" b="1" i="0" u="none" strike="noStrike" cap="none" spc="0" baseline="0">
-                    <a:solidFill>
-                      <a:srgbClr val="53585F"/>
-                    </a:solidFill>
-                    <a:uFillTx/>
-                    <a:latin typeface="Proxima Nova"/>
-                    <a:ea typeface="Proxima Nova"/>
-                    <a:cs typeface="Proxima Nova"/>
-                    <a:sym typeface="Proxima Nova"/>
-                  </a:defRPr>
-                </a:lvl7pPr>
-                <a:lvl8pPr marL="5486400" marR="0" indent="-685800" algn="l" defTabSz="584200" rtl="0" latinLnBrk="0">
-                  <a:lnSpc>
-                    <a:spcPct val="80000"/>
-                  </a:lnSpc>
-                  <a:spcBef>
-                    <a:spcPts val="2400"/>
-                  </a:spcBef>
-                  <a:spcAft>
-                    <a:spcPts val="0"/>
-                  </a:spcAft>
-                  <a:buClr>
-                    <a:srgbClr val="57BEF0"/>
-                  </a:buClr>
-                  <a:buSzPct val="250000"/>
-                  <a:buFontTx/>
-                  <a:buChar char="-"/>
-                  <a:tabLst/>
-                  <a:defRPr sz="4200" b="1" i="0" u="none" strike="noStrike" cap="none" spc="0" baseline="0">
-                    <a:solidFill>
-                      <a:srgbClr val="53585F"/>
-                    </a:solidFill>
-                    <a:uFillTx/>
-                    <a:latin typeface="Proxima Nova"/>
-                    <a:ea typeface="Proxima Nova"/>
-                    <a:cs typeface="Proxima Nova"/>
-                    <a:sym typeface="Proxima Nova"/>
-                  </a:defRPr>
-                </a:lvl8pPr>
-                <a:lvl9pPr marL="6172200" marR="0" indent="-685800" algn="l" defTabSz="584200" rtl="0" latinLnBrk="0">
-                  <a:lnSpc>
-                    <a:spcPct val="80000"/>
-                  </a:lnSpc>
-                  <a:spcBef>
-                    <a:spcPts val="2400"/>
-                  </a:spcBef>
-                  <a:spcAft>
-                    <a:spcPts val="0"/>
-                  </a:spcAft>
-                  <a:buClr>
-                    <a:srgbClr val="57BEF0"/>
-                  </a:buClr>
-                  <a:buSzPct val="250000"/>
-                  <a:buFontTx/>
-                  <a:buChar char="-"/>
-                  <a:tabLst/>
-                  <a:defRPr sz="4200" b="1" i="0" u="none" strike="noStrike" cap="none" spc="0" baseline="0">
-                    <a:solidFill>
-                      <a:srgbClr val="53585F"/>
-                    </a:solidFill>
-                    <a:uFillTx/>
-                    <a:latin typeface="Proxima Nova"/>
-                    <a:ea typeface="Proxima Nova"/>
-                    <a:cs typeface="Proxima Nova"/>
-                    <a:sym typeface="Proxima Nova"/>
-                  </a:defRPr>
-                </a:lvl9pPr>
-              </a:lstStyle>
-              <a:p>
-                <a:pPr marL="0" indent="0" hangingPunct="1">
-                  <a:buNone/>
-                </a:pPr>
-                <a14:m>
-                  <m:oMathPara xmlns:m="http://schemas.openxmlformats.org/officeDocument/2006/math">
-                    <m:oMathParaPr>
-                      <m:jc m:val="left"/>
-                    </m:oMathParaPr>
-                    <m:oMath xmlns:m="http://schemas.openxmlformats.org/officeDocument/2006/math">
-                      <m:d>
-                        <m:dPr>
-                          <m:begChr m:val="["/>
-                          <m:endChr m:val="]"/>
-                          <m:ctrlPr>
-                            <a:rPr lang="en-GB" sz="8800" b="1" i="1" smtClean="0">
-                              <a:solidFill>
-                                <a:schemeClr val="tx1"/>
-                              </a:solidFill>
-                              <a:latin typeface="Cambria Math" panose="02040503050406030204" pitchFamily="18" charset="0"/>
-                            </a:rPr>
-                          </m:ctrlPr>
-                        </m:dPr>
-                        <m:e>
-                          <m:r>
-                            <a:rPr lang="en-GB" sz="8800" b="1" i="1" smtClean="0">
-                              <a:solidFill>
-                                <a:schemeClr val="tx1"/>
-                              </a:solidFill>
-                              <a:latin typeface="Cambria Math" panose="02040503050406030204" pitchFamily="18" charset="0"/>
-                            </a:rPr>
-                            <m:t>𝟎</m:t>
-                          </m:r>
-                          <m:r>
-                            <a:rPr lang="en-GB" sz="8800" b="1" i="1" smtClean="0">
-                              <a:solidFill>
-                                <a:schemeClr val="tx1"/>
-                              </a:solidFill>
-                              <a:latin typeface="Cambria Math" panose="02040503050406030204" pitchFamily="18" charset="0"/>
-                            </a:rPr>
-                            <m:t>−</m:t>
-                          </m:r>
-                          <m:r>
-                            <a:rPr lang="en-GB" sz="8800" b="1" i="1" smtClean="0">
-                              <a:solidFill>
-                                <a:schemeClr val="tx1"/>
-                              </a:solidFill>
-                              <a:latin typeface="Cambria Math" panose="02040503050406030204" pitchFamily="18" charset="0"/>
-                            </a:rPr>
-                            <m:t>𝟗</m:t>
-                          </m:r>
-                        </m:e>
-                      </m:d>
-                    </m:oMath>
-                  </m:oMathPara>
-                </a14:m>
-                <a:endParaRPr lang="en-GB" sz="8800" b="1" dirty="0">
-                  <a:solidFill>
-                    <a:schemeClr val="tx1"/>
-                  </a:solidFill>
-                </a:endParaRPr>
-              </a:p>
-            </p:txBody>
-          </p:sp>
-        </mc:Choice>
-        <mc:Fallback>
-          <p:sp>
-            <p:nvSpPr>
-              <p:cNvPr id="10" name="13B - Wednesday 25th January 2023">
+                  </a:endParaRPr>
+                </a:p>
+              </p:txBody>
+            </p:sp>
+          </mc:Choice>
+          <mc:Fallback>
+            <p:sp>
+              <p:nvSpPr>
+                <p:cNvPr id="10" name="13B - Wednesday 25th January 2023">
+                  <a:extLst>
+                    <a:ext uri="{FF2B5EF4-FFF2-40B4-BE49-F238E27FC236}">
+                      <a16:creationId xmlns:a16="http://schemas.microsoft.com/office/drawing/2014/main" id="{882D97E4-197C-9CD3-EF5D-F80DEC024382}"/>
+                    </a:ext>
+                  </a:extLst>
+                </p:cNvPr>
+                <p:cNvSpPr txBox="1">
+                  <a:spLocks noRot="1" noChangeAspect="1" noMove="1" noResize="1" noEditPoints="1" noAdjustHandles="1" noChangeArrowheads="1" noChangeShapeType="1" noTextEdit="1"/>
+                </p:cNvSpPr>
+                <p:nvPr/>
+              </p:nvSpPr>
+              <p:spPr>
+                <a:xfrm>
+                  <a:off x="12192000" y="5120641"/>
+                  <a:ext cx="3753393" cy="1280160"/>
+                </a:xfrm>
+                <a:prstGeom prst="rect">
+                  <a:avLst/>
+                </a:prstGeom>
+                <a:blipFill>
+                  <a:blip r:embed="rId4"/>
+                  <a:stretch>
+                    <a:fillRect t="-5882"/>
+                  </a:stretch>
+                </a:blipFill>
+                <a:ln w="12700">
+                  <a:miter lim="400000"/>
+                </a:ln>
                 <a:extLst>
-                  <a:ext uri="{FF2B5EF4-FFF2-40B4-BE49-F238E27FC236}">
-                    <a16:creationId xmlns:a16="http://schemas.microsoft.com/office/drawing/2014/main" id="{882D97E4-197C-9CD3-EF5D-F80DEC024382}"/>
+                  <a:ext uri="{C572A759-6A51-4108-AA02-DFA0A04FC94B}">
+                    <ma14:wrappingTextBoxFlag xmlns:ma14="http://schemas.microsoft.com/office/mac/drawingml/2011/main" xmlns:m="http://schemas.openxmlformats.org/officeDocument/2006/math" xmlns="" xmlns:a14="http://schemas.microsoft.com/office/drawing/2010/main" val="1"/>
                   </a:ext>
                 </a:extLst>
-              </p:cNvPr>
-              <p:cNvSpPr txBox="1">
-                <a:spLocks noRot="1" noChangeAspect="1" noMove="1" noResize="1" noEditPoints="1" noAdjustHandles="1" noChangeArrowheads="1" noChangeShapeType="1" noTextEdit="1"/>
-              </p:cNvSpPr>
-              <p:nvPr/>
-            </p:nvSpPr>
-            <p:spPr>
-              <a:xfrm>
-                <a:off x="12192000" y="5120641"/>
-                <a:ext cx="3753393" cy="1280160"/>
-              </a:xfrm>
-              <a:prstGeom prst="rect">
-                <a:avLst/>
-              </a:prstGeom>
-              <a:blipFill>
-                <a:blip r:embed="rId4"/>
-                <a:stretch>
-                  <a:fillRect t="-5882"/>
-                </a:stretch>
-              </a:blipFill>
-              <a:ln w="12700">
-                <a:miter lim="400000"/>
-              </a:ln>
-              <a:extLst>
-                <a:ext uri="{C572A759-6A51-4108-AA02-DFA0A04FC94B}">
-                  <ma14:wrappingTextBoxFlag xmlns="" xmlns:m="http://schemas.openxmlformats.org/officeDocument/2006/math" xmlns:a14="http://schemas.microsoft.com/office/drawing/2010/main" xmlns:ma14="http://schemas.microsoft.com/office/mac/drawingml/2011/main" val="1"/>
-                </a:ext>
-              </a:extLst>
-            </p:spPr>
-            <p:txBody>
-              <a:bodyPr/>
-              <a:lstStyle/>
-              <a:p>
-                <a:r>
-                  <a:rPr lang="en-US">
-                    <a:noFill/>
-                  </a:rPr>
-                  <a:t> </a:t>
-                </a:r>
-              </a:p>
-            </p:txBody>
-          </p:sp>
-        </mc:Fallback>
-      </mc:AlternateContent>
-      <mc:AlternateContent xmlns:mc="http://schemas.openxmlformats.org/markup-compatibility/2006">
-        <mc:Choice xmlns:a14="http://schemas.microsoft.com/office/drawing/2010/main" Requires="a14">
-          <p:sp>
-            <p:nvSpPr>
-              <p:cNvPr id="11" name="13B - Wednesday 25th January 2023">
+              </p:spPr>
+              <p:txBody>
+                <a:bodyPr/>
+                <a:lstStyle/>
+                <a:p>
+                  <a:r>
+                    <a:rPr lang="en-US">
+                      <a:noFill/>
+                    </a:rPr>
+                    <a:t> </a:t>
+                  </a:r>
+                </a:p>
+              </p:txBody>
+            </p:sp>
+          </mc:Fallback>
+        </mc:AlternateContent>
+        <mc:AlternateContent xmlns:mc="http://schemas.openxmlformats.org/markup-compatibility/2006">
+          <mc:Choice xmlns:a14="http://schemas.microsoft.com/office/drawing/2010/main" Requires="a14">
+            <p:sp>
+              <p:nvSpPr>
+                <p:cNvPr id="11" name="13B - Wednesday 25th January 2023">
+                  <a:extLst>
+                    <a:ext uri="{FF2B5EF4-FFF2-40B4-BE49-F238E27FC236}">
+                      <a16:creationId xmlns:a16="http://schemas.microsoft.com/office/drawing/2014/main" id="{5066A015-47EA-AEFB-85A6-0535BC7A5CF1}"/>
+                    </a:ext>
+                  </a:extLst>
+                </p:cNvPr>
+                <p:cNvSpPr txBox="1">
+                  <a:spLocks/>
+                </p:cNvSpPr>
+                <p:nvPr/>
+              </p:nvSpPr>
+              <p:spPr>
+                <a:xfrm>
+                  <a:off x="15736387" y="5120641"/>
+                  <a:ext cx="888275" cy="1280160"/>
+                </a:xfrm>
+                <a:prstGeom prst="rect">
+                  <a:avLst/>
+                </a:prstGeom>
+                <a:ln w="12700">
+                  <a:miter lim="400000"/>
+                </a:ln>
                 <a:extLst>
-                  <a:ext uri="{FF2B5EF4-FFF2-40B4-BE49-F238E27FC236}">
-                    <a16:creationId xmlns:a16="http://schemas.microsoft.com/office/drawing/2014/main" id="{5066A015-47EA-AEFB-85A6-0535BC7A5CF1}"/>
+                  <a:ext uri="{C572A759-6A51-4108-AA02-DFA0A04FC94B}">
+                    <ma14:wrappingTextBoxFlag xmlns:ma14="http://schemas.microsoft.com/office/mac/drawingml/2011/main" xmlns:m="http://schemas.openxmlformats.org/officeDocument/2006/math" xmlns="" val="1"/>
                   </a:ext>
                 </a:extLst>
-              </p:cNvPr>
-              <p:cNvSpPr txBox="1">
-                <a:spLocks/>
-              </p:cNvSpPr>
-              <p:nvPr/>
-            </p:nvSpPr>
-            <p:spPr>
-              <a:xfrm>
-                <a:off x="15736387" y="5120641"/>
-                <a:ext cx="888275" cy="1280160"/>
-              </a:xfrm>
-              <a:prstGeom prst="rect">
-                <a:avLst/>
-              </a:prstGeom>
-              <a:ln w="12700">
-                <a:miter lim="400000"/>
-              </a:ln>
-              <a:extLst>
-                <a:ext uri="{C572A759-6A51-4108-AA02-DFA0A04FC94B}">
-                  <ma14:wrappingTextBoxFlag xmlns="" xmlns:m="http://schemas.openxmlformats.org/officeDocument/2006/math" xmlns:ma14="http://schemas.microsoft.com/office/mac/drawingml/2011/main" val="1"/>
-                </a:ext>
-              </a:extLst>
-            </p:spPr>
-            <p:txBody>
-              <a:bodyPr lIns="50800" tIns="50800" rIns="50800" bIns="50800">
-                <a:noAutofit/>
-              </a:bodyPr>
-              <a:lstStyle>
-                <a:lvl1pPr marL="685800" marR="0" indent="-685800" algn="l" defTabSz="584200" rtl="0" latinLnBrk="0">
-                  <a:lnSpc>
-                    <a:spcPct val="80000"/>
-                  </a:lnSpc>
-                  <a:spcBef>
-                    <a:spcPts val="2400"/>
-                  </a:spcBef>
-                  <a:spcAft>
-                    <a:spcPts val="0"/>
-                  </a:spcAft>
-                  <a:buClr>
-                    <a:srgbClr val="57BEF0"/>
-                  </a:buClr>
-                  <a:buSzPct val="250000"/>
-                  <a:buFontTx/>
-                  <a:buChar char="-"/>
-                  <a:tabLst/>
-                  <a:defRPr sz="4200" b="1" i="0" u="none" strike="noStrike" cap="none" spc="0" baseline="0">
+              </p:spPr>
+              <p:txBody>
+                <a:bodyPr lIns="50800" tIns="50800" rIns="50800" bIns="50800">
+                  <a:noAutofit/>
+                </a:bodyPr>
+                <a:lstStyle>
+                  <a:lvl1pPr marL="685800" marR="0" indent="-685800" algn="l" defTabSz="584200" rtl="0" latinLnBrk="0">
+                    <a:lnSpc>
+                      <a:spcPct val="80000"/>
+                    </a:lnSpc>
+                    <a:spcBef>
+                      <a:spcPts val="2400"/>
+                    </a:spcBef>
+                    <a:spcAft>
+                      <a:spcPts val="0"/>
+                    </a:spcAft>
+                    <a:buClr>
+                      <a:srgbClr val="57BEF0"/>
+                    </a:buClr>
+                    <a:buSzPct val="250000"/>
+                    <a:buFontTx/>
+                    <a:buChar char="-"/>
+                    <a:tabLst/>
+                    <a:defRPr sz="4200" b="1" i="0" u="none" strike="noStrike" cap="none" spc="0" baseline="0">
+                      <a:solidFill>
+                        <a:srgbClr val="53585F"/>
+                      </a:solidFill>
+                      <a:uFillTx/>
+                      <a:latin typeface="Proxima Nova"/>
+                      <a:ea typeface="Proxima Nova"/>
+                      <a:cs typeface="Proxima Nova"/>
+                      <a:sym typeface="Proxima Nova"/>
+                    </a:defRPr>
+                  </a:lvl1pPr>
+                  <a:lvl2pPr marL="1371600" marR="0" indent="-685800" algn="l" defTabSz="584200" rtl="0" latinLnBrk="0">
+                    <a:lnSpc>
+                      <a:spcPct val="80000"/>
+                    </a:lnSpc>
+                    <a:spcBef>
+                      <a:spcPts val="2400"/>
+                    </a:spcBef>
+                    <a:spcAft>
+                      <a:spcPts val="0"/>
+                    </a:spcAft>
+                    <a:buClr>
+                      <a:srgbClr val="57BEF0"/>
+                    </a:buClr>
+                    <a:buSzPct val="250000"/>
+                    <a:buFontTx/>
+                    <a:buChar char="-"/>
+                    <a:tabLst/>
+                    <a:defRPr sz="4200" b="1" i="0" u="none" strike="noStrike" cap="none" spc="0" baseline="0">
+                      <a:solidFill>
+                        <a:srgbClr val="53585F"/>
+                      </a:solidFill>
+                      <a:uFillTx/>
+                      <a:latin typeface="Proxima Nova"/>
+                      <a:ea typeface="Proxima Nova"/>
+                      <a:cs typeface="Proxima Nova"/>
+                      <a:sym typeface="Proxima Nova"/>
+                    </a:defRPr>
+                  </a:lvl2pPr>
+                  <a:lvl3pPr marL="2057400" marR="0" indent="-685800" algn="l" defTabSz="584200" rtl="0" latinLnBrk="0">
+                    <a:lnSpc>
+                      <a:spcPct val="80000"/>
+                    </a:lnSpc>
+                    <a:spcBef>
+                      <a:spcPts val="2400"/>
+                    </a:spcBef>
+                    <a:spcAft>
+                      <a:spcPts val="0"/>
+                    </a:spcAft>
+                    <a:buClr>
+                      <a:srgbClr val="57BEF0"/>
+                    </a:buClr>
+                    <a:buSzPct val="250000"/>
+                    <a:buFontTx/>
+                    <a:buChar char="-"/>
+                    <a:tabLst/>
+                    <a:defRPr sz="4200" b="1" i="0" u="none" strike="noStrike" cap="none" spc="0" baseline="0">
+                      <a:solidFill>
+                        <a:srgbClr val="53585F"/>
+                      </a:solidFill>
+                      <a:uFillTx/>
+                      <a:latin typeface="Proxima Nova"/>
+                      <a:ea typeface="Proxima Nova"/>
+                      <a:cs typeface="Proxima Nova"/>
+                      <a:sym typeface="Proxima Nova"/>
+                    </a:defRPr>
+                  </a:lvl3pPr>
+                  <a:lvl4pPr marL="2743200" marR="0" indent="-685800" algn="l" defTabSz="584200" rtl="0" latinLnBrk="0">
+                    <a:lnSpc>
+                      <a:spcPct val="80000"/>
+                    </a:lnSpc>
+                    <a:spcBef>
+                      <a:spcPts val="2400"/>
+                    </a:spcBef>
+                    <a:spcAft>
+                      <a:spcPts val="0"/>
+                    </a:spcAft>
+                    <a:buClr>
+                      <a:srgbClr val="57BEF0"/>
+                    </a:buClr>
+                    <a:buSzPct val="250000"/>
+                    <a:buFontTx/>
+                    <a:buChar char="-"/>
+                    <a:tabLst/>
+                    <a:defRPr sz="4200" b="1" i="0" u="none" strike="noStrike" cap="none" spc="0" baseline="0">
+                      <a:solidFill>
+                        <a:srgbClr val="53585F"/>
+                      </a:solidFill>
+                      <a:uFillTx/>
+                      <a:latin typeface="Proxima Nova"/>
+                      <a:ea typeface="Proxima Nova"/>
+                      <a:cs typeface="Proxima Nova"/>
+                      <a:sym typeface="Proxima Nova"/>
+                    </a:defRPr>
+                  </a:lvl4pPr>
+                  <a:lvl5pPr marL="3429000" marR="0" indent="-685800" algn="l" defTabSz="584200" rtl="0" latinLnBrk="0">
+                    <a:lnSpc>
+                      <a:spcPct val="80000"/>
+                    </a:lnSpc>
+                    <a:spcBef>
+                      <a:spcPts val="2400"/>
+                    </a:spcBef>
+                    <a:spcAft>
+                      <a:spcPts val="0"/>
+                    </a:spcAft>
+                    <a:buClr>
+                      <a:srgbClr val="57BEF0"/>
+                    </a:buClr>
+                    <a:buSzPct val="250000"/>
+                    <a:buFontTx/>
+                    <a:buChar char="-"/>
+                    <a:tabLst/>
+                    <a:defRPr sz="4200" b="1" i="0" u="none" strike="noStrike" cap="none" spc="0" baseline="0">
+                      <a:solidFill>
+                        <a:srgbClr val="53585F"/>
+                      </a:solidFill>
+                      <a:uFillTx/>
+                      <a:latin typeface="Proxima Nova"/>
+                      <a:ea typeface="Proxima Nova"/>
+                      <a:cs typeface="Proxima Nova"/>
+                      <a:sym typeface="Proxima Nova"/>
+                    </a:defRPr>
+                  </a:lvl5pPr>
+                  <a:lvl6pPr marL="4114800" marR="0" indent="-685800" algn="l" defTabSz="584200" rtl="0" latinLnBrk="0">
+                    <a:lnSpc>
+                      <a:spcPct val="80000"/>
+                    </a:lnSpc>
+                    <a:spcBef>
+                      <a:spcPts val="2400"/>
+                    </a:spcBef>
+                    <a:spcAft>
+                      <a:spcPts val="0"/>
+                    </a:spcAft>
+                    <a:buClr>
+                      <a:srgbClr val="57BEF0"/>
+                    </a:buClr>
+                    <a:buSzPct val="250000"/>
+                    <a:buFontTx/>
+                    <a:buChar char="-"/>
+                    <a:tabLst/>
+                    <a:defRPr sz="4200" b="1" i="0" u="none" strike="noStrike" cap="none" spc="0" baseline="0">
+                      <a:solidFill>
+                        <a:srgbClr val="53585F"/>
+                      </a:solidFill>
+                      <a:uFillTx/>
+                      <a:latin typeface="Proxima Nova"/>
+                      <a:ea typeface="Proxima Nova"/>
+                      <a:cs typeface="Proxima Nova"/>
+                      <a:sym typeface="Proxima Nova"/>
+                    </a:defRPr>
+                  </a:lvl6pPr>
+                  <a:lvl7pPr marL="4800600" marR="0" indent="-685800" algn="l" defTabSz="584200" rtl="0" latinLnBrk="0">
+                    <a:lnSpc>
+                      <a:spcPct val="80000"/>
+                    </a:lnSpc>
+                    <a:spcBef>
+                      <a:spcPts val="2400"/>
+                    </a:spcBef>
+                    <a:spcAft>
+                      <a:spcPts val="0"/>
+                    </a:spcAft>
+                    <a:buClr>
+                      <a:srgbClr val="57BEF0"/>
+                    </a:buClr>
+                    <a:buSzPct val="250000"/>
+                    <a:buFontTx/>
+                    <a:buChar char="-"/>
+                    <a:tabLst/>
+                    <a:defRPr sz="4200" b="1" i="0" u="none" strike="noStrike" cap="none" spc="0" baseline="0">
+                      <a:solidFill>
+                        <a:srgbClr val="53585F"/>
+                      </a:solidFill>
+                      <a:uFillTx/>
+                      <a:latin typeface="Proxima Nova"/>
+                      <a:ea typeface="Proxima Nova"/>
+                      <a:cs typeface="Proxima Nova"/>
+                      <a:sym typeface="Proxima Nova"/>
+                    </a:defRPr>
+                  </a:lvl7pPr>
+                  <a:lvl8pPr marL="5486400" marR="0" indent="-685800" algn="l" defTabSz="584200" rtl="0" latinLnBrk="0">
+                    <a:lnSpc>
+                      <a:spcPct val="80000"/>
+                    </a:lnSpc>
+                    <a:spcBef>
+                      <a:spcPts val="2400"/>
+                    </a:spcBef>
+                    <a:spcAft>
+                      <a:spcPts val="0"/>
+                    </a:spcAft>
+                    <a:buClr>
+                      <a:srgbClr val="57BEF0"/>
+                    </a:buClr>
+                    <a:buSzPct val="250000"/>
+                    <a:buFontTx/>
+                    <a:buChar char="-"/>
+                    <a:tabLst/>
+                    <a:defRPr sz="4200" b="1" i="0" u="none" strike="noStrike" cap="none" spc="0" baseline="0">
+                      <a:solidFill>
+                        <a:srgbClr val="53585F"/>
+                      </a:solidFill>
+                      <a:uFillTx/>
+                      <a:latin typeface="Proxima Nova"/>
+                      <a:ea typeface="Proxima Nova"/>
+                      <a:cs typeface="Proxima Nova"/>
+                      <a:sym typeface="Proxima Nova"/>
+                    </a:defRPr>
+                  </a:lvl8pPr>
+                  <a:lvl9pPr marL="6172200" marR="0" indent="-685800" algn="l" defTabSz="584200" rtl="0" latinLnBrk="0">
+                    <a:lnSpc>
+                      <a:spcPct val="80000"/>
+                    </a:lnSpc>
+                    <a:spcBef>
+                      <a:spcPts val="2400"/>
+                    </a:spcBef>
+                    <a:spcAft>
+                      <a:spcPts val="0"/>
+                    </a:spcAft>
+                    <a:buClr>
+                      <a:srgbClr val="57BEF0"/>
+                    </a:buClr>
+                    <a:buSzPct val="250000"/>
+                    <a:buFontTx/>
+                    <a:buChar char="-"/>
+                    <a:tabLst/>
+                    <a:defRPr sz="4200" b="1" i="0" u="none" strike="noStrike" cap="none" spc="0" baseline="0">
+                      <a:solidFill>
+                        <a:srgbClr val="53585F"/>
+                      </a:solidFill>
+                      <a:uFillTx/>
+                      <a:latin typeface="Proxima Nova"/>
+                      <a:ea typeface="Proxima Nova"/>
+                      <a:cs typeface="Proxima Nova"/>
+                      <a:sym typeface="Proxima Nova"/>
+                    </a:defRPr>
+                  </a:lvl9pPr>
+                </a:lstStyle>
+                <a:p>
+                  <a:pPr marL="0" indent="0" hangingPunct="1">
+                    <a:buNone/>
+                  </a:pPr>
+                  <a14:m>
+                    <m:oMathPara xmlns:m="http://schemas.openxmlformats.org/officeDocument/2006/math">
+                      <m:oMathParaPr>
+                        <m:jc m:val="left"/>
+                      </m:oMathParaPr>
+                      <m:oMath xmlns:m="http://schemas.openxmlformats.org/officeDocument/2006/math">
+                        <m:r>
+                          <a:rPr lang="en-GB" sz="8800" b="1" i="1" smtClean="0">
+                            <a:solidFill>
+                              <a:schemeClr val="tx1"/>
+                            </a:solidFill>
+                            <a:latin typeface="Cambria Math" panose="02040503050406030204" pitchFamily="18" charset="0"/>
+                          </a:rPr>
+                          <m:t>+</m:t>
+                        </m:r>
+                      </m:oMath>
+                    </m:oMathPara>
+                  </a14:m>
+                  <a:endParaRPr lang="en-GB" sz="8800" b="1" dirty="0">
                     <a:solidFill>
-                      <a:srgbClr val="53585F"/>
+                      <a:schemeClr val="tx1"/>
                     </a:solidFill>
-                    <a:uFillTx/>
-                    <a:latin typeface="Proxima Nova"/>
-                    <a:ea typeface="Proxima Nova"/>
-                    <a:cs typeface="Proxima Nova"/>
-                    <a:sym typeface="Proxima Nova"/>
-                  </a:defRPr>
-                </a:lvl1pPr>
-                <a:lvl2pPr marL="1371600" marR="0" indent="-685800" algn="l" defTabSz="584200" rtl="0" latinLnBrk="0">
-                  <a:lnSpc>
-                    <a:spcPct val="80000"/>
-                  </a:lnSpc>
-                  <a:spcBef>
-                    <a:spcPts val="2400"/>
-                  </a:spcBef>
-                  <a:spcAft>
-                    <a:spcPts val="0"/>
-                  </a:spcAft>
-                  <a:buClr>
-                    <a:srgbClr val="57BEF0"/>
-                  </a:buClr>
-                  <a:buSzPct val="250000"/>
-                  <a:buFontTx/>
-                  <a:buChar char="-"/>
-                  <a:tabLst/>
-                  <a:defRPr sz="4200" b="1" i="0" u="none" strike="noStrike" cap="none" spc="0" baseline="0">
-                    <a:solidFill>
-                      <a:srgbClr val="53585F"/>
-                    </a:solidFill>
-                    <a:uFillTx/>
-                    <a:latin typeface="Proxima Nova"/>
-                    <a:ea typeface="Proxima Nova"/>
-                    <a:cs typeface="Proxima Nova"/>
-                    <a:sym typeface="Proxima Nova"/>
-                  </a:defRPr>
-                </a:lvl2pPr>
-                <a:lvl3pPr marL="2057400" marR="0" indent="-685800" algn="l" defTabSz="584200" rtl="0" latinLnBrk="0">
-                  <a:lnSpc>
-                    <a:spcPct val="80000"/>
-                  </a:lnSpc>
-                  <a:spcBef>
-                    <a:spcPts val="2400"/>
-                  </a:spcBef>
-                  <a:spcAft>
-                    <a:spcPts val="0"/>
-                  </a:spcAft>
-                  <a:buClr>
-                    <a:srgbClr val="57BEF0"/>
-                  </a:buClr>
-                  <a:buSzPct val="250000"/>
-                  <a:buFontTx/>
-                  <a:buChar char="-"/>
-                  <a:tabLst/>
-                  <a:defRPr sz="4200" b="1" i="0" u="none" strike="noStrike" cap="none" spc="0" baseline="0">
-                    <a:solidFill>
-                      <a:srgbClr val="53585F"/>
-                    </a:solidFill>
-                    <a:uFillTx/>
-                    <a:latin typeface="Proxima Nova"/>
-                    <a:ea typeface="Proxima Nova"/>
-                    <a:cs typeface="Proxima Nova"/>
-                    <a:sym typeface="Proxima Nova"/>
-                  </a:defRPr>
-                </a:lvl3pPr>
-                <a:lvl4pPr marL="2743200" marR="0" indent="-685800" algn="l" defTabSz="584200" rtl="0" latinLnBrk="0">
-                  <a:lnSpc>
-                    <a:spcPct val="80000"/>
-                  </a:lnSpc>
-                  <a:spcBef>
-                    <a:spcPts val="2400"/>
-                  </a:spcBef>
-                  <a:spcAft>
-                    <a:spcPts val="0"/>
-                  </a:spcAft>
-                  <a:buClr>
-                    <a:srgbClr val="57BEF0"/>
-                  </a:buClr>
-                  <a:buSzPct val="250000"/>
-                  <a:buFontTx/>
-                  <a:buChar char="-"/>
-                  <a:tabLst/>
-                  <a:defRPr sz="4200" b="1" i="0" u="none" strike="noStrike" cap="none" spc="0" baseline="0">
-                    <a:solidFill>
-                      <a:srgbClr val="53585F"/>
-                    </a:solidFill>
-                    <a:uFillTx/>
-                    <a:latin typeface="Proxima Nova"/>
-                    <a:ea typeface="Proxima Nova"/>
-                    <a:cs typeface="Proxima Nova"/>
-                    <a:sym typeface="Proxima Nova"/>
-                  </a:defRPr>
-                </a:lvl4pPr>
-                <a:lvl5pPr marL="3429000" marR="0" indent="-685800" algn="l" defTabSz="584200" rtl="0" latinLnBrk="0">
-                  <a:lnSpc>
-                    <a:spcPct val="80000"/>
-                  </a:lnSpc>
-                  <a:spcBef>
-                    <a:spcPts val="2400"/>
-                  </a:spcBef>
-                  <a:spcAft>
-                    <a:spcPts val="0"/>
-                  </a:spcAft>
-                  <a:buClr>
-                    <a:srgbClr val="57BEF0"/>
-                  </a:buClr>
-                  <a:buSzPct val="250000"/>
-                  <a:buFontTx/>
-                  <a:buChar char="-"/>
-                  <a:tabLst/>
-                  <a:defRPr sz="4200" b="1" i="0" u="none" strike="noStrike" cap="none" spc="0" baseline="0">
-                    <a:solidFill>
-                      <a:srgbClr val="53585F"/>
-                    </a:solidFill>
-                    <a:uFillTx/>
-                    <a:latin typeface="Proxima Nova"/>
-                    <a:ea typeface="Proxima Nova"/>
-                    <a:cs typeface="Proxima Nova"/>
-                    <a:sym typeface="Proxima Nova"/>
-                  </a:defRPr>
-                </a:lvl5pPr>
-                <a:lvl6pPr marL="4114800" marR="0" indent="-685800" algn="l" defTabSz="584200" rtl="0" latinLnBrk="0">
-                  <a:lnSpc>
-                    <a:spcPct val="80000"/>
-                  </a:lnSpc>
-                  <a:spcBef>
-                    <a:spcPts val="2400"/>
-                  </a:spcBef>
-                  <a:spcAft>
-                    <a:spcPts val="0"/>
-                  </a:spcAft>
-                  <a:buClr>
-                    <a:srgbClr val="57BEF0"/>
-                  </a:buClr>
-                  <a:buSzPct val="250000"/>
-                  <a:buFontTx/>
-                  <a:buChar char="-"/>
-                  <a:tabLst/>
-                  <a:defRPr sz="4200" b="1" i="0" u="none" strike="noStrike" cap="none" spc="0" baseline="0">
-                    <a:solidFill>
-                      <a:srgbClr val="53585F"/>
-                    </a:solidFill>
-                    <a:uFillTx/>
-                    <a:latin typeface="Proxima Nova"/>
-                    <a:ea typeface="Proxima Nova"/>
-                    <a:cs typeface="Proxima Nova"/>
-                    <a:sym typeface="Proxima Nova"/>
-                  </a:defRPr>
-                </a:lvl6pPr>
-                <a:lvl7pPr marL="4800600" marR="0" indent="-685800" algn="l" defTabSz="584200" rtl="0" latinLnBrk="0">
-                  <a:lnSpc>
-                    <a:spcPct val="80000"/>
-                  </a:lnSpc>
-                  <a:spcBef>
-                    <a:spcPts val="2400"/>
-                  </a:spcBef>
-                  <a:spcAft>
-                    <a:spcPts val="0"/>
-                  </a:spcAft>
-                  <a:buClr>
-                    <a:srgbClr val="57BEF0"/>
-                  </a:buClr>
-                  <a:buSzPct val="250000"/>
-                  <a:buFontTx/>
-                  <a:buChar char="-"/>
-                  <a:tabLst/>
-                  <a:defRPr sz="4200" b="1" i="0" u="none" strike="noStrike" cap="none" spc="0" baseline="0">
-                    <a:solidFill>
-                      <a:srgbClr val="53585F"/>
-                    </a:solidFill>
-                    <a:uFillTx/>
-                    <a:latin typeface="Proxima Nova"/>
-                    <a:ea typeface="Proxima Nova"/>
-                    <a:cs typeface="Proxima Nova"/>
-                    <a:sym typeface="Proxima Nova"/>
-                  </a:defRPr>
-                </a:lvl7pPr>
-                <a:lvl8pPr marL="5486400" marR="0" indent="-685800" algn="l" defTabSz="584200" rtl="0" latinLnBrk="0">
-                  <a:lnSpc>
-                    <a:spcPct val="80000"/>
-                  </a:lnSpc>
-                  <a:spcBef>
-                    <a:spcPts val="2400"/>
-                  </a:spcBef>
-                  <a:spcAft>
-                    <a:spcPts val="0"/>
-                  </a:spcAft>
-                  <a:buClr>
-                    <a:srgbClr val="57BEF0"/>
-                  </a:buClr>
-                  <a:buSzPct val="250000"/>
-                  <a:buFontTx/>
-                  <a:buChar char="-"/>
-                  <a:tabLst/>
-                  <a:defRPr sz="4200" b="1" i="0" u="none" strike="noStrike" cap="none" spc="0" baseline="0">
-                    <a:solidFill>
-                      <a:srgbClr val="53585F"/>
-                    </a:solidFill>
-                    <a:uFillTx/>
-                    <a:latin typeface="Proxima Nova"/>
-                    <a:ea typeface="Proxima Nova"/>
-                    <a:cs typeface="Proxima Nova"/>
-                    <a:sym typeface="Proxima Nova"/>
-                  </a:defRPr>
-                </a:lvl8pPr>
-                <a:lvl9pPr marL="6172200" marR="0" indent="-685800" algn="l" defTabSz="584200" rtl="0" latinLnBrk="0">
-                  <a:lnSpc>
-                    <a:spcPct val="80000"/>
-                  </a:lnSpc>
-                  <a:spcBef>
-                    <a:spcPts val="2400"/>
-                  </a:spcBef>
-                  <a:spcAft>
-                    <a:spcPts val="0"/>
-                  </a:spcAft>
-                  <a:buClr>
-                    <a:srgbClr val="57BEF0"/>
-                  </a:buClr>
-                  <a:buSzPct val="250000"/>
-                  <a:buFontTx/>
-                  <a:buChar char="-"/>
-                  <a:tabLst/>
-                  <a:defRPr sz="4200" b="1" i="0" u="none" strike="noStrike" cap="none" spc="0" baseline="0">
-                    <a:solidFill>
-                      <a:srgbClr val="53585F"/>
-                    </a:solidFill>
-                    <a:uFillTx/>
-                    <a:latin typeface="Proxima Nova"/>
-                    <a:ea typeface="Proxima Nova"/>
-                    <a:cs typeface="Proxima Nova"/>
-                    <a:sym typeface="Proxima Nova"/>
-                  </a:defRPr>
-                </a:lvl9pPr>
-              </a:lstStyle>
-              <a:p>
-                <a:pPr marL="0" indent="0" hangingPunct="1">
-                  <a:buNone/>
-                </a:pPr>
-                <a14:m>
-                  <m:oMathPara xmlns:m="http://schemas.openxmlformats.org/officeDocument/2006/math">
-                    <m:oMathParaPr>
-                      <m:jc m:val="left"/>
-                    </m:oMathParaPr>
-                    <m:oMath xmlns:m="http://schemas.openxmlformats.org/officeDocument/2006/math">
-                      <m:r>
-                        <a:rPr lang="en-GB" sz="8800" b="1" i="1" smtClean="0">
-                          <a:solidFill>
-                            <a:schemeClr val="tx1"/>
-                          </a:solidFill>
-                          <a:latin typeface="Cambria Math" panose="02040503050406030204" pitchFamily="18" charset="0"/>
-                        </a:rPr>
-                        <m:t>+</m:t>
-                      </m:r>
-                    </m:oMath>
-                  </m:oMathPara>
-                </a14:m>
-                <a:endParaRPr lang="en-GB" sz="8800" b="1" dirty="0">
-                  <a:solidFill>
-                    <a:schemeClr val="tx1"/>
-                  </a:solidFill>
-                </a:endParaRPr>
-              </a:p>
-            </p:txBody>
-          </p:sp>
-        </mc:Choice>
-        <mc:Fallback>
-          <p:sp>
-            <p:nvSpPr>
-              <p:cNvPr id="11" name="13B - Wednesday 25th January 2023">
+                  </a:endParaRPr>
+                </a:p>
+              </p:txBody>
+            </p:sp>
+          </mc:Choice>
+          <mc:Fallback>
+            <p:sp>
+              <p:nvSpPr>
+                <p:cNvPr id="11" name="13B - Wednesday 25th January 2023">
+                  <a:extLst>
+                    <a:ext uri="{FF2B5EF4-FFF2-40B4-BE49-F238E27FC236}">
+                      <a16:creationId xmlns:a16="http://schemas.microsoft.com/office/drawing/2014/main" id="{5066A015-47EA-AEFB-85A6-0535BC7A5CF1}"/>
+                    </a:ext>
+                  </a:extLst>
+                </p:cNvPr>
+                <p:cNvSpPr txBox="1">
+                  <a:spLocks noRot="1" noChangeAspect="1" noMove="1" noResize="1" noEditPoints="1" noAdjustHandles="1" noChangeArrowheads="1" noChangeShapeType="1" noTextEdit="1"/>
+                </p:cNvSpPr>
+                <p:nvPr/>
+              </p:nvSpPr>
+              <p:spPr>
+                <a:xfrm>
+                  <a:off x="15736387" y="5120641"/>
+                  <a:ext cx="888275" cy="1280160"/>
+                </a:xfrm>
+                <a:prstGeom prst="rect">
+                  <a:avLst/>
+                </a:prstGeom>
+                <a:blipFill>
+                  <a:blip r:embed="rId5"/>
+                  <a:stretch>
+                    <a:fillRect l="-32394" r="-39437"/>
+                  </a:stretch>
+                </a:blipFill>
+                <a:ln w="12700">
+                  <a:miter lim="400000"/>
+                </a:ln>
                 <a:extLst>
-                  <a:ext uri="{FF2B5EF4-FFF2-40B4-BE49-F238E27FC236}">
-                    <a16:creationId xmlns:a16="http://schemas.microsoft.com/office/drawing/2014/main" id="{5066A015-47EA-AEFB-85A6-0535BC7A5CF1}"/>
+                  <a:ext uri="{C572A759-6A51-4108-AA02-DFA0A04FC94B}">
+                    <ma14:wrappingTextBoxFlag xmlns:ma14="http://schemas.microsoft.com/office/mac/drawingml/2011/main" xmlns:m="http://schemas.openxmlformats.org/officeDocument/2006/math" xmlns="" xmlns:a14="http://schemas.microsoft.com/office/drawing/2010/main" val="1"/>
                   </a:ext>
                 </a:extLst>
-              </p:cNvPr>
-              <p:cNvSpPr txBox="1">
-                <a:spLocks noRot="1" noChangeAspect="1" noMove="1" noResize="1" noEditPoints="1" noAdjustHandles="1" noChangeArrowheads="1" noChangeShapeType="1" noTextEdit="1"/>
-              </p:cNvSpPr>
-              <p:nvPr/>
-            </p:nvSpPr>
-            <p:spPr>
-              <a:xfrm>
-                <a:off x="15736387" y="5120641"/>
-                <a:ext cx="888275" cy="1280160"/>
-              </a:xfrm>
-              <a:prstGeom prst="rect">
-                <a:avLst/>
-              </a:prstGeom>
-              <a:blipFill>
-                <a:blip r:embed="rId5"/>
-                <a:stretch>
-                  <a:fillRect l="-32394" r="-39437"/>
-                </a:stretch>
-              </a:blipFill>
-              <a:ln w="12700">
-                <a:miter lim="400000"/>
-              </a:ln>
-              <a:extLst>
-                <a:ext uri="{C572A759-6A51-4108-AA02-DFA0A04FC94B}">
-                  <ma14:wrappingTextBoxFlag xmlns="" xmlns:m="http://schemas.openxmlformats.org/officeDocument/2006/math" xmlns:a14="http://schemas.microsoft.com/office/drawing/2010/main" xmlns:ma14="http://schemas.microsoft.com/office/mac/drawingml/2011/main" val="1"/>
-                </a:ext>
-              </a:extLst>
-            </p:spPr>
-            <p:txBody>
-              <a:bodyPr/>
-              <a:lstStyle/>
-              <a:p>
-                <a:r>
-                  <a:rPr lang="en-US">
-                    <a:noFill/>
-                  </a:rPr>
-                  <a:t> </a:t>
-                </a:r>
-              </a:p>
-            </p:txBody>
-          </p:sp>
-        </mc:Fallback>
-      </mc:AlternateContent>
-      <mc:AlternateContent xmlns:mc="http://schemas.openxmlformats.org/markup-compatibility/2006">
-        <mc:Choice xmlns:a14="http://schemas.microsoft.com/office/drawing/2010/main" Requires="a14">
+              </p:spPr>
+              <p:txBody>
+                <a:bodyPr/>
+                <a:lstStyle/>
+                <a:p>
+                  <a:r>
+                    <a:rPr lang="en-US">
+                      <a:noFill/>
+                    </a:rPr>
+                    <a:t> </a:t>
+                  </a:r>
+                </a:p>
+              </p:txBody>
+            </p:sp>
+          </mc:Fallback>
+        </mc:AlternateContent>
+      </p:grpSp>
+      <mc:AlternateContent xmlns:mc="http://schemas.openxmlformats.org/markup-compatibility/2006" xmlns:a14="http://schemas.microsoft.com/office/drawing/2010/main">
+        <mc:Choice Requires="a14">
           <p:sp>
             <p:nvSpPr>
               <p:cNvPr id="12" name="13B - Wednesday 25th January 2023">
@@ -9202,7 +9577,7 @@
               </a:ln>
               <a:extLst>
                 <a:ext uri="{C572A759-6A51-4108-AA02-DFA0A04FC94B}">
-                  <ma14:wrappingTextBoxFlag xmlns="" xmlns:m="http://schemas.openxmlformats.org/officeDocument/2006/math" xmlns:ma14="http://schemas.microsoft.com/office/mac/drawingml/2011/main" val="1"/>
+                  <ma14:wrappingTextBoxFlag xmlns:ma14="http://schemas.microsoft.com/office/mac/drawingml/2011/main" xmlns:m="http://schemas.openxmlformats.org/officeDocument/2006/math" xmlns="" val="1"/>
                 </a:ext>
               </a:extLst>
             </p:spPr>
@@ -9495,7 +9870,7 @@
             </p:txBody>
           </p:sp>
         </mc:Choice>
-        <mc:Fallback>
+        <mc:Fallback xmlns="">
           <p:sp>
             <p:nvSpPr>
               <p:cNvPr id="12" name="13B - Wednesday 25th January 2023">
@@ -9548,8 +9923,8 @@
           </p:sp>
         </mc:Fallback>
       </mc:AlternateContent>
-      <mc:AlternateContent xmlns:mc="http://schemas.openxmlformats.org/markup-compatibility/2006">
-        <mc:Choice xmlns:a14="http://schemas.microsoft.com/office/drawing/2010/main" Requires="a14">
+      <mc:AlternateContent xmlns:mc="http://schemas.openxmlformats.org/markup-compatibility/2006" xmlns:a14="http://schemas.microsoft.com/office/drawing/2010/main">
+        <mc:Choice Requires="a14">
           <p:sp>
             <p:nvSpPr>
               <p:cNvPr id="13" name="13B - Wednesday 25th January 2023">
@@ -9577,7 +9952,7 @@
               </a:ln>
               <a:extLst>
                 <a:ext uri="{C572A759-6A51-4108-AA02-DFA0A04FC94B}">
-                  <ma14:wrappingTextBoxFlag xmlns="" xmlns:m="http://schemas.openxmlformats.org/officeDocument/2006/math" xmlns:ma14="http://schemas.microsoft.com/office/mac/drawingml/2011/main" val="1"/>
+                  <ma14:wrappingTextBoxFlag xmlns:ma14="http://schemas.microsoft.com/office/mac/drawingml/2011/main" xmlns:m="http://schemas.openxmlformats.org/officeDocument/2006/math" xmlns="" val="1"/>
                 </a:ext>
               </a:extLst>
             </p:spPr>
@@ -9913,7 +10288,7 @@
             </p:txBody>
           </p:sp>
         </mc:Choice>
-        <mc:Fallback>
+        <mc:Fallback xmlns="">
           <p:sp>
             <p:nvSpPr>
               <p:cNvPr id="13" name="13B - Wednesday 25th January 2023">
@@ -9966,6 +10341,314 @@
           </p:sp>
         </mc:Fallback>
       </mc:AlternateContent>
+      <p:sp>
+        <p:nvSpPr>
+          <p:cNvPr id="3" name="*It’s in your exam">
+            <a:extLst>
+              <a:ext uri="{FF2B5EF4-FFF2-40B4-BE49-F238E27FC236}">
+                <a16:creationId xmlns:a16="http://schemas.microsoft.com/office/drawing/2014/main" id="{E6211677-0347-09A9-2646-0C90E4CF0958}"/>
+              </a:ext>
+            </a:extLst>
+          </p:cNvPr>
+          <p:cNvSpPr txBox="1">
+            <a:spLocks/>
+          </p:cNvSpPr>
+          <p:nvPr/>
+        </p:nvSpPr>
+        <p:spPr>
+          <a:xfrm>
+            <a:off x="2090421" y="6925716"/>
+            <a:ext cx="9713652" cy="8009484"/>
+          </a:xfrm>
+          <a:prstGeom prst="rect">
+            <a:avLst/>
+          </a:prstGeom>
+          <a:ln w="12700">
+            <a:miter lim="400000"/>
+          </a:ln>
+          <a:extLst>
+            <a:ext uri="{C572A759-6A51-4108-AA02-DFA0A04FC94B}">
+              <ma14:wrappingTextBoxFlag xmlns:ma14="http://schemas.microsoft.com/office/mac/drawingml/2011/main" xmlns:a14="http://schemas.microsoft.com/office/drawing/2010/main" xmlns:m="http://schemas.openxmlformats.org/officeDocument/2006/math" xmlns="" val="1"/>
+            </a:ext>
+          </a:extLst>
+        </p:spPr>
+        <p:txBody>
+          <a:bodyPr lIns="50800" tIns="50800" rIns="50800" bIns="50800">
+            <a:normAutofit fontScale="97500"/>
+          </a:bodyPr>
+          <a:lstStyle>
+            <a:lvl1pPr marL="0" marR="0" indent="0" algn="ctr" defTabSz="379729" rtl="0" latinLnBrk="0">
+              <a:lnSpc>
+                <a:spcPct val="80000"/>
+              </a:lnSpc>
+              <a:spcBef>
+                <a:spcPts val="0"/>
+              </a:spcBef>
+              <a:spcAft>
+                <a:spcPts val="0"/>
+              </a:spcAft>
+              <a:buClrTx/>
+              <a:buSzTx/>
+              <a:buFontTx/>
+              <a:buNone/>
+              <a:tabLst/>
+              <a:defRPr sz="14300" b="0" i="0" u="none" strike="noStrike" cap="all" spc="-143" baseline="0">
+                <a:solidFill>
+                  <a:srgbClr val="FFD74C"/>
+                </a:solidFill>
+                <a:uFillTx/>
+                <a:latin typeface="+mn-lt"/>
+                <a:ea typeface="+mn-ea"/>
+                <a:cs typeface="+mn-cs"/>
+                <a:sym typeface="Druk Medium"/>
+              </a:defRPr>
+            </a:lvl1pPr>
+            <a:lvl2pPr marL="0" marR="0" indent="457200" algn="l" defTabSz="825500" rtl="0" latinLnBrk="0">
+              <a:lnSpc>
+                <a:spcPct val="80000"/>
+              </a:lnSpc>
+              <a:spcBef>
+                <a:spcPts val="0"/>
+              </a:spcBef>
+              <a:spcAft>
+                <a:spcPts val="0"/>
+              </a:spcAft>
+              <a:buClrTx/>
+              <a:buSzTx/>
+              <a:buFontTx/>
+              <a:buNone/>
+              <a:tabLst/>
+              <a:defRPr sz="11600" b="0" i="0" u="none" strike="noStrike" cap="all" spc="-116" baseline="0">
+                <a:solidFill>
+                  <a:srgbClr val="00BFF3"/>
+                </a:solidFill>
+                <a:uFillTx/>
+                <a:latin typeface="+mn-lt"/>
+                <a:ea typeface="+mn-ea"/>
+                <a:cs typeface="+mn-cs"/>
+                <a:sym typeface="Druk Medium"/>
+              </a:defRPr>
+            </a:lvl2pPr>
+            <a:lvl3pPr marL="0" marR="0" indent="914400" algn="l" defTabSz="825500" rtl="0" latinLnBrk="0">
+              <a:lnSpc>
+                <a:spcPct val="80000"/>
+              </a:lnSpc>
+              <a:spcBef>
+                <a:spcPts val="0"/>
+              </a:spcBef>
+              <a:spcAft>
+                <a:spcPts val="0"/>
+              </a:spcAft>
+              <a:buClrTx/>
+              <a:buSzTx/>
+              <a:buFontTx/>
+              <a:buNone/>
+              <a:tabLst/>
+              <a:defRPr sz="11600" b="0" i="0" u="none" strike="noStrike" cap="all" spc="-116" baseline="0">
+                <a:solidFill>
+                  <a:srgbClr val="00BFF3"/>
+                </a:solidFill>
+                <a:uFillTx/>
+                <a:latin typeface="+mn-lt"/>
+                <a:ea typeface="+mn-ea"/>
+                <a:cs typeface="+mn-cs"/>
+                <a:sym typeface="Druk Medium"/>
+              </a:defRPr>
+            </a:lvl3pPr>
+            <a:lvl4pPr marL="0" marR="0" indent="1371600" algn="l" defTabSz="825500" rtl="0" latinLnBrk="0">
+              <a:lnSpc>
+                <a:spcPct val="80000"/>
+              </a:lnSpc>
+              <a:spcBef>
+                <a:spcPts val="0"/>
+              </a:spcBef>
+              <a:spcAft>
+                <a:spcPts val="0"/>
+              </a:spcAft>
+              <a:buClrTx/>
+              <a:buSzTx/>
+              <a:buFontTx/>
+              <a:buNone/>
+              <a:tabLst/>
+              <a:defRPr sz="11600" b="0" i="0" u="none" strike="noStrike" cap="all" spc="-116" baseline="0">
+                <a:solidFill>
+                  <a:srgbClr val="00BFF3"/>
+                </a:solidFill>
+                <a:uFillTx/>
+                <a:latin typeface="+mn-lt"/>
+                <a:ea typeface="+mn-ea"/>
+                <a:cs typeface="+mn-cs"/>
+                <a:sym typeface="Druk Medium"/>
+              </a:defRPr>
+            </a:lvl4pPr>
+            <a:lvl5pPr marL="0" marR="0" indent="1828800" algn="l" defTabSz="825500" rtl="0" latinLnBrk="0">
+              <a:lnSpc>
+                <a:spcPct val="80000"/>
+              </a:lnSpc>
+              <a:spcBef>
+                <a:spcPts val="0"/>
+              </a:spcBef>
+              <a:spcAft>
+                <a:spcPts val="0"/>
+              </a:spcAft>
+              <a:buClrTx/>
+              <a:buSzTx/>
+              <a:buFontTx/>
+              <a:buNone/>
+              <a:tabLst/>
+              <a:defRPr sz="11600" b="0" i="0" u="none" strike="noStrike" cap="all" spc="-116" baseline="0">
+                <a:solidFill>
+                  <a:srgbClr val="00BFF3"/>
+                </a:solidFill>
+                <a:uFillTx/>
+                <a:latin typeface="+mn-lt"/>
+                <a:ea typeface="+mn-ea"/>
+                <a:cs typeface="+mn-cs"/>
+                <a:sym typeface="Druk Medium"/>
+              </a:defRPr>
+            </a:lvl5pPr>
+            <a:lvl6pPr marL="0" marR="0" indent="2286000" algn="l" defTabSz="825500" rtl="0" latinLnBrk="0">
+              <a:lnSpc>
+                <a:spcPct val="80000"/>
+              </a:lnSpc>
+              <a:spcBef>
+                <a:spcPts val="0"/>
+              </a:spcBef>
+              <a:spcAft>
+                <a:spcPts val="0"/>
+              </a:spcAft>
+              <a:buClrTx/>
+              <a:buSzTx/>
+              <a:buFontTx/>
+              <a:buNone/>
+              <a:tabLst/>
+              <a:defRPr sz="11600" b="0" i="0" u="none" strike="noStrike" cap="all" spc="-116" baseline="0">
+                <a:solidFill>
+                  <a:srgbClr val="00BFF3"/>
+                </a:solidFill>
+                <a:uFillTx/>
+                <a:latin typeface="+mn-lt"/>
+                <a:ea typeface="+mn-ea"/>
+                <a:cs typeface="+mn-cs"/>
+                <a:sym typeface="Druk Medium"/>
+              </a:defRPr>
+            </a:lvl6pPr>
+            <a:lvl7pPr marL="0" marR="0" indent="2743200" algn="l" defTabSz="825500" rtl="0" latinLnBrk="0">
+              <a:lnSpc>
+                <a:spcPct val="80000"/>
+              </a:lnSpc>
+              <a:spcBef>
+                <a:spcPts val="0"/>
+              </a:spcBef>
+              <a:spcAft>
+                <a:spcPts val="0"/>
+              </a:spcAft>
+              <a:buClrTx/>
+              <a:buSzTx/>
+              <a:buFontTx/>
+              <a:buNone/>
+              <a:tabLst/>
+              <a:defRPr sz="11600" b="0" i="0" u="none" strike="noStrike" cap="all" spc="-116" baseline="0">
+                <a:solidFill>
+                  <a:srgbClr val="00BFF3"/>
+                </a:solidFill>
+                <a:uFillTx/>
+                <a:latin typeface="+mn-lt"/>
+                <a:ea typeface="+mn-ea"/>
+                <a:cs typeface="+mn-cs"/>
+                <a:sym typeface="Druk Medium"/>
+              </a:defRPr>
+            </a:lvl7pPr>
+            <a:lvl8pPr marL="0" marR="0" indent="3200400" algn="l" defTabSz="825500" rtl="0" latinLnBrk="0">
+              <a:lnSpc>
+                <a:spcPct val="80000"/>
+              </a:lnSpc>
+              <a:spcBef>
+                <a:spcPts val="0"/>
+              </a:spcBef>
+              <a:spcAft>
+                <a:spcPts val="0"/>
+              </a:spcAft>
+              <a:buClrTx/>
+              <a:buSzTx/>
+              <a:buFontTx/>
+              <a:buNone/>
+              <a:tabLst/>
+              <a:defRPr sz="11600" b="0" i="0" u="none" strike="noStrike" cap="all" spc="-116" baseline="0">
+                <a:solidFill>
+                  <a:srgbClr val="00BFF3"/>
+                </a:solidFill>
+                <a:uFillTx/>
+                <a:latin typeface="+mn-lt"/>
+                <a:ea typeface="+mn-ea"/>
+                <a:cs typeface="+mn-cs"/>
+                <a:sym typeface="Druk Medium"/>
+              </a:defRPr>
+            </a:lvl8pPr>
+            <a:lvl9pPr marL="0" marR="0" indent="3657600" algn="l" defTabSz="825500" rtl="0" latinLnBrk="0">
+              <a:lnSpc>
+                <a:spcPct val="80000"/>
+              </a:lnSpc>
+              <a:spcBef>
+                <a:spcPts val="0"/>
+              </a:spcBef>
+              <a:spcAft>
+                <a:spcPts val="0"/>
+              </a:spcAft>
+              <a:buClrTx/>
+              <a:buSzTx/>
+              <a:buFontTx/>
+              <a:buNone/>
+              <a:tabLst/>
+              <a:defRPr sz="11600" b="0" i="0" u="none" strike="noStrike" cap="all" spc="-116" baseline="0">
+                <a:solidFill>
+                  <a:srgbClr val="00BFF3"/>
+                </a:solidFill>
+                <a:uFillTx/>
+                <a:latin typeface="+mn-lt"/>
+                <a:ea typeface="+mn-ea"/>
+                <a:cs typeface="+mn-cs"/>
+                <a:sym typeface="Druk Medium"/>
+              </a:defRPr>
+            </a:lvl9pPr>
+          </a:lstStyle>
+          <a:p>
+            <a:pPr algn="l" hangingPunct="1"/>
+            <a:r>
+              <a:rPr lang="en-GB" sz="8800" b="1" dirty="0"/>
+              <a:t>= Zero or more</a:t>
+            </a:r>
+          </a:p>
+          <a:p>
+            <a:pPr algn="l" hangingPunct="1"/>
+            <a:r>
+              <a:rPr lang="en-GB" sz="8800" b="1" dirty="0"/>
+              <a:t>= One or more</a:t>
+            </a:r>
+          </a:p>
+          <a:p>
+            <a:pPr algn="l" hangingPunct="1"/>
+            <a:r>
+              <a:rPr lang="en-GB" sz="8800" b="1" dirty="0"/>
+              <a:t>= Optional</a:t>
+            </a:r>
+          </a:p>
+          <a:p>
+            <a:pPr algn="l" hangingPunct="1"/>
+            <a:r>
+              <a:rPr lang="en-GB" sz="8800" b="1" dirty="0"/>
+              <a:t>= OR</a:t>
+            </a:r>
+          </a:p>
+          <a:p>
+            <a:pPr algn="l" hangingPunct="1"/>
+            <a:r>
+              <a:rPr lang="en-GB" sz="8800" b="1" dirty="0"/>
+              <a:t>= Group</a:t>
+            </a:r>
+          </a:p>
+        </p:txBody>
+      </p:sp>
     </p:spTree>
   </p:cSld>
   <p:clrMapOvr>
@@ -10072,21 +10755,815 @@
                                   </p:childTnLst>
                                 </p:cTn>
                               </p:par>
+                            </p:childTnLst>
+                          </p:cTn>
+                        </p:par>
+                      </p:childTnLst>
+                    </p:cTn>
+                  </p:par>
+                  <p:par>
+                    <p:cTn id="11" fill="hold">
+                      <p:stCondLst>
+                        <p:cond delay="indefinite"/>
+                      </p:stCondLst>
+                      <p:childTnLst>
+                        <p:par>
+                          <p:cTn id="12" fill="hold">
+                            <p:stCondLst>
+                              <p:cond delay="0"/>
+                            </p:stCondLst>
+                            <p:childTnLst>
                               <p:par>
-                                <p:cTn id="11" presetID="1" presetClass="entr" presetSubtype="0" fill="hold" grpId="0" nodeType="withEffect">
+                                <p:cTn id="13" presetID="1" presetClass="entr" presetSubtype="0" fill="hold" grpId="0" nodeType="clickEffect">
                                   <p:stCondLst>
                                     <p:cond delay="0"/>
                                   </p:stCondLst>
                                   <p:childTnLst>
                                     <p:set>
                                       <p:cBhvr>
-                                        <p:cTn id="12" dur="1" fill="hold">
+                                        <p:cTn id="14" dur="1" fill="hold">
                                           <p:stCondLst>
                                             <p:cond delay="0"/>
                                           </p:stCondLst>
                                         </p:cTn>
                                         <p:tgtEl>
-                                          <p:spTgt spid="4"/>
+                                          <p:spTgt spid="4">
+                                            <p:txEl>
+                                              <p:pRg st="0" end="0"/>
+                                            </p:txEl>
+                                          </p:spTgt>
+                                        </p:tgtEl>
+                                        <p:attrNameLst>
+                                          <p:attrName>style.visibility</p:attrName>
+                                        </p:attrNameLst>
+                                      </p:cBhvr>
+                                      <p:to>
+                                        <p:strVal val="visible"/>
+                                      </p:to>
+                                    </p:set>
+                                  </p:childTnLst>
+                                </p:cTn>
+                              </p:par>
+                            </p:childTnLst>
+                          </p:cTn>
+                        </p:par>
+                      </p:childTnLst>
+                    </p:cTn>
+                  </p:par>
+                  <p:par>
+                    <p:cTn id="15" fill="hold">
+                      <p:stCondLst>
+                        <p:cond delay="indefinite"/>
+                      </p:stCondLst>
+                      <p:childTnLst>
+                        <p:par>
+                          <p:cTn id="16" fill="hold">
+                            <p:stCondLst>
+                              <p:cond delay="0"/>
+                            </p:stCondLst>
+                            <p:childTnLst>
+                              <p:par>
+                                <p:cTn id="17" presetID="1" presetClass="entr" presetSubtype="0" fill="hold" grpId="0" nodeType="clickEffect">
+                                  <p:stCondLst>
+                                    <p:cond delay="0"/>
+                                  </p:stCondLst>
+                                  <p:childTnLst>
+                                    <p:set>
+                                      <p:cBhvr>
+                                        <p:cTn id="18" dur="1" fill="hold">
+                                          <p:stCondLst>
+                                            <p:cond delay="0"/>
+                                          </p:stCondLst>
+                                        </p:cTn>
+                                        <p:tgtEl>
+                                          <p:spTgt spid="3">
+                                            <p:txEl>
+                                              <p:pRg st="0" end="0"/>
+                                            </p:txEl>
+                                          </p:spTgt>
+                                        </p:tgtEl>
+                                        <p:attrNameLst>
+                                          <p:attrName>style.visibility</p:attrName>
+                                        </p:attrNameLst>
+                                      </p:cBhvr>
+                                      <p:to>
+                                        <p:strVal val="visible"/>
+                                      </p:to>
+                                    </p:set>
+                                  </p:childTnLst>
+                                </p:cTn>
+                              </p:par>
+                            </p:childTnLst>
+                          </p:cTn>
+                        </p:par>
+                      </p:childTnLst>
+                    </p:cTn>
+                  </p:par>
+                  <p:par>
+                    <p:cTn id="19" fill="hold">
+                      <p:stCondLst>
+                        <p:cond delay="indefinite"/>
+                      </p:stCondLst>
+                      <p:childTnLst>
+                        <p:par>
+                          <p:cTn id="20" fill="hold">
+                            <p:stCondLst>
+                              <p:cond delay="0"/>
+                            </p:stCondLst>
+                            <p:childTnLst>
+                              <p:par>
+                                <p:cTn id="21" presetID="1" presetClass="entr" presetSubtype="0" fill="hold" grpId="0" nodeType="clickEffect">
+                                  <p:stCondLst>
+                                    <p:cond delay="0"/>
+                                  </p:stCondLst>
+                                  <p:childTnLst>
+                                    <p:set>
+                                      <p:cBhvr>
+                                        <p:cTn id="22" dur="1" fill="hold">
+                                          <p:stCondLst>
+                                            <p:cond delay="0"/>
+                                          </p:stCondLst>
+                                        </p:cTn>
+                                        <p:tgtEl>
+                                          <p:spTgt spid="4">
+                                            <p:txEl>
+                                              <p:pRg st="1" end="1"/>
+                                            </p:txEl>
+                                          </p:spTgt>
+                                        </p:tgtEl>
+                                        <p:attrNameLst>
+                                          <p:attrName>style.visibility</p:attrName>
+                                        </p:attrNameLst>
+                                      </p:cBhvr>
+                                      <p:to>
+                                        <p:strVal val="visible"/>
+                                      </p:to>
+                                    </p:set>
+                                  </p:childTnLst>
+                                </p:cTn>
+                              </p:par>
+                            </p:childTnLst>
+                          </p:cTn>
+                        </p:par>
+                      </p:childTnLst>
+                    </p:cTn>
+                  </p:par>
+                  <p:par>
+                    <p:cTn id="23" fill="hold">
+                      <p:stCondLst>
+                        <p:cond delay="indefinite"/>
+                      </p:stCondLst>
+                      <p:childTnLst>
+                        <p:par>
+                          <p:cTn id="24" fill="hold">
+                            <p:stCondLst>
+                              <p:cond delay="0"/>
+                            </p:stCondLst>
+                            <p:childTnLst>
+                              <p:par>
+                                <p:cTn id="25" presetID="1" presetClass="entr" presetSubtype="0" fill="hold" grpId="0" nodeType="clickEffect">
+                                  <p:stCondLst>
+                                    <p:cond delay="0"/>
+                                  </p:stCondLst>
+                                  <p:childTnLst>
+                                    <p:set>
+                                      <p:cBhvr>
+                                        <p:cTn id="26" dur="1" fill="hold">
+                                          <p:stCondLst>
+                                            <p:cond delay="0"/>
+                                          </p:stCondLst>
+                                        </p:cTn>
+                                        <p:tgtEl>
+                                          <p:spTgt spid="3">
+                                            <p:txEl>
+                                              <p:pRg st="1" end="1"/>
+                                            </p:txEl>
+                                          </p:spTgt>
+                                        </p:tgtEl>
+                                        <p:attrNameLst>
+                                          <p:attrName>style.visibility</p:attrName>
+                                        </p:attrNameLst>
+                                      </p:cBhvr>
+                                      <p:to>
+                                        <p:strVal val="visible"/>
+                                      </p:to>
+                                    </p:set>
+                                  </p:childTnLst>
+                                </p:cTn>
+                              </p:par>
+                            </p:childTnLst>
+                          </p:cTn>
+                        </p:par>
+                      </p:childTnLst>
+                    </p:cTn>
+                  </p:par>
+                  <p:par>
+                    <p:cTn id="27" fill="hold">
+                      <p:stCondLst>
+                        <p:cond delay="indefinite"/>
+                      </p:stCondLst>
+                      <p:childTnLst>
+                        <p:par>
+                          <p:cTn id="28" fill="hold">
+                            <p:stCondLst>
+                              <p:cond delay="0"/>
+                            </p:stCondLst>
+                            <p:childTnLst>
+                              <p:par>
+                                <p:cTn id="29" presetID="1" presetClass="entr" presetSubtype="0" fill="hold" grpId="0" nodeType="clickEffect">
+                                  <p:stCondLst>
+                                    <p:cond delay="0"/>
+                                  </p:stCondLst>
+                                  <p:childTnLst>
+                                    <p:set>
+                                      <p:cBhvr>
+                                        <p:cTn id="30" dur="1" fill="hold">
+                                          <p:stCondLst>
+                                            <p:cond delay="0"/>
+                                          </p:stCondLst>
+                                        </p:cTn>
+                                        <p:tgtEl>
+                                          <p:spTgt spid="4">
+                                            <p:txEl>
+                                              <p:pRg st="2" end="2"/>
+                                            </p:txEl>
+                                          </p:spTgt>
+                                        </p:tgtEl>
+                                        <p:attrNameLst>
+                                          <p:attrName>style.visibility</p:attrName>
+                                        </p:attrNameLst>
+                                      </p:cBhvr>
+                                      <p:to>
+                                        <p:strVal val="visible"/>
+                                      </p:to>
+                                    </p:set>
+                                  </p:childTnLst>
+                                </p:cTn>
+                              </p:par>
+                            </p:childTnLst>
+                          </p:cTn>
+                        </p:par>
+                      </p:childTnLst>
+                    </p:cTn>
+                  </p:par>
+                  <p:par>
+                    <p:cTn id="31" fill="hold">
+                      <p:stCondLst>
+                        <p:cond delay="indefinite"/>
+                      </p:stCondLst>
+                      <p:childTnLst>
+                        <p:par>
+                          <p:cTn id="32" fill="hold">
+                            <p:stCondLst>
+                              <p:cond delay="0"/>
+                            </p:stCondLst>
+                            <p:childTnLst>
+                              <p:par>
+                                <p:cTn id="33" presetID="1" presetClass="entr" presetSubtype="0" fill="hold" grpId="0" nodeType="clickEffect">
+                                  <p:stCondLst>
+                                    <p:cond delay="0"/>
+                                  </p:stCondLst>
+                                  <p:childTnLst>
+                                    <p:set>
+                                      <p:cBhvr>
+                                        <p:cTn id="34" dur="1" fill="hold">
+                                          <p:stCondLst>
+                                            <p:cond delay="0"/>
+                                          </p:stCondLst>
+                                        </p:cTn>
+                                        <p:tgtEl>
+                                          <p:spTgt spid="3">
+                                            <p:txEl>
+                                              <p:pRg st="2" end="2"/>
+                                            </p:txEl>
+                                          </p:spTgt>
+                                        </p:tgtEl>
+                                        <p:attrNameLst>
+                                          <p:attrName>style.visibility</p:attrName>
+                                        </p:attrNameLst>
+                                      </p:cBhvr>
+                                      <p:to>
+                                        <p:strVal val="visible"/>
+                                      </p:to>
+                                    </p:set>
+                                  </p:childTnLst>
+                                </p:cTn>
+                              </p:par>
+                            </p:childTnLst>
+                          </p:cTn>
+                        </p:par>
+                      </p:childTnLst>
+                    </p:cTn>
+                  </p:par>
+                  <p:par>
+                    <p:cTn id="35" fill="hold">
+                      <p:stCondLst>
+                        <p:cond delay="indefinite"/>
+                      </p:stCondLst>
+                      <p:childTnLst>
+                        <p:par>
+                          <p:cTn id="36" fill="hold">
+                            <p:stCondLst>
+                              <p:cond delay="0"/>
+                            </p:stCondLst>
+                            <p:childTnLst>
+                              <p:par>
+                                <p:cTn id="37" presetID="1" presetClass="entr" presetSubtype="0" fill="hold" grpId="0" nodeType="clickEffect">
+                                  <p:stCondLst>
+                                    <p:cond delay="0"/>
+                                  </p:stCondLst>
+                                  <p:childTnLst>
+                                    <p:set>
+                                      <p:cBhvr>
+                                        <p:cTn id="38" dur="1" fill="hold">
+                                          <p:stCondLst>
+                                            <p:cond delay="0"/>
+                                          </p:stCondLst>
+                                        </p:cTn>
+                                        <p:tgtEl>
+                                          <p:spTgt spid="4">
+                                            <p:txEl>
+                                              <p:pRg st="3" end="3"/>
+                                            </p:txEl>
+                                          </p:spTgt>
+                                        </p:tgtEl>
+                                        <p:attrNameLst>
+                                          <p:attrName>style.visibility</p:attrName>
+                                        </p:attrNameLst>
+                                      </p:cBhvr>
+                                      <p:to>
+                                        <p:strVal val="visible"/>
+                                      </p:to>
+                                    </p:set>
+                                  </p:childTnLst>
+                                </p:cTn>
+                              </p:par>
+                            </p:childTnLst>
+                          </p:cTn>
+                        </p:par>
+                      </p:childTnLst>
+                    </p:cTn>
+                  </p:par>
+                  <p:par>
+                    <p:cTn id="39" fill="hold">
+                      <p:stCondLst>
+                        <p:cond delay="indefinite"/>
+                      </p:stCondLst>
+                      <p:childTnLst>
+                        <p:par>
+                          <p:cTn id="40" fill="hold">
+                            <p:stCondLst>
+                              <p:cond delay="0"/>
+                            </p:stCondLst>
+                            <p:childTnLst>
+                              <p:par>
+                                <p:cTn id="41" presetID="1" presetClass="entr" presetSubtype="0" fill="hold" grpId="0" nodeType="clickEffect">
+                                  <p:stCondLst>
+                                    <p:cond delay="0"/>
+                                  </p:stCondLst>
+                                  <p:childTnLst>
+                                    <p:set>
+                                      <p:cBhvr>
+                                        <p:cTn id="42" dur="1" fill="hold">
+                                          <p:stCondLst>
+                                            <p:cond delay="0"/>
+                                          </p:stCondLst>
+                                        </p:cTn>
+                                        <p:tgtEl>
+                                          <p:spTgt spid="3">
+                                            <p:txEl>
+                                              <p:pRg st="3" end="3"/>
+                                            </p:txEl>
+                                          </p:spTgt>
+                                        </p:tgtEl>
+                                        <p:attrNameLst>
+                                          <p:attrName>style.visibility</p:attrName>
+                                        </p:attrNameLst>
+                                      </p:cBhvr>
+                                      <p:to>
+                                        <p:strVal val="visible"/>
+                                      </p:to>
+                                    </p:set>
+                                  </p:childTnLst>
+                                </p:cTn>
+                              </p:par>
+                            </p:childTnLst>
+                          </p:cTn>
+                        </p:par>
+                      </p:childTnLst>
+                    </p:cTn>
+                  </p:par>
+                  <p:par>
+                    <p:cTn id="43" fill="hold">
+                      <p:stCondLst>
+                        <p:cond delay="indefinite"/>
+                      </p:stCondLst>
+                      <p:childTnLst>
+                        <p:par>
+                          <p:cTn id="44" fill="hold">
+                            <p:stCondLst>
+                              <p:cond delay="0"/>
+                            </p:stCondLst>
+                            <p:childTnLst>
+                              <p:par>
+                                <p:cTn id="45" presetID="1" presetClass="entr" presetSubtype="0" fill="hold" grpId="0" nodeType="clickEffect">
+                                  <p:stCondLst>
+                                    <p:cond delay="0"/>
+                                  </p:stCondLst>
+                                  <p:childTnLst>
+                                    <p:set>
+                                      <p:cBhvr>
+                                        <p:cTn id="46" dur="1" fill="hold">
+                                          <p:stCondLst>
+                                            <p:cond delay="0"/>
+                                          </p:stCondLst>
+                                        </p:cTn>
+                                        <p:tgtEl>
+                                          <p:spTgt spid="4">
+                                            <p:txEl>
+                                              <p:pRg st="4" end="4"/>
+                                            </p:txEl>
+                                          </p:spTgt>
+                                        </p:tgtEl>
+                                        <p:attrNameLst>
+                                          <p:attrName>style.visibility</p:attrName>
+                                        </p:attrNameLst>
+                                      </p:cBhvr>
+                                      <p:to>
+                                        <p:strVal val="visible"/>
+                                      </p:to>
+                                    </p:set>
+                                  </p:childTnLst>
+                                </p:cTn>
+                              </p:par>
+                            </p:childTnLst>
+                          </p:cTn>
+                        </p:par>
+                      </p:childTnLst>
+                    </p:cTn>
+                  </p:par>
+                  <p:par>
+                    <p:cTn id="47" fill="hold">
+                      <p:stCondLst>
+                        <p:cond delay="indefinite"/>
+                      </p:stCondLst>
+                      <p:childTnLst>
+                        <p:par>
+                          <p:cTn id="48" fill="hold">
+                            <p:stCondLst>
+                              <p:cond delay="0"/>
+                            </p:stCondLst>
+                            <p:childTnLst>
+                              <p:par>
+                                <p:cTn id="49" presetID="1" presetClass="entr" presetSubtype="0" fill="hold" grpId="0" nodeType="clickEffect">
+                                  <p:stCondLst>
+                                    <p:cond delay="0"/>
+                                  </p:stCondLst>
+                                  <p:childTnLst>
+                                    <p:set>
+                                      <p:cBhvr>
+                                        <p:cTn id="50" dur="1" fill="hold">
+                                          <p:stCondLst>
+                                            <p:cond delay="0"/>
+                                          </p:stCondLst>
+                                        </p:cTn>
+                                        <p:tgtEl>
+                                          <p:spTgt spid="3">
+                                            <p:txEl>
+                                              <p:pRg st="4" end="4"/>
+                                            </p:txEl>
+                                          </p:spTgt>
+                                        </p:tgtEl>
+                                        <p:attrNameLst>
+                                          <p:attrName>style.visibility</p:attrName>
+                                        </p:attrNameLst>
+                                      </p:cBhvr>
+                                      <p:to>
+                                        <p:strVal val="visible"/>
+                                      </p:to>
+                                    </p:set>
+                                  </p:childTnLst>
+                                </p:cTn>
+                              </p:par>
+                            </p:childTnLst>
+                          </p:cTn>
+                        </p:par>
+                      </p:childTnLst>
+                    </p:cTn>
+                  </p:par>
+                  <p:par>
+                    <p:cTn id="51" fill="hold">
+                      <p:stCondLst>
+                        <p:cond delay="indefinite"/>
+                      </p:stCondLst>
+                      <p:childTnLst>
+                        <p:par>
+                          <p:cTn id="52" fill="hold">
+                            <p:stCondLst>
+                              <p:cond delay="0"/>
+                            </p:stCondLst>
+                            <p:childTnLst>
+                              <p:par>
+                                <p:cTn id="53" presetID="1" presetClass="entr" presetSubtype="0" fill="hold" grpId="0" nodeType="clickEffect">
+                                  <p:stCondLst>
+                                    <p:cond delay="0"/>
+                                  </p:stCondLst>
+                                  <p:childTnLst>
+                                    <p:set>
+                                      <p:cBhvr>
+                                        <p:cTn id="54" dur="1" fill="hold">
+                                          <p:stCondLst>
+                                            <p:cond delay="0"/>
+                                          </p:stCondLst>
+                                        </p:cTn>
+                                        <p:tgtEl>
+                                          <p:spTgt spid="7">
+                                            <p:txEl>
+                                              <p:pRg st="0" end="0"/>
+                                            </p:txEl>
+                                          </p:spTgt>
+                                        </p:tgtEl>
+                                        <p:attrNameLst>
+                                          <p:attrName>style.visibility</p:attrName>
+                                        </p:attrNameLst>
+                                      </p:cBhvr>
+                                      <p:to>
+                                        <p:strVal val="visible"/>
+                                      </p:to>
+                                    </p:set>
+                                  </p:childTnLst>
+                                </p:cTn>
+                              </p:par>
+                            </p:childTnLst>
+                          </p:cTn>
+                        </p:par>
+                      </p:childTnLst>
+                    </p:cTn>
+                  </p:par>
+                  <p:par>
+                    <p:cTn id="55" fill="hold">
+                      <p:stCondLst>
+                        <p:cond delay="indefinite"/>
+                      </p:stCondLst>
+                      <p:childTnLst>
+                        <p:par>
+                          <p:cTn id="56" fill="hold">
+                            <p:stCondLst>
+                              <p:cond delay="0"/>
+                            </p:stCondLst>
+                            <p:childTnLst>
+                              <p:par>
+                                <p:cTn id="57" presetID="1" presetClass="entr" presetSubtype="0" fill="hold" grpId="0" nodeType="clickEffect">
+                                  <p:stCondLst>
+                                    <p:cond delay="0"/>
+                                  </p:stCondLst>
+                                  <p:childTnLst>
+                                    <p:set>
+                                      <p:cBhvr>
+                                        <p:cTn id="58" dur="1" fill="hold">
+                                          <p:stCondLst>
+                                            <p:cond delay="0"/>
+                                          </p:stCondLst>
+                                        </p:cTn>
+                                        <p:tgtEl>
+                                          <p:spTgt spid="7">
+                                            <p:txEl>
+                                              <p:pRg st="1" end="1"/>
+                                            </p:txEl>
+                                          </p:spTgt>
+                                        </p:tgtEl>
+                                        <p:attrNameLst>
+                                          <p:attrName>style.visibility</p:attrName>
+                                        </p:attrNameLst>
+                                      </p:cBhvr>
+                                      <p:to>
+                                        <p:strVal val="visible"/>
+                                      </p:to>
+                                    </p:set>
+                                  </p:childTnLst>
+                                </p:cTn>
+                              </p:par>
+                            </p:childTnLst>
+                          </p:cTn>
+                        </p:par>
+                      </p:childTnLst>
+                    </p:cTn>
+                  </p:par>
+                  <p:par>
+                    <p:cTn id="59" fill="hold">
+                      <p:stCondLst>
+                        <p:cond delay="indefinite"/>
+                      </p:stCondLst>
+                      <p:childTnLst>
+                        <p:par>
+                          <p:cTn id="60" fill="hold">
+                            <p:stCondLst>
+                              <p:cond delay="0"/>
+                            </p:stCondLst>
+                            <p:childTnLst>
+                              <p:par>
+                                <p:cTn id="61" presetID="1" presetClass="entr" presetSubtype="0" fill="hold" grpId="0" nodeType="clickEffect">
+                                  <p:stCondLst>
+                                    <p:cond delay="0"/>
+                                  </p:stCondLst>
+                                  <p:childTnLst>
+                                    <p:set>
+                                      <p:cBhvr>
+                                        <p:cTn id="62" dur="1" fill="hold">
+                                          <p:stCondLst>
+                                            <p:cond delay="0"/>
+                                          </p:stCondLst>
+                                        </p:cTn>
+                                        <p:tgtEl>
+                                          <p:spTgt spid="7">
+                                            <p:txEl>
+                                              <p:pRg st="2" end="2"/>
+                                            </p:txEl>
+                                          </p:spTgt>
+                                        </p:tgtEl>
+                                        <p:attrNameLst>
+                                          <p:attrName>style.visibility</p:attrName>
+                                        </p:attrNameLst>
+                                      </p:cBhvr>
+                                      <p:to>
+                                        <p:strVal val="visible"/>
+                                      </p:to>
+                                    </p:set>
+                                  </p:childTnLst>
+                                </p:cTn>
+                              </p:par>
+                            </p:childTnLst>
+                          </p:cTn>
+                        </p:par>
+                      </p:childTnLst>
+                    </p:cTn>
+                  </p:par>
+                  <p:par>
+                    <p:cTn id="63" fill="hold">
+                      <p:stCondLst>
+                        <p:cond delay="indefinite"/>
+                      </p:stCondLst>
+                      <p:childTnLst>
+                        <p:par>
+                          <p:cTn id="64" fill="hold">
+                            <p:stCondLst>
+                              <p:cond delay="0"/>
+                            </p:stCondLst>
+                            <p:childTnLst>
+                              <p:par>
+                                <p:cTn id="65" presetID="1" presetClass="entr" presetSubtype="0" fill="hold" grpId="0" nodeType="clickEffect">
+                                  <p:stCondLst>
+                                    <p:cond delay="0"/>
+                                  </p:stCondLst>
+                                  <p:childTnLst>
+                                    <p:set>
+                                      <p:cBhvr>
+                                        <p:cTn id="66" dur="1" fill="hold">
+                                          <p:stCondLst>
+                                            <p:cond delay="0"/>
+                                          </p:stCondLst>
+                                        </p:cTn>
+                                        <p:tgtEl>
+                                          <p:spTgt spid="7">
+                                            <p:txEl>
+                                              <p:pRg st="4" end="4"/>
+                                            </p:txEl>
+                                          </p:spTgt>
+                                        </p:tgtEl>
+                                        <p:attrNameLst>
+                                          <p:attrName>style.visibility</p:attrName>
+                                        </p:attrNameLst>
+                                      </p:cBhvr>
+                                      <p:to>
+                                        <p:strVal val="visible"/>
+                                      </p:to>
+                                    </p:set>
+                                  </p:childTnLst>
+                                </p:cTn>
+                              </p:par>
+                            </p:childTnLst>
+                          </p:cTn>
+                        </p:par>
+                      </p:childTnLst>
+                    </p:cTn>
+                  </p:par>
+                  <p:par>
+                    <p:cTn id="67" fill="hold">
+                      <p:stCondLst>
+                        <p:cond delay="indefinite"/>
+                      </p:stCondLst>
+                      <p:childTnLst>
+                        <p:par>
+                          <p:cTn id="68" fill="hold">
+                            <p:stCondLst>
+                              <p:cond delay="0"/>
+                            </p:stCondLst>
+                            <p:childTnLst>
+                              <p:par>
+                                <p:cTn id="69" presetID="1" presetClass="entr" presetSubtype="0" fill="hold" nodeType="clickEffect">
+                                  <p:stCondLst>
+                                    <p:cond delay="0"/>
+                                  </p:stCondLst>
+                                  <p:childTnLst>
+                                    <p:set>
+                                      <p:cBhvr>
+                                        <p:cTn id="70" dur="1" fill="hold">
+                                          <p:stCondLst>
+                                            <p:cond delay="0"/>
+                                          </p:stCondLst>
+                                        </p:cTn>
+                                        <p:tgtEl>
+                                          <p:spTgt spid="2"/>
+                                        </p:tgtEl>
+                                        <p:attrNameLst>
+                                          <p:attrName>style.visibility</p:attrName>
+                                        </p:attrNameLst>
+                                      </p:cBhvr>
+                                      <p:to>
+                                        <p:strVal val="visible"/>
+                                      </p:to>
+                                    </p:set>
+                                  </p:childTnLst>
+                                </p:cTn>
+                              </p:par>
+                            </p:childTnLst>
+                          </p:cTn>
+                        </p:par>
+                      </p:childTnLst>
+                    </p:cTn>
+                  </p:par>
+                  <p:par>
+                    <p:cTn id="71" fill="hold">
+                      <p:stCondLst>
+                        <p:cond delay="indefinite"/>
+                      </p:stCondLst>
+                      <p:childTnLst>
+                        <p:par>
+                          <p:cTn id="72" fill="hold">
+                            <p:stCondLst>
+                              <p:cond delay="0"/>
+                            </p:stCondLst>
+                            <p:childTnLst>
+                              <p:par>
+                                <p:cTn id="73" presetID="1" presetClass="entr" presetSubtype="0" fill="hold" grpId="0" nodeType="clickEffect">
+                                  <p:stCondLst>
+                                    <p:cond delay="0"/>
+                                  </p:stCondLst>
+                                  <p:childTnLst>
+                                    <p:set>
+                                      <p:cBhvr>
+                                        <p:cTn id="74" dur="1" fill="hold">
+                                          <p:stCondLst>
+                                            <p:cond delay="0"/>
+                                          </p:stCondLst>
+                                        </p:cTn>
+                                        <p:tgtEl>
+                                          <p:spTgt spid="12"/>
+                                        </p:tgtEl>
+                                        <p:attrNameLst>
+                                          <p:attrName>style.visibility</p:attrName>
+                                        </p:attrNameLst>
+                                      </p:cBhvr>
+                                      <p:to>
+                                        <p:strVal val="visible"/>
+                                      </p:to>
+                                    </p:set>
+                                  </p:childTnLst>
+                                </p:cTn>
+                              </p:par>
+                            </p:childTnLst>
+                          </p:cTn>
+                        </p:par>
+                      </p:childTnLst>
+                    </p:cTn>
+                  </p:par>
+                  <p:par>
+                    <p:cTn id="75" fill="hold">
+                      <p:stCondLst>
+                        <p:cond delay="indefinite"/>
+                      </p:stCondLst>
+                      <p:childTnLst>
+                        <p:par>
+                          <p:cTn id="76" fill="hold">
+                            <p:stCondLst>
+                              <p:cond delay="0"/>
+                            </p:stCondLst>
+                            <p:childTnLst>
+                              <p:par>
+                                <p:cTn id="77" presetID="1" presetClass="entr" presetSubtype="0" fill="hold" grpId="0" nodeType="clickEffect">
+                                  <p:stCondLst>
+                                    <p:cond delay="0"/>
+                                  </p:stCondLst>
+                                  <p:childTnLst>
+                                    <p:set>
+                                      <p:cBhvr>
+                                        <p:cTn id="78" dur="1" fill="hold">
+                                          <p:stCondLst>
+                                            <p:cond delay="0"/>
+                                          </p:stCondLst>
+                                        </p:cTn>
+                                        <p:tgtEl>
+                                          <p:spTgt spid="13"/>
                                         </p:tgtEl>
                                         <p:attrNameLst>
                                           <p:attrName>style.visibility</p:attrName>
@@ -10128,7 +11605,11 @@
     </p:tnLst>
     <p:bldLst>
       <p:bldP spid="153" grpId="0" uiExpand="1" build="p"/>
-      <p:bldP spid="4" grpId="0" animBg="1"/>
+      <p:bldP spid="4" grpId="0" uiExpand="1" build="p"/>
+      <p:bldP spid="7" grpId="0" build="p"/>
+      <p:bldP spid="12" grpId="0" animBg="1"/>
+      <p:bldP spid="13" grpId="0" animBg="1"/>
+      <p:bldP spid="3" grpId="0" uiExpand="1" build="p"/>
     </p:bldLst>
   </p:timing>
 </p:sld>
@@ -10201,7 +11682,7 @@
           </a:prstGeom>
           <a:extLst>
             <a:ext uri="{C572A759-6A51-4108-AA02-DFA0A04FC94B}">
-              <ma14:wrappingTextBoxFlag xmlns="" xmlns:m="http://schemas.openxmlformats.org/officeDocument/2006/math" xmlns:a14="http://schemas.microsoft.com/office/drawing/2010/main" xmlns:ma14="http://schemas.microsoft.com/office/mac/drawingml/2011/main" val="1"/>
+              <ma14:wrappingTextBoxFlag xmlns:ma14="http://schemas.microsoft.com/office/mac/drawingml/2011/main" xmlns:a14="http://schemas.microsoft.com/office/drawing/2010/main" xmlns:m="http://schemas.openxmlformats.org/officeDocument/2006/math" xmlns="" val="1"/>
             </a:ext>
           </a:extLst>
         </p:spPr>
@@ -10806,7 +12287,7 @@
           </a:prstGeom>
           <a:extLst>
             <a:ext uri="{C572A759-6A51-4108-AA02-DFA0A04FC94B}">
-              <ma14:wrappingTextBoxFlag xmlns="" xmlns:m="http://schemas.openxmlformats.org/officeDocument/2006/math" xmlns:a14="http://schemas.microsoft.com/office/drawing/2010/main" xmlns:ma14="http://schemas.microsoft.com/office/mac/drawingml/2011/main" val="1"/>
+              <ma14:wrappingTextBoxFlag xmlns:ma14="http://schemas.microsoft.com/office/mac/drawingml/2011/main" xmlns:a14="http://schemas.microsoft.com/office/drawing/2010/main" xmlns:m="http://schemas.openxmlformats.org/officeDocument/2006/math" xmlns="" val="1"/>
             </a:ext>
           </a:extLst>
         </p:spPr>
@@ -11677,7 +13158,7 @@
           </a:prstGeom>
           <a:extLst>
             <a:ext uri="{C572A759-6A51-4108-AA02-DFA0A04FC94B}">
-              <ma14:wrappingTextBoxFlag xmlns="" xmlns:m="http://schemas.openxmlformats.org/officeDocument/2006/math" xmlns:a14="http://schemas.microsoft.com/office/drawing/2010/main" xmlns:ma14="http://schemas.microsoft.com/office/mac/drawingml/2011/main" val="1"/>
+              <ma14:wrappingTextBoxFlag xmlns:ma14="http://schemas.microsoft.com/office/mac/drawingml/2011/main" xmlns:a14="http://schemas.microsoft.com/office/drawing/2010/main" xmlns:m="http://schemas.openxmlformats.org/officeDocument/2006/math" xmlns="" val="1"/>
             </a:ext>
           </a:extLst>
         </p:spPr>
@@ -11980,7 +13461,7 @@
           </a:prstGeom>
           <a:extLst>
             <a:ext uri="{C572A759-6A51-4108-AA02-DFA0A04FC94B}">
-              <ma14:wrappingTextBoxFlag xmlns="" xmlns:m="http://schemas.openxmlformats.org/officeDocument/2006/math" xmlns:a14="http://schemas.microsoft.com/office/drawing/2010/main" xmlns:ma14="http://schemas.microsoft.com/office/mac/drawingml/2011/main" val="1"/>
+              <ma14:wrappingTextBoxFlag xmlns:ma14="http://schemas.microsoft.com/office/mac/drawingml/2011/main" xmlns:a14="http://schemas.microsoft.com/office/drawing/2010/main" xmlns:m="http://schemas.openxmlformats.org/officeDocument/2006/math" xmlns="" val="1"/>
             </a:ext>
           </a:extLst>
         </p:spPr>
@@ -12510,7 +13991,7 @@
           </a:prstGeom>
           <a:extLst>
             <a:ext uri="{C572A759-6A51-4108-AA02-DFA0A04FC94B}">
-              <ma14:wrappingTextBoxFlag xmlns="" xmlns:m="http://schemas.openxmlformats.org/officeDocument/2006/math" xmlns:a14="http://schemas.microsoft.com/office/drawing/2010/main" xmlns:ma14="http://schemas.microsoft.com/office/mac/drawingml/2011/main" val="1"/>
+              <ma14:wrappingTextBoxFlag xmlns:ma14="http://schemas.microsoft.com/office/mac/drawingml/2011/main" xmlns:a14="http://schemas.microsoft.com/office/drawing/2010/main" xmlns:m="http://schemas.openxmlformats.org/officeDocument/2006/math" xmlns="" val="1"/>
             </a:ext>
           </a:extLst>
         </p:spPr>
@@ -13269,7 +14750,7 @@
           </a:prstGeom>
           <a:extLst>
             <a:ext uri="{C572A759-6A51-4108-AA02-DFA0A04FC94B}">
-              <ma14:wrappingTextBoxFlag xmlns="" xmlns:m="http://schemas.openxmlformats.org/officeDocument/2006/math" xmlns:a14="http://schemas.microsoft.com/office/drawing/2010/main" xmlns:ma14="http://schemas.microsoft.com/office/mac/drawingml/2011/main" val="1"/>
+              <ma14:wrappingTextBoxFlag xmlns:ma14="http://schemas.microsoft.com/office/mac/drawingml/2011/main" xmlns:a14="http://schemas.microsoft.com/office/drawing/2010/main" xmlns:m="http://schemas.openxmlformats.org/officeDocument/2006/math" xmlns="" val="1"/>
             </a:ext>
           </a:extLst>
         </p:spPr>
@@ -15367,47 +16848,61 @@
                             </p:stCondLst>
                             <p:childTnLst>
                               <p:par>
-                                <p:cTn id="49" presetID="0" presetClass="path" presetSubtype="0" accel="50000" decel="50000" fill="hold" nodeType="clickEffect">
+                                <p:cTn id="49" presetID="1" presetClass="entr" presetSubtype="0" fill="hold" grpId="0" nodeType="clickEffect">
                                   <p:stCondLst>
                                     <p:cond delay="0"/>
                                   </p:stCondLst>
                                   <p:childTnLst>
-                                    <p:animMotion origin="layout" path="M -3.125E-7 5.55556E-7 L -0.16921 0.00116 " pathEditMode="relative" rAng="0" ptsTypes="AA">
+                                    <p:set>
                                       <p:cBhvr>
-                                        <p:cTn id="50" dur="2000" fill="hold"/>
+                                        <p:cTn id="50" dur="1" fill="hold">
+                                          <p:stCondLst>
+                                            <p:cond delay="0"/>
+                                          </p:stCondLst>
+                                        </p:cTn>
                                         <p:tgtEl>
-                                          <p:spTgt spid="198"/>
+                                          <p:spTgt spid="182"/>
                                         </p:tgtEl>
                                         <p:attrNameLst>
-                                          <p:attrName>ppt_x</p:attrName>
-                                          <p:attrName>ppt_y</p:attrName>
+                                          <p:attrName>style.visibility</p:attrName>
                                         </p:attrNameLst>
                                       </p:cBhvr>
-                                      <p:rCtr x="-8496" y="46"/>
-                                    </p:animMotion>
+                                      <p:to>
+                                        <p:strVal val="visible"/>
+                                      </p:to>
+                                    </p:set>
                                   </p:childTnLst>
                                 </p:cTn>
                               </p:par>
-                            </p:childTnLst>
-                          </p:cTn>
-                        </p:par>
-                      </p:childTnLst>
-                    </p:cTn>
-                  </p:par>
-                  <p:par>
-                    <p:cTn id="51" fill="hold">
-                      <p:stCondLst>
-                        <p:cond delay="indefinite"/>
-                      </p:stCondLst>
-                      <p:childTnLst>
-                        <p:par>
-                          <p:cTn id="52" fill="hold">
-                            <p:stCondLst>
-                              <p:cond delay="0"/>
-                            </p:stCondLst>
-                            <p:childTnLst>
                               <p:par>
-                                <p:cTn id="53" presetID="1" presetClass="entr" presetSubtype="0" fill="hold" grpId="0" nodeType="clickEffect">
+                                <p:cTn id="51" presetID="1" presetClass="entr" presetSubtype="0" fill="hold" grpId="0" nodeType="withEffect">
+                                  <p:stCondLst>
+                                    <p:cond delay="0"/>
+                                  </p:stCondLst>
+                                  <p:childTnLst>
+                                    <p:set>
+                                      <p:cBhvr>
+                                        <p:cTn id="52" dur="1" fill="hold">
+                                          <p:stCondLst>
+                                            <p:cond delay="0"/>
+                                          </p:stCondLst>
+                                        </p:cTn>
+                                        <p:tgtEl>
+                                          <p:spTgt spid="183"/>
+                                        </p:tgtEl>
+                                        <p:attrNameLst>
+                                          <p:attrName>style.visibility</p:attrName>
+                                        </p:attrNameLst>
+                                      </p:cBhvr>
+                                      <p:to>
+                                        <p:strVal val="visible"/>
+                                      </p:to>
+                                    </p:set>
+                                  </p:childTnLst>
+                                </p:cTn>
+                              </p:par>
+                              <p:par>
+                                <p:cTn id="53" presetID="1" presetClass="entr" presetSubtype="0" fill="hold" nodeType="withEffect">
                                   <p:stCondLst>
                                     <p:cond delay="0"/>
                                   </p:stCondLst>
@@ -15420,7 +16915,7 @@
                                           </p:stCondLst>
                                         </p:cTn>
                                         <p:tgtEl>
-                                          <p:spTgt spid="35"/>
+                                          <p:spTgt spid="198"/>
                                         </p:tgtEl>
                                         <p:attrNameLst>
                                           <p:attrName>style.visibility</p:attrName>
@@ -15433,26 +16928,35 @@
                                   </p:childTnLst>
                                 </p:cTn>
                               </p:par>
-                            </p:childTnLst>
-                          </p:cTn>
-                        </p:par>
-                      </p:childTnLst>
-                    </p:cTn>
-                  </p:par>
-                  <p:par>
-                    <p:cTn id="55" fill="hold">
-                      <p:stCondLst>
-                        <p:cond delay="indefinite"/>
-                      </p:stCondLst>
-                      <p:childTnLst>
-                        <p:par>
-                          <p:cTn id="56" fill="hold">
-                            <p:stCondLst>
-                              <p:cond delay="0"/>
-                            </p:stCondLst>
-                            <p:childTnLst>
                               <p:par>
-                                <p:cTn id="57" presetID="1" presetClass="entr" presetSubtype="0" fill="hold" nodeType="clickEffect">
+                                <p:cTn id="55" presetID="1" presetClass="entr" presetSubtype="0" fill="hold" grpId="0" nodeType="withEffect">
+                                  <p:stCondLst>
+                                    <p:cond delay="0"/>
+                                  </p:stCondLst>
+                                  <p:childTnLst>
+                                    <p:set>
+                                      <p:cBhvr>
+                                        <p:cTn id="56" dur="1" fill="hold">
+                                          <p:stCondLst>
+                                            <p:cond delay="0"/>
+                                          </p:stCondLst>
+                                        </p:cTn>
+                                        <p:tgtEl>
+                                          <p:spTgt spid="185"/>
+                                        </p:tgtEl>
+                                        <p:attrNameLst>
+                                          <p:attrName>style.visibility</p:attrName>
+                                        </p:attrNameLst>
+                                      </p:cBhvr>
+                                      <p:to>
+                                        <p:strVal val="visible"/>
+                                      </p:to>
+                                    </p:set>
+                                  </p:childTnLst>
+                                </p:cTn>
+                              </p:par>
+                              <p:par>
+                                <p:cTn id="57" presetID="1" presetClass="entr" presetSubtype="0" fill="hold" nodeType="withEffect">
                                   <p:stCondLst>
                                     <p:cond delay="0"/>
                                   </p:stCondLst>
@@ -15465,7 +16969,7 @@
                                           </p:stCondLst>
                                         </p:cTn>
                                         <p:tgtEl>
-                                          <p:spTgt spid="199"/>
+                                          <p:spTgt spid="180"/>
                                         </p:tgtEl>
                                         <p:attrNameLst>
                                           <p:attrName>style.visibility</p:attrName>
@@ -15497,29 +17001,24 @@
                             </p:stCondLst>
                             <p:childTnLst>
                               <p:par>
-                                <p:cTn id="61" presetID="1" presetClass="entr" presetSubtype="0" fill="hold" grpId="0" nodeType="clickEffect">
+                                <p:cTn id="61" presetID="0" presetClass="path" presetSubtype="0" accel="50000" decel="50000" fill="hold" nodeType="clickEffect">
                                   <p:stCondLst>
                                     <p:cond delay="0"/>
                                   </p:stCondLst>
                                   <p:childTnLst>
-                                    <p:set>
+                                    <p:animMotion origin="layout" path="M -3.125E-7 5.55556E-7 L -0.16921 0.00116 " pathEditMode="relative" rAng="0" ptsTypes="AA">
                                       <p:cBhvr>
-                                        <p:cTn id="62" dur="1" fill="hold">
-                                          <p:stCondLst>
-                                            <p:cond delay="0"/>
-                                          </p:stCondLst>
-                                        </p:cTn>
+                                        <p:cTn id="62" dur="2000" fill="hold"/>
                                         <p:tgtEl>
-                                          <p:spTgt spid="61"/>
+                                          <p:spTgt spid="198"/>
                                         </p:tgtEl>
                                         <p:attrNameLst>
-                                          <p:attrName>style.visibility</p:attrName>
+                                          <p:attrName>ppt_x</p:attrName>
+                                          <p:attrName>ppt_y</p:attrName>
                                         </p:attrNameLst>
                                       </p:cBhvr>
-                                      <p:to>
-                                        <p:strVal val="visible"/>
-                                      </p:to>
-                                    </p:set>
+                                      <p:rCtr x="-8496" y="46"/>
+                                    </p:animMotion>
                                   </p:childTnLst>
                                 </p:cTn>
                               </p:par>
@@ -15542,7 +17041,7 @@
                             </p:stCondLst>
                             <p:childTnLst>
                               <p:par>
-                                <p:cTn id="65" presetID="1" presetClass="entr" presetSubtype="0" fill="hold" nodeType="clickEffect">
+                                <p:cTn id="65" presetID="1" presetClass="entr" presetSubtype="0" fill="hold" grpId="0" nodeType="clickEffect">
                                   <p:stCondLst>
                                     <p:cond delay="0"/>
                                   </p:stCondLst>
@@ -15555,7 +17054,7 @@
                                           </p:stCondLst>
                                         </p:cTn>
                                         <p:tgtEl>
-                                          <p:spTgt spid="200"/>
+                                          <p:spTgt spid="35"/>
                                         </p:tgtEl>
                                         <p:attrNameLst>
                                           <p:attrName>style.visibility</p:attrName>
@@ -15600,7 +17099,7 @@
                                           </p:stCondLst>
                                         </p:cTn>
                                         <p:tgtEl>
-                                          <p:spTgt spid="201"/>
+                                          <p:spTgt spid="199"/>
                                         </p:tgtEl>
                                         <p:attrNameLst>
                                           <p:attrName>style.visibility</p:attrName>
@@ -15645,7 +17144,7 @@
                                           </p:stCondLst>
                                         </p:cTn>
                                         <p:tgtEl>
-                                          <p:spTgt spid="133"/>
+                                          <p:spTgt spid="61"/>
                                         </p:tgtEl>
                                         <p:attrNameLst>
                                           <p:attrName>style.visibility</p:attrName>
@@ -15690,7 +17189,7 @@
                                           </p:stCondLst>
                                         </p:cTn>
                                         <p:tgtEl>
-                                          <p:spTgt spid="202"/>
+                                          <p:spTgt spid="200"/>
                                         </p:tgtEl>
                                         <p:attrNameLst>
                                           <p:attrName>style.visibility</p:attrName>
@@ -15730,6 +17229,141 @@
                                     <p:set>
                                       <p:cBhvr>
                                         <p:cTn id="82" dur="1" fill="hold">
+                                          <p:stCondLst>
+                                            <p:cond delay="0"/>
+                                          </p:stCondLst>
+                                        </p:cTn>
+                                        <p:tgtEl>
+                                          <p:spTgt spid="201"/>
+                                        </p:tgtEl>
+                                        <p:attrNameLst>
+                                          <p:attrName>style.visibility</p:attrName>
+                                        </p:attrNameLst>
+                                      </p:cBhvr>
+                                      <p:to>
+                                        <p:strVal val="visible"/>
+                                      </p:to>
+                                    </p:set>
+                                  </p:childTnLst>
+                                </p:cTn>
+                              </p:par>
+                            </p:childTnLst>
+                          </p:cTn>
+                        </p:par>
+                      </p:childTnLst>
+                    </p:cTn>
+                  </p:par>
+                  <p:par>
+                    <p:cTn id="83" fill="hold">
+                      <p:stCondLst>
+                        <p:cond delay="indefinite"/>
+                      </p:stCondLst>
+                      <p:childTnLst>
+                        <p:par>
+                          <p:cTn id="84" fill="hold">
+                            <p:stCondLst>
+                              <p:cond delay="0"/>
+                            </p:stCondLst>
+                            <p:childTnLst>
+                              <p:par>
+                                <p:cTn id="85" presetID="1" presetClass="entr" presetSubtype="0" fill="hold" grpId="0" nodeType="clickEffect">
+                                  <p:stCondLst>
+                                    <p:cond delay="0"/>
+                                  </p:stCondLst>
+                                  <p:childTnLst>
+                                    <p:set>
+                                      <p:cBhvr>
+                                        <p:cTn id="86" dur="1" fill="hold">
+                                          <p:stCondLst>
+                                            <p:cond delay="0"/>
+                                          </p:stCondLst>
+                                        </p:cTn>
+                                        <p:tgtEl>
+                                          <p:spTgt spid="133"/>
+                                        </p:tgtEl>
+                                        <p:attrNameLst>
+                                          <p:attrName>style.visibility</p:attrName>
+                                        </p:attrNameLst>
+                                      </p:cBhvr>
+                                      <p:to>
+                                        <p:strVal val="visible"/>
+                                      </p:to>
+                                    </p:set>
+                                  </p:childTnLst>
+                                </p:cTn>
+                              </p:par>
+                            </p:childTnLst>
+                          </p:cTn>
+                        </p:par>
+                      </p:childTnLst>
+                    </p:cTn>
+                  </p:par>
+                  <p:par>
+                    <p:cTn id="87" fill="hold">
+                      <p:stCondLst>
+                        <p:cond delay="indefinite"/>
+                      </p:stCondLst>
+                      <p:childTnLst>
+                        <p:par>
+                          <p:cTn id="88" fill="hold">
+                            <p:stCondLst>
+                              <p:cond delay="0"/>
+                            </p:stCondLst>
+                            <p:childTnLst>
+                              <p:par>
+                                <p:cTn id="89" presetID="1" presetClass="entr" presetSubtype="0" fill="hold" nodeType="clickEffect">
+                                  <p:stCondLst>
+                                    <p:cond delay="0"/>
+                                  </p:stCondLst>
+                                  <p:childTnLst>
+                                    <p:set>
+                                      <p:cBhvr>
+                                        <p:cTn id="90" dur="1" fill="hold">
+                                          <p:stCondLst>
+                                            <p:cond delay="0"/>
+                                          </p:stCondLst>
+                                        </p:cTn>
+                                        <p:tgtEl>
+                                          <p:spTgt spid="202"/>
+                                        </p:tgtEl>
+                                        <p:attrNameLst>
+                                          <p:attrName>style.visibility</p:attrName>
+                                        </p:attrNameLst>
+                                      </p:cBhvr>
+                                      <p:to>
+                                        <p:strVal val="visible"/>
+                                      </p:to>
+                                    </p:set>
+                                  </p:childTnLst>
+                                </p:cTn>
+                              </p:par>
+                            </p:childTnLst>
+                          </p:cTn>
+                        </p:par>
+                      </p:childTnLst>
+                    </p:cTn>
+                  </p:par>
+                  <p:par>
+                    <p:cTn id="91" fill="hold">
+                      <p:stCondLst>
+                        <p:cond delay="indefinite"/>
+                      </p:stCondLst>
+                      <p:childTnLst>
+                        <p:par>
+                          <p:cTn id="92" fill="hold">
+                            <p:stCondLst>
+                              <p:cond delay="0"/>
+                            </p:stCondLst>
+                            <p:childTnLst>
+                              <p:par>
+                                <p:cTn id="93" presetID="1" presetClass="entr" presetSubtype="0" fill="hold" nodeType="clickEffect">
+                                  <p:stCondLst>
+                                    <p:cond delay="0"/>
+                                  </p:stCondLst>
+                                  <p:childTnLst>
+                                    <p:set>
+                                      <p:cBhvr>
+                                        <p:cTn id="94" dur="1" fill="hold">
                                           <p:stCondLst>
                                             <p:cond delay="0"/>
                                           </p:stCondLst>
@@ -15791,6 +17425,9 @@
       <p:bldP spid="35" grpId="0"/>
       <p:bldP spid="61" grpId="0"/>
       <p:bldP spid="133" grpId="0"/>
+      <p:bldP spid="182" grpId="0" animBg="1"/>
+      <p:bldP spid="183" grpId="0" animBg="1"/>
+      <p:bldP spid="185" grpId="0"/>
     </p:bldLst>
   </p:timing>
 </p:sld>
@@ -15948,7 +17585,7 @@
           </a:ln>
           <a:extLst>
             <a:ext uri="{C572A759-6A51-4108-AA02-DFA0A04FC94B}">
-              <ma14:wrappingTextBoxFlag xmlns="" xmlns:m="http://schemas.openxmlformats.org/officeDocument/2006/math" xmlns:a14="http://schemas.microsoft.com/office/drawing/2010/main" xmlns:ma14="http://schemas.microsoft.com/office/mac/drawingml/2011/main" val="1"/>
+              <ma14:wrappingTextBoxFlag xmlns:ma14="http://schemas.microsoft.com/office/mac/drawingml/2011/main" xmlns:a14="http://schemas.microsoft.com/office/drawing/2010/main" xmlns:m="http://schemas.openxmlformats.org/officeDocument/2006/math" xmlns="" val="1"/>
             </a:ext>
           </a:extLst>
         </p:spPr>
@@ -16042,7 +17679,7 @@
           </a:ln>
           <a:extLst>
             <a:ext uri="{C572A759-6A51-4108-AA02-DFA0A04FC94B}">
-              <ma14:wrappingTextBoxFlag xmlns="" xmlns:m="http://schemas.openxmlformats.org/officeDocument/2006/math" xmlns:a14="http://schemas.microsoft.com/office/drawing/2010/main" xmlns:ma14="http://schemas.microsoft.com/office/mac/drawingml/2011/main" val="1"/>
+              <ma14:wrappingTextBoxFlag xmlns:ma14="http://schemas.microsoft.com/office/mac/drawingml/2011/main" xmlns:a14="http://schemas.microsoft.com/office/drawing/2010/main" xmlns:m="http://schemas.openxmlformats.org/officeDocument/2006/math" xmlns="" val="1"/>
             </a:ext>
           </a:extLst>
         </p:spPr>
@@ -16376,7 +18013,7 @@
           </a:ln>
           <a:extLst>
             <a:ext uri="{C572A759-6A51-4108-AA02-DFA0A04FC94B}">
-              <ma14:wrappingTextBoxFlag xmlns="" xmlns:m="http://schemas.openxmlformats.org/officeDocument/2006/math" xmlns:a14="http://schemas.microsoft.com/office/drawing/2010/main" xmlns:ma14="http://schemas.microsoft.com/office/mac/drawingml/2011/main" val="1"/>
+              <ma14:wrappingTextBoxFlag xmlns:ma14="http://schemas.microsoft.com/office/mac/drawingml/2011/main" xmlns:a14="http://schemas.microsoft.com/office/drawing/2010/main" xmlns:m="http://schemas.openxmlformats.org/officeDocument/2006/math" xmlns="" val="1"/>
             </a:ext>
           </a:extLst>
         </p:spPr>
@@ -16678,7 +18315,7 @@
           </a:ln>
           <a:extLst>
             <a:ext uri="{C572A759-6A51-4108-AA02-DFA0A04FC94B}">
-              <ma14:wrappingTextBoxFlag xmlns="" xmlns:m="http://schemas.openxmlformats.org/officeDocument/2006/math" xmlns:a14="http://schemas.microsoft.com/office/drawing/2010/main" xmlns:ma14="http://schemas.microsoft.com/office/mac/drawingml/2011/main" val="1"/>
+              <ma14:wrappingTextBoxFlag xmlns:ma14="http://schemas.microsoft.com/office/mac/drawingml/2011/main" xmlns:a14="http://schemas.microsoft.com/office/drawing/2010/main" xmlns:m="http://schemas.openxmlformats.org/officeDocument/2006/math" xmlns="" val="1"/>
             </a:ext>
           </a:extLst>
         </p:spPr>
@@ -16966,6 +18603,231 @@
     <a:masterClrMapping/>
   </p:clrMapOvr>
   <p:transition spd="med"/>
+  <p:timing>
+    <p:tnLst>
+      <p:par>
+        <p:cTn id="1" dur="indefinite" restart="never" nodeType="tmRoot">
+          <p:childTnLst>
+            <p:seq concurrent="1" nextAc="seek">
+              <p:cTn id="2" dur="indefinite" nodeType="mainSeq">
+                <p:childTnLst>
+                  <p:par>
+                    <p:cTn id="3" fill="hold">
+                      <p:stCondLst>
+                        <p:cond delay="indefinite"/>
+                      </p:stCondLst>
+                      <p:childTnLst>
+                        <p:par>
+                          <p:cTn id="4" fill="hold">
+                            <p:stCondLst>
+                              <p:cond delay="0"/>
+                            </p:stCondLst>
+                            <p:childTnLst>
+                              <p:par>
+                                <p:cTn id="5" presetID="1" presetClass="entr" presetSubtype="0" fill="hold" grpId="0" nodeType="clickEffect">
+                                  <p:stCondLst>
+                                    <p:cond delay="0"/>
+                                  </p:stCondLst>
+                                  <p:childTnLst>
+                                    <p:set>
+                                      <p:cBhvr>
+                                        <p:cTn id="6" dur="1" fill="hold">
+                                          <p:stCondLst>
+                                            <p:cond delay="0"/>
+                                          </p:stCondLst>
+                                        </p:cTn>
+                                        <p:tgtEl>
+                                          <p:spTgt spid="4"/>
+                                        </p:tgtEl>
+                                        <p:attrNameLst>
+                                          <p:attrName>style.visibility</p:attrName>
+                                        </p:attrNameLst>
+                                      </p:cBhvr>
+                                      <p:to>
+                                        <p:strVal val="visible"/>
+                                      </p:to>
+                                    </p:set>
+                                  </p:childTnLst>
+                                </p:cTn>
+                              </p:par>
+                            </p:childTnLst>
+                          </p:cTn>
+                        </p:par>
+                      </p:childTnLst>
+                    </p:cTn>
+                  </p:par>
+                  <p:par>
+                    <p:cTn id="7" fill="hold">
+                      <p:stCondLst>
+                        <p:cond delay="indefinite"/>
+                      </p:stCondLst>
+                      <p:childTnLst>
+                        <p:par>
+                          <p:cTn id="8" fill="hold">
+                            <p:stCondLst>
+                              <p:cond delay="0"/>
+                            </p:stCondLst>
+                            <p:childTnLst>
+                              <p:par>
+                                <p:cTn id="9" presetID="1" presetClass="entr" presetSubtype="0" fill="hold" nodeType="clickEffect">
+                                  <p:stCondLst>
+                                    <p:cond delay="0"/>
+                                  </p:stCondLst>
+                                  <p:childTnLst>
+                                    <p:set>
+                                      <p:cBhvr>
+                                        <p:cTn id="10" dur="1" fill="hold">
+                                          <p:stCondLst>
+                                            <p:cond delay="0"/>
+                                          </p:stCondLst>
+                                        </p:cTn>
+                                        <p:tgtEl>
+                                          <p:spTgt spid="5"/>
+                                        </p:tgtEl>
+                                        <p:attrNameLst>
+                                          <p:attrName>style.visibility</p:attrName>
+                                        </p:attrNameLst>
+                                      </p:cBhvr>
+                                      <p:to>
+                                        <p:strVal val="visible"/>
+                                      </p:to>
+                                    </p:set>
+                                  </p:childTnLst>
+                                </p:cTn>
+                              </p:par>
+                              <p:par>
+                                <p:cTn id="11" presetID="1" presetClass="entr" presetSubtype="0" fill="hold" grpId="0" nodeType="withEffect">
+                                  <p:stCondLst>
+                                    <p:cond delay="0"/>
+                                  </p:stCondLst>
+                                  <p:childTnLst>
+                                    <p:set>
+                                      <p:cBhvr>
+                                        <p:cTn id="12" dur="1" fill="hold">
+                                          <p:stCondLst>
+                                            <p:cond delay="0"/>
+                                          </p:stCondLst>
+                                        </p:cTn>
+                                        <p:tgtEl>
+                                          <p:spTgt spid="6"/>
+                                        </p:tgtEl>
+                                        <p:attrNameLst>
+                                          <p:attrName>style.visibility</p:attrName>
+                                        </p:attrNameLst>
+                                      </p:cBhvr>
+                                      <p:to>
+                                        <p:strVal val="visible"/>
+                                      </p:to>
+                                    </p:set>
+                                  </p:childTnLst>
+                                </p:cTn>
+                              </p:par>
+                              <p:par>
+                                <p:cTn id="13" presetID="1" presetClass="entr" presetSubtype="0" fill="hold" grpId="0" nodeType="withEffect">
+                                  <p:stCondLst>
+                                    <p:cond delay="0"/>
+                                  </p:stCondLst>
+                                  <p:childTnLst>
+                                    <p:set>
+                                      <p:cBhvr>
+                                        <p:cTn id="14" dur="1" fill="hold">
+                                          <p:stCondLst>
+                                            <p:cond delay="0"/>
+                                          </p:stCondLst>
+                                        </p:cTn>
+                                        <p:tgtEl>
+                                          <p:spTgt spid="205"/>
+                                        </p:tgtEl>
+                                        <p:attrNameLst>
+                                          <p:attrName>style.visibility</p:attrName>
+                                        </p:attrNameLst>
+                                      </p:cBhvr>
+                                      <p:to>
+                                        <p:strVal val="visible"/>
+                                      </p:to>
+                                    </p:set>
+                                  </p:childTnLst>
+                                </p:cTn>
+                              </p:par>
+                            </p:childTnLst>
+                          </p:cTn>
+                        </p:par>
+                      </p:childTnLst>
+                    </p:cTn>
+                  </p:par>
+                  <p:par>
+                    <p:cTn id="15" fill="hold">
+                      <p:stCondLst>
+                        <p:cond delay="indefinite"/>
+                      </p:stCondLst>
+                      <p:childTnLst>
+                        <p:par>
+                          <p:cTn id="16" fill="hold">
+                            <p:stCondLst>
+                              <p:cond delay="0"/>
+                            </p:stCondLst>
+                            <p:childTnLst>
+                              <p:par>
+                                <p:cTn id="17" presetID="1" presetClass="entr" presetSubtype="0" fill="hold" grpId="0" nodeType="clickEffect">
+                                  <p:stCondLst>
+                                    <p:cond delay="0"/>
+                                  </p:stCondLst>
+                                  <p:childTnLst>
+                                    <p:set>
+                                      <p:cBhvr>
+                                        <p:cTn id="18" dur="1" fill="hold">
+                                          <p:stCondLst>
+                                            <p:cond delay="0"/>
+                                          </p:stCondLst>
+                                        </p:cTn>
+                                        <p:tgtEl>
+                                          <p:spTgt spid="7"/>
+                                        </p:tgtEl>
+                                        <p:attrNameLst>
+                                          <p:attrName>style.visibility</p:attrName>
+                                        </p:attrNameLst>
+                                      </p:cBhvr>
+                                      <p:to>
+                                        <p:strVal val="visible"/>
+                                      </p:to>
+                                    </p:set>
+                                  </p:childTnLst>
+                                </p:cTn>
+                              </p:par>
+                            </p:childTnLst>
+                          </p:cTn>
+                        </p:par>
+                      </p:childTnLst>
+                    </p:cTn>
+                  </p:par>
+                </p:childTnLst>
+              </p:cTn>
+              <p:prevCondLst>
+                <p:cond evt="onPrev" delay="0">
+                  <p:tgtEl>
+                    <p:sldTgt/>
+                  </p:tgtEl>
+                </p:cond>
+              </p:prevCondLst>
+              <p:nextCondLst>
+                <p:cond evt="onNext" delay="0">
+                  <p:tgtEl>
+                    <p:sldTgt/>
+                  </p:tgtEl>
+                </p:cond>
+              </p:nextCondLst>
+            </p:seq>
+          </p:childTnLst>
+        </p:cTn>
+      </p:par>
+    </p:tnLst>
+    <p:bldLst>
+      <p:bldP spid="205" grpId="0" animBg="1"/>
+      <p:bldP spid="4" grpId="0" animBg="1"/>
+      <p:bldP spid="6" grpId="0" animBg="1"/>
+      <p:bldP spid="7" grpId="0" animBg="1"/>
+    </p:bldLst>
+  </p:timing>
 </p:sld>
 </file>
 
@@ -17055,7 +18917,7 @@
           </a:prstGeom>
           <a:extLst>
             <a:ext uri="{C572A759-6A51-4108-AA02-DFA0A04FC94B}">
-              <ma14:wrappingTextBoxFlag xmlns="" xmlns:m="http://schemas.openxmlformats.org/officeDocument/2006/math" xmlns:a14="http://schemas.microsoft.com/office/drawing/2010/main" xmlns:ma14="http://schemas.microsoft.com/office/mac/drawingml/2011/main" val="1"/>
+              <ma14:wrappingTextBoxFlag xmlns:ma14="http://schemas.microsoft.com/office/mac/drawingml/2011/main" xmlns:a14="http://schemas.microsoft.com/office/drawing/2010/main" xmlns:m="http://schemas.openxmlformats.org/officeDocument/2006/math" xmlns="" val="1"/>
             </a:ext>
           </a:extLst>
         </p:spPr>
@@ -17076,8 +18938,8 @@
           </a:p>
         </p:txBody>
       </p:sp>
-      <mc:AlternateContent xmlns:mc="http://schemas.openxmlformats.org/markup-compatibility/2006">
-        <mc:Choice xmlns:a14="http://schemas.microsoft.com/office/drawing/2010/main" Requires="a14">
+      <mc:AlternateContent xmlns:mc="http://schemas.openxmlformats.org/markup-compatibility/2006" xmlns:a14="http://schemas.microsoft.com/office/drawing/2010/main">
+        <mc:Choice Requires="a14">
           <p:sp>
             <p:nvSpPr>
               <p:cNvPr id="2" name="13B - Wednesday 25th January 2023">
@@ -17105,7 +18967,7 @@
               </a:ln>
               <a:extLst>
                 <a:ext uri="{C572A759-6A51-4108-AA02-DFA0A04FC94B}">
-                  <ma14:wrappingTextBoxFlag xmlns="" xmlns:m="http://schemas.openxmlformats.org/officeDocument/2006/math" xmlns:ma14="http://schemas.microsoft.com/office/mac/drawingml/2011/main" val="1"/>
+                  <ma14:wrappingTextBoxFlag xmlns:ma14="http://schemas.microsoft.com/office/mac/drawingml/2011/main" xmlns:m="http://schemas.openxmlformats.org/officeDocument/2006/math" xmlns="" val="1"/>
                 </a:ext>
               </a:extLst>
             </p:spPr>
@@ -17462,7 +19324,7 @@
             </p:txBody>
           </p:sp>
         </mc:Choice>
-        <mc:Fallback>
+        <mc:Fallback xmlns="">
           <p:sp>
             <p:nvSpPr>
               <p:cNvPr id="2" name="13B - Wednesday 25th January 2023">
@@ -17542,7 +19404,7 @@
           </a:ln>
           <a:extLst>
             <a:ext uri="{C572A759-6A51-4108-AA02-DFA0A04FC94B}">
-              <ma14:wrappingTextBoxFlag xmlns="" xmlns:m="http://schemas.openxmlformats.org/officeDocument/2006/math" xmlns:a14="http://schemas.microsoft.com/office/drawing/2010/main" xmlns:ma14="http://schemas.microsoft.com/office/mac/drawingml/2011/main" val="1"/>
+              <ma14:wrappingTextBoxFlag xmlns:ma14="http://schemas.microsoft.com/office/mac/drawingml/2011/main" xmlns:a14="http://schemas.microsoft.com/office/drawing/2010/main" xmlns:m="http://schemas.openxmlformats.org/officeDocument/2006/math" xmlns="" val="1"/>
             </a:ext>
           </a:extLst>
         </p:spPr>
@@ -17825,8 +19687,8 @@
           </a:p>
         </p:txBody>
       </p:sp>
-      <mc:AlternateContent xmlns:mc="http://schemas.openxmlformats.org/markup-compatibility/2006">
-        <mc:Choice xmlns:a14="http://schemas.microsoft.com/office/drawing/2010/main" Requires="a14">
+      <mc:AlternateContent xmlns:mc="http://schemas.openxmlformats.org/markup-compatibility/2006" xmlns:a14="http://schemas.microsoft.com/office/drawing/2010/main">
+        <mc:Choice Requires="a14">
           <p:sp>
             <p:nvSpPr>
               <p:cNvPr id="5" name="In reality we don’t write programs in it very often*…">
@@ -17854,7 +19716,7 @@
               </a:ln>
               <a:extLst>
                 <a:ext uri="{C572A759-6A51-4108-AA02-DFA0A04FC94B}">
-                  <ma14:wrappingTextBoxFlag xmlns="" xmlns:m="http://schemas.openxmlformats.org/officeDocument/2006/math" xmlns:ma14="http://schemas.microsoft.com/office/mac/drawingml/2011/main" val="1"/>
+                  <ma14:wrappingTextBoxFlag xmlns:ma14="http://schemas.microsoft.com/office/mac/drawingml/2011/main" xmlns:m="http://schemas.openxmlformats.org/officeDocument/2006/math" xmlns="" val="1"/>
                 </a:ext>
               </a:extLst>
             </p:spPr>
@@ -18546,16 +20408,7 @@
                           </a:solidFill>
                           <a:latin typeface="Cambria Math" panose="02040503050406030204" pitchFamily="18" charset="0"/>
                         </a:rPr>
-                        <m:t> </m:t>
-                      </m:r>
-                      <m:r>
-                        <a:rPr lang="en-GB" b="0" i="1">
-                          <a:solidFill>
-                            <a:schemeClr val="tx1"/>
-                          </a:solidFill>
-                          <a:latin typeface="Cambria Math" panose="02040503050406030204" pitchFamily="18" charset="0"/>
-                        </a:rPr>
-                        <m:t>&lt;</m:t>
+                        <m:t> &lt;</m:t>
                       </m:r>
                       <m:r>
                         <a:rPr lang="en-GB" b="0" i="1" smtClean="0">
@@ -18573,16 +20426,7 @@
                           </a:solidFill>
                           <a:latin typeface="Cambria Math" panose="02040503050406030204" pitchFamily="18" charset="0"/>
                         </a:rPr>
-                        <m:t>&gt; ∷=</m:t>
-                      </m:r>
-                      <m:r>
-                        <a:rPr lang="en-GB" b="0" i="1">
-                          <a:solidFill>
-                            <a:schemeClr val="tx1"/>
-                          </a:solidFill>
-                          <a:latin typeface="Cambria Math" panose="02040503050406030204" pitchFamily="18" charset="0"/>
-                        </a:rPr>
-                        <m:t>1 </m:t>
+                        <m:t>&gt; ∷=1 </m:t>
                       </m:r>
                       <m:d>
                         <m:dPr>
@@ -18751,7 +20595,7 @@
             </p:txBody>
           </p:sp>
         </mc:Choice>
-        <mc:Fallback>
+        <mc:Fallback xmlns="">
           <p:sp>
             <p:nvSpPr>
               <p:cNvPr id="5" name="In reality we don’t write programs in it very often*…">
@@ -19045,9 +20889,7 @@
                                           </p:stCondLst>
                                         </p:cTn>
                                         <p:tgtEl>
-                                          <p:spTgt spid="5">
-                                            <p:bg/>
-                                          </p:spTgt>
+                                          <p:spTgt spid="2"/>
                                         </p:tgtEl>
                                         <p:attrNameLst>
                                           <p:attrName>style.visibility</p:attrName>
@@ -19432,7 +21274,8 @@
     </p:tnLst>
     <p:bldLst>
       <p:bldP spid="153" grpId="0" uiExpand="1" build="p"/>
-      <p:bldP spid="5" grpId="0" uiExpand="1" build="p" animBg="1"/>
+      <p:bldP spid="2" grpId="0" animBg="1"/>
+      <p:bldP spid="5" grpId="0" uiExpand="1" build="p"/>
     </p:bldLst>
   </p:timing>
 </p:sld>
@@ -19457,55 +21300,6 @@
       </p:grpSpPr>
       <p:sp>
         <p:nvSpPr>
-          <p:cNvPr id="153" name="In reality we don’t write programs in it very often*…"/>
-          <p:cNvSpPr txBox="1">
-            <a:spLocks noGrp="1"/>
-          </p:cNvSpPr>
-          <p:nvPr>
-            <p:ph type="body" sz="quarter" idx="1"/>
-          </p:nvPr>
-        </p:nvSpPr>
-        <p:spPr>
-          <a:xfrm>
-            <a:off x="1219200" y="4094923"/>
-            <a:ext cx="8356600" cy="6141897"/>
-          </a:xfrm>
-          <a:prstGeom prst="rect">
-            <a:avLst/>
-          </a:prstGeom>
-        </p:spPr>
-        <p:txBody>
-          <a:bodyPr/>
-          <a:lstStyle/>
-          <a:p>
-            <a:r>
-              <a:rPr lang="en-GB" b="0" dirty="0"/>
-              <a:t>A set of strings and symbols that follow the rules of a context-free grammar.</a:t>
-            </a:r>
-          </a:p>
-          <a:p>
-            <a:r>
-              <a:rPr lang="en-GB" b="0" dirty="0"/>
-              <a:t>Context-free grammars describe which strings are and are not possible through production rules.</a:t>
-            </a:r>
-          </a:p>
-          <a:p>
-            <a:r>
-              <a:rPr lang="en-GB" b="0" dirty="0"/>
-              <a:t>What does context-free mean?</a:t>
-            </a:r>
-          </a:p>
-          <a:p>
-            <a:r>
-              <a:rPr lang="en-GB" b="0" dirty="0"/>
-              <a:t>What is a production rule?</a:t>
-            </a:r>
-            <a:endParaRPr b="0" dirty="0"/>
-          </a:p>
-        </p:txBody>
-      </p:sp>
-      <p:sp>
-        <p:nvSpPr>
           <p:cNvPr id="155" name="Why are we even learning this?…"/>
           <p:cNvSpPr txBox="1">
             <a:spLocks noGrp="1"/>
@@ -19524,7 +21318,7 @@
           </a:prstGeom>
           <a:extLst>
             <a:ext uri="{C572A759-6A51-4108-AA02-DFA0A04FC94B}">
-              <ma14:wrappingTextBoxFlag xmlns="" xmlns:m="http://schemas.openxmlformats.org/officeDocument/2006/math" xmlns:a14="http://schemas.microsoft.com/office/drawing/2010/main" xmlns:ma14="http://schemas.microsoft.com/office/mac/drawingml/2011/main" val="1"/>
+              <ma14:wrappingTextBoxFlag xmlns:ma14="http://schemas.microsoft.com/office/mac/drawingml/2011/main" xmlns:a14="http://schemas.microsoft.com/office/drawing/2010/main" xmlns:m="http://schemas.openxmlformats.org/officeDocument/2006/math" xmlns="" val="1"/>
             </a:ext>
           </a:extLst>
         </p:spPr>
@@ -19539,7 +21333,7 @@
             </a:pPr>
             <a:r>
               <a:rPr lang="en-GB" sz="4800" b="1" dirty="0"/>
-              <a:t>Context free languages</a:t>
+              <a:t>Syntax diagrams</a:t>
             </a:r>
             <a:endParaRPr sz="4800" b="1" dirty="0"/>
           </a:p>
@@ -19572,7 +21366,7 @@
           </a:ln>
           <a:extLst>
             <a:ext uri="{C572A759-6A51-4108-AA02-DFA0A04FC94B}">
-              <ma14:wrappingTextBoxFlag xmlns="" xmlns:m="http://schemas.openxmlformats.org/officeDocument/2006/math" xmlns:a14="http://schemas.microsoft.com/office/drawing/2010/main" xmlns:ma14="http://schemas.microsoft.com/office/mac/drawingml/2011/main" val="1"/>
+              <ma14:wrappingTextBoxFlag xmlns:ma14="http://schemas.microsoft.com/office/mac/drawingml/2011/main" xmlns:a14="http://schemas.microsoft.com/office/drawing/2010/main" xmlns:m="http://schemas.openxmlformats.org/officeDocument/2006/math" xmlns="" val="1"/>
             </a:ext>
           </a:extLst>
         </p:spPr>
@@ -19855,8 +21649,8 @@
           </a:p>
         </p:txBody>
       </p:sp>
-      <mc:AlternateContent xmlns:mc="http://schemas.openxmlformats.org/markup-compatibility/2006">
-        <mc:Choice xmlns:a14="http://schemas.microsoft.com/office/drawing/2010/main" Requires="a14">
+      <mc:AlternateContent xmlns:mc="http://schemas.openxmlformats.org/markup-compatibility/2006" xmlns:a14="http://schemas.microsoft.com/office/drawing/2010/main">
+        <mc:Choice Requires="a14">
           <p:sp>
             <p:nvSpPr>
               <p:cNvPr id="5" name="In reality we don’t write programs in it very often*…">
@@ -19884,7 +21678,7 @@
               </a:ln>
               <a:extLst>
                 <a:ext uri="{C572A759-6A51-4108-AA02-DFA0A04FC94B}">
-                  <ma14:wrappingTextBoxFlag xmlns="" xmlns:m="http://schemas.openxmlformats.org/officeDocument/2006/math" xmlns:ma14="http://schemas.microsoft.com/office/mac/drawingml/2011/main" val="1"/>
+                  <ma14:wrappingTextBoxFlag xmlns:ma14="http://schemas.microsoft.com/office/mac/drawingml/2011/main" xmlns:m="http://schemas.openxmlformats.org/officeDocument/2006/math" xmlns="" val="1"/>
                 </a:ext>
               </a:extLst>
             </p:spPr>
@@ -20576,16 +22370,7 @@
                           </a:solidFill>
                           <a:latin typeface="Cambria Math" panose="02040503050406030204" pitchFamily="18" charset="0"/>
                         </a:rPr>
-                        <m:t> </m:t>
-                      </m:r>
-                      <m:r>
-                        <a:rPr lang="en-GB" b="0" i="1">
-                          <a:solidFill>
-                            <a:schemeClr val="tx1"/>
-                          </a:solidFill>
-                          <a:latin typeface="Cambria Math" panose="02040503050406030204" pitchFamily="18" charset="0"/>
-                        </a:rPr>
-                        <m:t>&lt;</m:t>
+                        <m:t> &lt;</m:t>
                       </m:r>
                       <m:r>
                         <a:rPr lang="en-GB" b="0" i="1" smtClean="0">
@@ -20603,16 +22388,7 @@
                           </a:solidFill>
                           <a:latin typeface="Cambria Math" panose="02040503050406030204" pitchFamily="18" charset="0"/>
                         </a:rPr>
-                        <m:t>&gt; ∷=</m:t>
-                      </m:r>
-                      <m:r>
-                        <a:rPr lang="en-GB" b="0" i="1">
-                          <a:solidFill>
-                            <a:schemeClr val="tx1"/>
-                          </a:solidFill>
-                          <a:latin typeface="Cambria Math" panose="02040503050406030204" pitchFamily="18" charset="0"/>
-                        </a:rPr>
-                        <m:t>1 </m:t>
+                        <m:t>&gt; ∷=1 </m:t>
                       </m:r>
                       <m:d>
                         <m:dPr>
@@ -20781,7 +22557,7 @@
             </p:txBody>
           </p:sp>
         </mc:Choice>
-        <mc:Fallback>
+        <mc:Fallback xmlns="">
           <p:sp>
             <p:nvSpPr>
               <p:cNvPr id="5" name="In reality we don’t write programs in it very often*…">
@@ -20856,7 +22632,7 @@
         </p:blipFill>
         <p:spPr>
           <a:xfrm>
-            <a:off x="823150" y="1767095"/>
+            <a:off x="807574" y="3681094"/>
             <a:ext cx="9179852" cy="9584845"/>
           </a:xfrm>
           <a:prstGeom prst="rect">
@@ -20875,6 +22651,81 @@
     <a:masterClrMapping/>
   </p:clrMapOvr>
   <p:transition spd="med"/>
+  <p:timing>
+    <p:tnLst>
+      <p:par>
+        <p:cTn id="1" dur="indefinite" restart="never" nodeType="tmRoot">
+          <p:childTnLst>
+            <p:seq concurrent="1" nextAc="seek">
+              <p:cTn id="2" dur="indefinite" nodeType="mainSeq">
+                <p:childTnLst>
+                  <p:par>
+                    <p:cTn id="3" fill="hold">
+                      <p:stCondLst>
+                        <p:cond delay="indefinite"/>
+                      </p:stCondLst>
+                      <p:childTnLst>
+                        <p:par>
+                          <p:cTn id="4" fill="hold">
+                            <p:stCondLst>
+                              <p:cond delay="0"/>
+                            </p:stCondLst>
+                            <p:childTnLst>
+                              <p:par>
+                                <p:cTn id="5" presetID="1" presetClass="entr" presetSubtype="0" fill="hold" nodeType="clickEffect">
+                                  <p:stCondLst>
+                                    <p:cond delay="0"/>
+                                  </p:stCondLst>
+                                  <p:childTnLst>
+                                    <p:set>
+                                      <p:cBhvr>
+                                        <p:cTn id="6" dur="1" fill="hold">
+                                          <p:stCondLst>
+                                            <p:cond delay="0"/>
+                                          </p:stCondLst>
+                                        </p:cTn>
+                                        <p:tgtEl>
+                                          <p:spTgt spid="4"/>
+                                        </p:tgtEl>
+                                        <p:attrNameLst>
+                                          <p:attrName>style.visibility</p:attrName>
+                                        </p:attrNameLst>
+                                      </p:cBhvr>
+                                      <p:to>
+                                        <p:strVal val="visible"/>
+                                      </p:to>
+                                    </p:set>
+                                  </p:childTnLst>
+                                </p:cTn>
+                              </p:par>
+                            </p:childTnLst>
+                          </p:cTn>
+                        </p:par>
+                      </p:childTnLst>
+                    </p:cTn>
+                  </p:par>
+                </p:childTnLst>
+              </p:cTn>
+              <p:prevCondLst>
+                <p:cond evt="onPrev" delay="0">
+                  <p:tgtEl>
+                    <p:sldTgt/>
+                  </p:tgtEl>
+                </p:cond>
+              </p:prevCondLst>
+              <p:nextCondLst>
+                <p:cond evt="onNext" delay="0">
+                  <p:tgtEl>
+                    <p:sldTgt/>
+                  </p:tgtEl>
+                </p:cond>
+              </p:nextCondLst>
+            </p:seq>
+          </p:childTnLst>
+        </p:cTn>
+      </p:par>
+    </p:tnLst>
+  </p:timing>
 </p:sld>
 </file>
 

</xml_diff>